<commit_message>
Änderungen Vika 09/05/22 17 Uhr
</commit_message>
<xml_diff>
--- a/CRM.pptx
+++ b/CRM.pptx
@@ -5,25 +5,26 @@
     <p:sldMasterId id="2147483720" r:id="rId1"/>
   </p:sldMasterIdLst>
   <p:notesMasterIdLst>
-    <p:notesMasterId r:id="rId18"/>
+    <p:notesMasterId r:id="rId19"/>
   </p:notesMasterIdLst>
   <p:sldIdLst>
     <p:sldId id="256" r:id="rId2"/>
     <p:sldId id="263" r:id="rId3"/>
-    <p:sldId id="264" r:id="rId4"/>
-    <p:sldId id="265" r:id="rId5"/>
-    <p:sldId id="257" r:id="rId6"/>
-    <p:sldId id="258" r:id="rId7"/>
-    <p:sldId id="259" r:id="rId8"/>
-    <p:sldId id="260" r:id="rId9"/>
-    <p:sldId id="261" r:id="rId10"/>
+    <p:sldId id="257" r:id="rId4"/>
+    <p:sldId id="258" r:id="rId5"/>
+    <p:sldId id="272" r:id="rId6"/>
+    <p:sldId id="259" r:id="rId7"/>
+    <p:sldId id="264" r:id="rId8"/>
+    <p:sldId id="261" r:id="rId9"/>
+    <p:sldId id="260" r:id="rId10"/>
     <p:sldId id="262" r:id="rId11"/>
-    <p:sldId id="269" r:id="rId12"/>
-    <p:sldId id="266" r:id="rId13"/>
-    <p:sldId id="270" r:id="rId14"/>
-    <p:sldId id="271" r:id="rId15"/>
-    <p:sldId id="268" r:id="rId16"/>
-    <p:sldId id="267" r:id="rId17"/>
+    <p:sldId id="265" r:id="rId12"/>
+    <p:sldId id="269" r:id="rId13"/>
+    <p:sldId id="266" r:id="rId14"/>
+    <p:sldId id="270" r:id="rId15"/>
+    <p:sldId id="271" r:id="rId16"/>
+    <p:sldId id="268" r:id="rId17"/>
+    <p:sldId id="267" r:id="rId18"/>
   </p:sldIdLst>
   <p:sldSz cx="12192000" cy="6858000"/>
   <p:notesSz cx="6858000" cy="9144000"/>
@@ -2620,6 +2621,354 @@
 <file path=ppt/diagrams/data1.xml><?xml version="1.0" encoding="utf-8"?>
 <dgm:dataModel xmlns:dgm="http://schemas.openxmlformats.org/drawingml/2006/diagram" xmlns:a="http://schemas.openxmlformats.org/drawingml/2006/main">
   <dgm:ptLst>
+    <dgm:pt modelId="{09E2A536-6FD8-4AB8-8ADC-07719F12782A}" type="doc">
+      <dgm:prSet loTypeId="urn:microsoft.com/office/officeart/2005/8/layout/process5" loCatId="process" qsTypeId="urn:microsoft.com/office/officeart/2005/8/quickstyle/simple1" qsCatId="simple" csTypeId="urn:microsoft.com/office/officeart/2005/8/colors/colorful2" csCatId="colorful" phldr="1"/>
+      <dgm:spPr/>
+      <dgm:t>
+        <a:bodyPr/>
+        <a:lstStyle/>
+        <a:p>
+          <a:endParaRPr lang="de-DE"/>
+        </a:p>
+      </dgm:t>
+    </dgm:pt>
+    <dgm:pt modelId="{0CEE8376-BD33-4FFC-BA7B-6BDABBF95737}">
+      <dgm:prSet phldrT="[Text]"/>
+      <dgm:spPr/>
+      <dgm:t>
+        <a:bodyPr/>
+        <a:lstStyle/>
+        <a:p>
+          <a:r>
+            <a:rPr lang="de-DE" b="1" dirty="0"/>
+            <a:t>Erstkontakt</a:t>
+          </a:r>
+        </a:p>
+      </dgm:t>
+    </dgm:pt>
+    <dgm:pt modelId="{40F182E8-274E-4517-8101-D26BFFD35558}" type="parTrans" cxnId="{6AEEEB49-8251-42CA-8D9D-39EF5D9D6FBC}">
+      <dgm:prSet/>
+      <dgm:spPr/>
+      <dgm:t>
+        <a:bodyPr/>
+        <a:lstStyle/>
+        <a:p>
+          <a:endParaRPr lang="de-DE"/>
+        </a:p>
+      </dgm:t>
+    </dgm:pt>
+    <dgm:pt modelId="{6A680978-8A2F-4022-8458-B2C596402B3F}" type="sibTrans" cxnId="{6AEEEB49-8251-42CA-8D9D-39EF5D9D6FBC}">
+      <dgm:prSet/>
+      <dgm:spPr/>
+      <dgm:t>
+        <a:bodyPr/>
+        <a:lstStyle/>
+        <a:p>
+          <a:endParaRPr lang="de-DE"/>
+        </a:p>
+      </dgm:t>
+    </dgm:pt>
+    <dgm:pt modelId="{CFDA05CF-CB0C-470B-91AD-E59EDA99E98E}">
+      <dgm:prSet phldrT="[Text]"/>
+      <dgm:spPr/>
+      <dgm:t>
+        <a:bodyPr/>
+        <a:lstStyle/>
+        <a:p>
+          <a:r>
+            <a:rPr lang="de-DE" b="1" dirty="0" err="1"/>
+            <a:t>Pre</a:t>
+          </a:r>
+          <a:r>
+            <a:rPr lang="de-DE" b="1" dirty="0"/>
+            <a:t>-Sales-Kontakt</a:t>
+          </a:r>
+        </a:p>
+      </dgm:t>
+    </dgm:pt>
+    <dgm:pt modelId="{06BEBF7E-3437-4BC0-AD1F-AC7E414CD1E0}" type="parTrans" cxnId="{09AD3525-5C96-4AAB-B10E-08E179DA4976}">
+      <dgm:prSet/>
+      <dgm:spPr/>
+      <dgm:t>
+        <a:bodyPr/>
+        <a:lstStyle/>
+        <a:p>
+          <a:endParaRPr lang="de-DE"/>
+        </a:p>
+      </dgm:t>
+    </dgm:pt>
+    <dgm:pt modelId="{24F1AEDF-F700-4DB0-8D3B-49CB1B14E5DD}" type="sibTrans" cxnId="{09AD3525-5C96-4AAB-B10E-08E179DA4976}">
+      <dgm:prSet/>
+      <dgm:spPr/>
+      <dgm:t>
+        <a:bodyPr/>
+        <a:lstStyle/>
+        <a:p>
+          <a:endParaRPr lang="de-DE"/>
+        </a:p>
+      </dgm:t>
+    </dgm:pt>
+    <dgm:pt modelId="{A5F4844E-B842-4855-92B0-8FE432BF2678}">
+      <dgm:prSet phldrT="[Text]"/>
+      <dgm:spPr/>
+      <dgm:t>
+        <a:bodyPr/>
+        <a:lstStyle/>
+        <a:p>
+          <a:r>
+            <a:rPr lang="de-DE" b="1" dirty="0"/>
+            <a:t>Sales</a:t>
+          </a:r>
+          <a:r>
+            <a:rPr lang="de-DE" dirty="0"/>
+            <a:t> </a:t>
+          </a:r>
+          <a:r>
+            <a:rPr lang="de-DE" b="1" dirty="0"/>
+            <a:t>Kontakt</a:t>
+          </a:r>
+        </a:p>
+      </dgm:t>
+    </dgm:pt>
+    <dgm:pt modelId="{919EFBDB-F542-4EE0-8BB1-ED072079B2E6}" type="parTrans" cxnId="{6408AD44-409C-4B4B-BD07-269D0282BBFA}">
+      <dgm:prSet/>
+      <dgm:spPr/>
+      <dgm:t>
+        <a:bodyPr/>
+        <a:lstStyle/>
+        <a:p>
+          <a:endParaRPr lang="de-DE"/>
+        </a:p>
+      </dgm:t>
+    </dgm:pt>
+    <dgm:pt modelId="{DFAE51A5-A7D1-4AA6-AFD0-CCEA7E1B5B1E}" type="sibTrans" cxnId="{6408AD44-409C-4B4B-BD07-269D0282BBFA}">
+      <dgm:prSet/>
+      <dgm:spPr/>
+      <dgm:t>
+        <a:bodyPr/>
+        <a:lstStyle/>
+        <a:p>
+          <a:endParaRPr lang="de-DE"/>
+        </a:p>
+      </dgm:t>
+    </dgm:pt>
+    <dgm:pt modelId="{35F9CC82-7B32-4119-A8E0-0D15BF178DD3}">
+      <dgm:prSet phldrT="[Text]"/>
+      <dgm:spPr/>
+      <dgm:t>
+        <a:bodyPr/>
+        <a:lstStyle/>
+        <a:p>
+          <a:r>
+            <a:rPr lang="de-DE" b="1" dirty="0"/>
+            <a:t>After-Sales</a:t>
+          </a:r>
+          <a:r>
+            <a:rPr lang="de-DE" dirty="0"/>
+            <a:t> </a:t>
+          </a:r>
+          <a:r>
+            <a:rPr lang="de-DE" b="1" dirty="0"/>
+            <a:t>Kontakt</a:t>
+          </a:r>
+        </a:p>
+      </dgm:t>
+    </dgm:pt>
+    <dgm:pt modelId="{D6C8FCB6-FB50-4911-8126-AE48F13650EB}" type="parTrans" cxnId="{1746384E-CB65-47DD-A2BE-DB37BDCFF78F}">
+      <dgm:prSet/>
+      <dgm:spPr/>
+      <dgm:t>
+        <a:bodyPr/>
+        <a:lstStyle/>
+        <a:p>
+          <a:endParaRPr lang="de-DE"/>
+        </a:p>
+      </dgm:t>
+    </dgm:pt>
+    <dgm:pt modelId="{B83ACABF-8E79-47F8-A143-4A085514F24F}" type="sibTrans" cxnId="{1746384E-CB65-47DD-A2BE-DB37BDCFF78F}">
+      <dgm:prSet/>
+      <dgm:spPr/>
+      <dgm:t>
+        <a:bodyPr/>
+        <a:lstStyle/>
+        <a:p>
+          <a:endParaRPr lang="de-DE"/>
+        </a:p>
+      </dgm:t>
+    </dgm:pt>
+    <dgm:pt modelId="{8C949BB6-9BD4-4014-A91C-58E0A41EBD94}">
+      <dgm:prSet phldrT="[Text]"/>
+      <dgm:spPr/>
+      <dgm:t>
+        <a:bodyPr/>
+        <a:lstStyle/>
+        <a:p>
+          <a:r>
+            <a:rPr lang="de-DE" b="1" dirty="0"/>
+            <a:t>Re-Sales</a:t>
+          </a:r>
+          <a:r>
+            <a:rPr lang="de-DE" dirty="0"/>
+            <a:t> </a:t>
+          </a:r>
+          <a:r>
+            <a:rPr lang="de-DE" b="1" dirty="0"/>
+            <a:t>Kontakt</a:t>
+          </a:r>
+        </a:p>
+      </dgm:t>
+    </dgm:pt>
+    <dgm:pt modelId="{DB94606A-1642-4CF9-A313-7F40CA017EAE}" type="parTrans" cxnId="{8ED7EC1A-81CC-40C9-9BDB-6F7080982973}">
+      <dgm:prSet/>
+      <dgm:spPr/>
+      <dgm:t>
+        <a:bodyPr/>
+        <a:lstStyle/>
+        <a:p>
+          <a:endParaRPr lang="de-DE"/>
+        </a:p>
+      </dgm:t>
+    </dgm:pt>
+    <dgm:pt modelId="{A04F7A59-49B9-49D6-9EDD-6AD161A5BF76}" type="sibTrans" cxnId="{8ED7EC1A-81CC-40C9-9BDB-6F7080982973}">
+      <dgm:prSet/>
+      <dgm:spPr/>
+      <dgm:t>
+        <a:bodyPr/>
+        <a:lstStyle/>
+        <a:p>
+          <a:endParaRPr lang="de-DE"/>
+        </a:p>
+      </dgm:t>
+    </dgm:pt>
+    <dgm:pt modelId="{DC93FCDA-1676-4E27-8BFD-88084C88AA97}" type="pres">
+      <dgm:prSet presAssocID="{09E2A536-6FD8-4AB8-8ADC-07719F12782A}" presName="diagram" presStyleCnt="0">
+        <dgm:presLayoutVars>
+          <dgm:dir/>
+          <dgm:resizeHandles val="exact"/>
+        </dgm:presLayoutVars>
+      </dgm:prSet>
+      <dgm:spPr/>
+    </dgm:pt>
+    <dgm:pt modelId="{BBDE617B-AF31-4638-BE6F-6202C8F5DD8A}" type="pres">
+      <dgm:prSet presAssocID="{0CEE8376-BD33-4FFC-BA7B-6BDABBF95737}" presName="node" presStyleLbl="node1" presStyleIdx="0" presStyleCnt="5">
+        <dgm:presLayoutVars>
+          <dgm:bulletEnabled val="1"/>
+        </dgm:presLayoutVars>
+      </dgm:prSet>
+      <dgm:spPr/>
+    </dgm:pt>
+    <dgm:pt modelId="{605F639C-F610-436C-A063-CA410A8B9002}" type="pres">
+      <dgm:prSet presAssocID="{6A680978-8A2F-4022-8458-B2C596402B3F}" presName="sibTrans" presStyleLbl="sibTrans2D1" presStyleIdx="0" presStyleCnt="4"/>
+      <dgm:spPr/>
+    </dgm:pt>
+    <dgm:pt modelId="{B2442091-63AC-45C4-9CB8-602611A3098A}" type="pres">
+      <dgm:prSet presAssocID="{6A680978-8A2F-4022-8458-B2C596402B3F}" presName="connectorText" presStyleLbl="sibTrans2D1" presStyleIdx="0" presStyleCnt="4"/>
+      <dgm:spPr/>
+    </dgm:pt>
+    <dgm:pt modelId="{3FD7FB81-AD1F-4F55-840B-DE20647989E0}" type="pres">
+      <dgm:prSet presAssocID="{CFDA05CF-CB0C-470B-91AD-E59EDA99E98E}" presName="node" presStyleLbl="node1" presStyleIdx="1" presStyleCnt="5">
+        <dgm:presLayoutVars>
+          <dgm:bulletEnabled val="1"/>
+        </dgm:presLayoutVars>
+      </dgm:prSet>
+      <dgm:spPr/>
+    </dgm:pt>
+    <dgm:pt modelId="{C2FB4F32-2C1F-4F59-9314-1654FF6981DE}" type="pres">
+      <dgm:prSet presAssocID="{24F1AEDF-F700-4DB0-8D3B-49CB1B14E5DD}" presName="sibTrans" presStyleLbl="sibTrans2D1" presStyleIdx="1" presStyleCnt="4"/>
+      <dgm:spPr/>
+    </dgm:pt>
+    <dgm:pt modelId="{9DA06422-3C38-4D3D-844F-99C7AA96D760}" type="pres">
+      <dgm:prSet presAssocID="{24F1AEDF-F700-4DB0-8D3B-49CB1B14E5DD}" presName="connectorText" presStyleLbl="sibTrans2D1" presStyleIdx="1" presStyleCnt="4"/>
+      <dgm:spPr/>
+    </dgm:pt>
+    <dgm:pt modelId="{15117A7A-3F09-405F-9C89-E3A7BD46D697}" type="pres">
+      <dgm:prSet presAssocID="{A5F4844E-B842-4855-92B0-8FE432BF2678}" presName="node" presStyleLbl="node1" presStyleIdx="2" presStyleCnt="5">
+        <dgm:presLayoutVars>
+          <dgm:bulletEnabled val="1"/>
+        </dgm:presLayoutVars>
+      </dgm:prSet>
+      <dgm:spPr/>
+    </dgm:pt>
+    <dgm:pt modelId="{5E0F91AA-BF74-42BB-920C-E463302ADE7C}" type="pres">
+      <dgm:prSet presAssocID="{DFAE51A5-A7D1-4AA6-AFD0-CCEA7E1B5B1E}" presName="sibTrans" presStyleLbl="sibTrans2D1" presStyleIdx="2" presStyleCnt="4" custLinFactNeighborY="19612"/>
+      <dgm:spPr/>
+    </dgm:pt>
+    <dgm:pt modelId="{D350FD60-22DA-480A-B55F-8888FB91330E}" type="pres">
+      <dgm:prSet presAssocID="{DFAE51A5-A7D1-4AA6-AFD0-CCEA7E1B5B1E}" presName="connectorText" presStyleLbl="sibTrans2D1" presStyleIdx="2" presStyleCnt="4"/>
+      <dgm:spPr/>
+    </dgm:pt>
+    <dgm:pt modelId="{D28FABF2-8E47-4287-ABF0-EAD22D2B8E86}" type="pres">
+      <dgm:prSet presAssocID="{35F9CC82-7B32-4119-A8E0-0D15BF178DD3}" presName="node" presStyleLbl="node1" presStyleIdx="3" presStyleCnt="5" custLinFactNeighborX="-64850" custLinFactNeighborY="4507">
+        <dgm:presLayoutVars>
+          <dgm:bulletEnabled val="1"/>
+        </dgm:presLayoutVars>
+      </dgm:prSet>
+      <dgm:spPr/>
+    </dgm:pt>
+    <dgm:pt modelId="{733AEB1A-A4E9-49C3-8324-32FAD273B427}" type="pres">
+      <dgm:prSet presAssocID="{B83ACABF-8E79-47F8-A143-4A085514F24F}" presName="sibTrans" presStyleLbl="sibTrans2D1" presStyleIdx="3" presStyleCnt="4"/>
+      <dgm:spPr/>
+    </dgm:pt>
+    <dgm:pt modelId="{C09591B7-259C-4066-AB54-342DA3D1213C}" type="pres">
+      <dgm:prSet presAssocID="{B83ACABF-8E79-47F8-A143-4A085514F24F}" presName="connectorText" presStyleLbl="sibTrans2D1" presStyleIdx="3" presStyleCnt="4"/>
+      <dgm:spPr/>
+    </dgm:pt>
+    <dgm:pt modelId="{E55C3D36-87B2-495F-BC2A-453A5389EF44}" type="pres">
+      <dgm:prSet presAssocID="{8C949BB6-9BD4-4014-A91C-58E0A41EBD94}" presName="node" presStyleLbl="node1" presStyleIdx="4" presStyleCnt="5" custLinFactX="-3759" custLinFactNeighborX="-100000" custLinFactNeighborY="540">
+        <dgm:presLayoutVars>
+          <dgm:bulletEnabled val="1"/>
+        </dgm:presLayoutVars>
+      </dgm:prSet>
+      <dgm:spPr/>
+    </dgm:pt>
+  </dgm:ptLst>
+  <dgm:cxnLst>
+    <dgm:cxn modelId="{8ED7EC1A-81CC-40C9-9BDB-6F7080982973}" srcId="{09E2A536-6FD8-4AB8-8ADC-07719F12782A}" destId="{8C949BB6-9BD4-4014-A91C-58E0A41EBD94}" srcOrd="4" destOrd="0" parTransId="{DB94606A-1642-4CF9-A313-7F40CA017EAE}" sibTransId="{A04F7A59-49B9-49D6-9EDD-6AD161A5BF76}"/>
+    <dgm:cxn modelId="{09AD3525-5C96-4AAB-B10E-08E179DA4976}" srcId="{09E2A536-6FD8-4AB8-8ADC-07719F12782A}" destId="{CFDA05CF-CB0C-470B-91AD-E59EDA99E98E}" srcOrd="1" destOrd="0" parTransId="{06BEBF7E-3437-4BC0-AD1F-AC7E414CD1E0}" sibTransId="{24F1AEDF-F700-4DB0-8D3B-49CB1B14E5DD}"/>
+    <dgm:cxn modelId="{EEAFBB2E-780E-45B4-8586-BEB404BBBA9F}" type="presOf" srcId="{B83ACABF-8E79-47F8-A143-4A085514F24F}" destId="{C09591B7-259C-4066-AB54-342DA3D1213C}" srcOrd="1" destOrd="0" presId="urn:microsoft.com/office/officeart/2005/8/layout/process5"/>
+    <dgm:cxn modelId="{08511731-6E33-4DB8-88C8-040B49B4A3BA}" type="presOf" srcId="{24F1AEDF-F700-4DB0-8D3B-49CB1B14E5DD}" destId="{C2FB4F32-2C1F-4F59-9314-1654FF6981DE}" srcOrd="0" destOrd="0" presId="urn:microsoft.com/office/officeart/2005/8/layout/process5"/>
+    <dgm:cxn modelId="{77D30E3B-2BCC-4584-A8E9-A6688E8D7B36}" type="presOf" srcId="{09E2A536-6FD8-4AB8-8ADC-07719F12782A}" destId="{DC93FCDA-1676-4E27-8BFD-88084C88AA97}" srcOrd="0" destOrd="0" presId="urn:microsoft.com/office/officeart/2005/8/layout/process5"/>
+    <dgm:cxn modelId="{2E10FF5D-511D-4433-B771-A8063D5AA04E}" type="presOf" srcId="{0CEE8376-BD33-4FFC-BA7B-6BDABBF95737}" destId="{BBDE617B-AF31-4638-BE6F-6202C8F5DD8A}" srcOrd="0" destOrd="0" presId="urn:microsoft.com/office/officeart/2005/8/layout/process5"/>
+    <dgm:cxn modelId="{17AE3360-ADFC-4683-B36F-1040E56C843F}" type="presOf" srcId="{6A680978-8A2F-4022-8458-B2C596402B3F}" destId="{605F639C-F610-436C-A063-CA410A8B9002}" srcOrd="0" destOrd="0" presId="urn:microsoft.com/office/officeart/2005/8/layout/process5"/>
+    <dgm:cxn modelId="{6408AD44-409C-4B4B-BD07-269D0282BBFA}" srcId="{09E2A536-6FD8-4AB8-8ADC-07719F12782A}" destId="{A5F4844E-B842-4855-92B0-8FE432BF2678}" srcOrd="2" destOrd="0" parTransId="{919EFBDB-F542-4EE0-8BB1-ED072079B2E6}" sibTransId="{DFAE51A5-A7D1-4AA6-AFD0-CCEA7E1B5B1E}"/>
+    <dgm:cxn modelId="{6AEEEB49-8251-42CA-8D9D-39EF5D9D6FBC}" srcId="{09E2A536-6FD8-4AB8-8ADC-07719F12782A}" destId="{0CEE8376-BD33-4FFC-BA7B-6BDABBF95737}" srcOrd="0" destOrd="0" parTransId="{40F182E8-274E-4517-8101-D26BFFD35558}" sibTransId="{6A680978-8A2F-4022-8458-B2C596402B3F}"/>
+    <dgm:cxn modelId="{7B68924A-0157-499D-B6E2-F78A0B3BAE92}" type="presOf" srcId="{35F9CC82-7B32-4119-A8E0-0D15BF178DD3}" destId="{D28FABF2-8E47-4287-ABF0-EAD22D2B8E86}" srcOrd="0" destOrd="0" presId="urn:microsoft.com/office/officeart/2005/8/layout/process5"/>
+    <dgm:cxn modelId="{1746384E-CB65-47DD-A2BE-DB37BDCFF78F}" srcId="{09E2A536-6FD8-4AB8-8ADC-07719F12782A}" destId="{35F9CC82-7B32-4119-A8E0-0D15BF178DD3}" srcOrd="3" destOrd="0" parTransId="{D6C8FCB6-FB50-4911-8126-AE48F13650EB}" sibTransId="{B83ACABF-8E79-47F8-A143-4A085514F24F}"/>
+    <dgm:cxn modelId="{B452BF56-9665-42C6-87E2-5BDEFE4C1036}" type="presOf" srcId="{DFAE51A5-A7D1-4AA6-AFD0-CCEA7E1B5B1E}" destId="{5E0F91AA-BF74-42BB-920C-E463302ADE7C}" srcOrd="0" destOrd="0" presId="urn:microsoft.com/office/officeart/2005/8/layout/process5"/>
+    <dgm:cxn modelId="{6FF4D97C-FE9F-4FC0-A9C9-B8891519E62E}" type="presOf" srcId="{DFAE51A5-A7D1-4AA6-AFD0-CCEA7E1B5B1E}" destId="{D350FD60-22DA-480A-B55F-8888FB91330E}" srcOrd="1" destOrd="0" presId="urn:microsoft.com/office/officeart/2005/8/layout/process5"/>
+    <dgm:cxn modelId="{78E939A5-E8E2-4D02-9054-93821FC5C63A}" type="presOf" srcId="{8C949BB6-9BD4-4014-A91C-58E0A41EBD94}" destId="{E55C3D36-87B2-495F-BC2A-453A5389EF44}" srcOrd="0" destOrd="0" presId="urn:microsoft.com/office/officeart/2005/8/layout/process5"/>
+    <dgm:cxn modelId="{6F4D8ABA-EFF0-403F-A524-125E3635E3D0}" type="presOf" srcId="{6A680978-8A2F-4022-8458-B2C596402B3F}" destId="{B2442091-63AC-45C4-9CB8-602611A3098A}" srcOrd="1" destOrd="0" presId="urn:microsoft.com/office/officeart/2005/8/layout/process5"/>
+    <dgm:cxn modelId="{84F032C8-2A2D-4F5F-8307-4079EDDD63CA}" type="presOf" srcId="{B83ACABF-8E79-47F8-A143-4A085514F24F}" destId="{733AEB1A-A4E9-49C3-8324-32FAD273B427}" srcOrd="0" destOrd="0" presId="urn:microsoft.com/office/officeart/2005/8/layout/process5"/>
+    <dgm:cxn modelId="{0C4479EC-557E-43B6-B84E-8C0CF1F4C29E}" type="presOf" srcId="{CFDA05CF-CB0C-470B-91AD-E59EDA99E98E}" destId="{3FD7FB81-AD1F-4F55-840B-DE20647989E0}" srcOrd="0" destOrd="0" presId="urn:microsoft.com/office/officeart/2005/8/layout/process5"/>
+    <dgm:cxn modelId="{AA221AF0-CEC0-47E4-B193-EE01E04C1DB1}" type="presOf" srcId="{24F1AEDF-F700-4DB0-8D3B-49CB1B14E5DD}" destId="{9DA06422-3C38-4D3D-844F-99C7AA96D760}" srcOrd="1" destOrd="0" presId="urn:microsoft.com/office/officeart/2005/8/layout/process5"/>
+    <dgm:cxn modelId="{3E1B5AFC-0E74-426C-824D-A9F57ECE53D4}" type="presOf" srcId="{A5F4844E-B842-4855-92B0-8FE432BF2678}" destId="{15117A7A-3F09-405F-9C89-E3A7BD46D697}" srcOrd="0" destOrd="0" presId="urn:microsoft.com/office/officeart/2005/8/layout/process5"/>
+    <dgm:cxn modelId="{6EFDE7C1-4291-4533-8A3F-3EC82C24910D}" type="presParOf" srcId="{DC93FCDA-1676-4E27-8BFD-88084C88AA97}" destId="{BBDE617B-AF31-4638-BE6F-6202C8F5DD8A}" srcOrd="0" destOrd="0" presId="urn:microsoft.com/office/officeart/2005/8/layout/process5"/>
+    <dgm:cxn modelId="{71779688-9CF4-42ED-A60A-F4023EFABA00}" type="presParOf" srcId="{DC93FCDA-1676-4E27-8BFD-88084C88AA97}" destId="{605F639C-F610-436C-A063-CA410A8B9002}" srcOrd="1" destOrd="0" presId="urn:microsoft.com/office/officeart/2005/8/layout/process5"/>
+    <dgm:cxn modelId="{9DE65FAE-2AC4-40B6-91CC-E81B6973FA25}" type="presParOf" srcId="{605F639C-F610-436C-A063-CA410A8B9002}" destId="{B2442091-63AC-45C4-9CB8-602611A3098A}" srcOrd="0" destOrd="0" presId="urn:microsoft.com/office/officeart/2005/8/layout/process5"/>
+    <dgm:cxn modelId="{ACFD8C1C-FAE7-4240-BBC1-BE064F4E2C11}" type="presParOf" srcId="{DC93FCDA-1676-4E27-8BFD-88084C88AA97}" destId="{3FD7FB81-AD1F-4F55-840B-DE20647989E0}" srcOrd="2" destOrd="0" presId="urn:microsoft.com/office/officeart/2005/8/layout/process5"/>
+    <dgm:cxn modelId="{F0CE9E9C-18FB-4616-8495-D9E925EA6F06}" type="presParOf" srcId="{DC93FCDA-1676-4E27-8BFD-88084C88AA97}" destId="{C2FB4F32-2C1F-4F59-9314-1654FF6981DE}" srcOrd="3" destOrd="0" presId="urn:microsoft.com/office/officeart/2005/8/layout/process5"/>
+    <dgm:cxn modelId="{E7CD2587-BA3D-45B3-85D2-AE36EAF201D3}" type="presParOf" srcId="{C2FB4F32-2C1F-4F59-9314-1654FF6981DE}" destId="{9DA06422-3C38-4D3D-844F-99C7AA96D760}" srcOrd="0" destOrd="0" presId="urn:microsoft.com/office/officeart/2005/8/layout/process5"/>
+    <dgm:cxn modelId="{6E8E5BF6-60C9-4DDF-A0C1-3E27247D75FB}" type="presParOf" srcId="{DC93FCDA-1676-4E27-8BFD-88084C88AA97}" destId="{15117A7A-3F09-405F-9C89-E3A7BD46D697}" srcOrd="4" destOrd="0" presId="urn:microsoft.com/office/officeart/2005/8/layout/process5"/>
+    <dgm:cxn modelId="{7FBF95F8-5495-4BC4-AF1C-E70DC96DF421}" type="presParOf" srcId="{DC93FCDA-1676-4E27-8BFD-88084C88AA97}" destId="{5E0F91AA-BF74-42BB-920C-E463302ADE7C}" srcOrd="5" destOrd="0" presId="urn:microsoft.com/office/officeart/2005/8/layout/process5"/>
+    <dgm:cxn modelId="{DEFB9976-404C-4CFB-8253-86E027054F4A}" type="presParOf" srcId="{5E0F91AA-BF74-42BB-920C-E463302ADE7C}" destId="{D350FD60-22DA-480A-B55F-8888FB91330E}" srcOrd="0" destOrd="0" presId="urn:microsoft.com/office/officeart/2005/8/layout/process5"/>
+    <dgm:cxn modelId="{8B6E313A-DAEB-4B70-8629-72B411439292}" type="presParOf" srcId="{DC93FCDA-1676-4E27-8BFD-88084C88AA97}" destId="{D28FABF2-8E47-4287-ABF0-EAD22D2B8E86}" srcOrd="6" destOrd="0" presId="urn:microsoft.com/office/officeart/2005/8/layout/process5"/>
+    <dgm:cxn modelId="{5D408690-C875-41C7-A1E0-5CF13231AFC8}" type="presParOf" srcId="{DC93FCDA-1676-4E27-8BFD-88084C88AA97}" destId="{733AEB1A-A4E9-49C3-8324-32FAD273B427}" srcOrd="7" destOrd="0" presId="urn:microsoft.com/office/officeart/2005/8/layout/process5"/>
+    <dgm:cxn modelId="{0B7C149E-09B4-4154-89F2-DF3C93E27AC7}" type="presParOf" srcId="{733AEB1A-A4E9-49C3-8324-32FAD273B427}" destId="{C09591B7-259C-4066-AB54-342DA3D1213C}" srcOrd="0" destOrd="0" presId="urn:microsoft.com/office/officeart/2005/8/layout/process5"/>
+    <dgm:cxn modelId="{F7FE64AA-2E02-4581-AA96-03D71817AB72}" type="presParOf" srcId="{DC93FCDA-1676-4E27-8BFD-88084C88AA97}" destId="{E55C3D36-87B2-495F-BC2A-453A5389EF44}" srcOrd="8" destOrd="0" presId="urn:microsoft.com/office/officeart/2005/8/layout/process5"/>
+  </dgm:cxnLst>
+  <dgm:bg/>
+  <dgm:whole/>
+  <dgm:extLst>
+    <a:ext uri="http://schemas.microsoft.com/office/drawing/2008/diagram">
+      <dsp:dataModelExt xmlns:dsp="http://schemas.microsoft.com/office/drawing/2008/diagram" relId="rId6" minVer="http://schemas.openxmlformats.org/drawingml/2006/diagram"/>
+    </a:ext>
+  </dgm:extLst>
+</dgm:dataModel>
+</file>
+
+<file path=ppt/diagrams/data2.xml><?xml version="1.0" encoding="utf-8"?>
+<dgm:dataModel xmlns:dgm="http://schemas.openxmlformats.org/drawingml/2006/diagram" xmlns:a="http://schemas.openxmlformats.org/drawingml/2006/main">
+  <dgm:ptLst>
     <dgm:pt modelId="{05A6F618-75B2-4D18-A148-E35109FFF3FE}" type="doc">
       <dgm:prSet loTypeId="urn:microsoft.com/office/officeart/2005/8/layout/process4" loCatId="process" qsTypeId="urn:microsoft.com/office/officeart/2005/8/quickstyle/simple1" qsCatId="simple" csTypeId="urn:microsoft.com/office/officeart/2005/8/colors/colorful2" csCatId="colorful" phldr="1"/>
       <dgm:spPr/>
@@ -2980,854 +3329,7 @@
 </dgm:dataModel>
 </file>
 
-<file path=ppt/diagrams/data2.xml><?xml version="1.0" encoding="utf-8"?>
-<dgm:dataModel xmlns:dgm="http://schemas.openxmlformats.org/drawingml/2006/diagram" xmlns:a="http://schemas.openxmlformats.org/drawingml/2006/main">
-  <dgm:ptLst>
-    <dgm:pt modelId="{09E2A536-6FD8-4AB8-8ADC-07719F12782A}" type="doc">
-      <dgm:prSet loTypeId="urn:microsoft.com/office/officeart/2005/8/layout/process5" loCatId="process" qsTypeId="urn:microsoft.com/office/officeart/2005/8/quickstyle/simple1" qsCatId="simple" csTypeId="urn:microsoft.com/office/officeart/2005/8/colors/colorful2" csCatId="colorful" phldr="1"/>
-      <dgm:spPr/>
-      <dgm:t>
-        <a:bodyPr/>
-        <a:lstStyle/>
-        <a:p>
-          <a:endParaRPr lang="de-DE"/>
-        </a:p>
-      </dgm:t>
-    </dgm:pt>
-    <dgm:pt modelId="{0CEE8376-BD33-4FFC-BA7B-6BDABBF95737}">
-      <dgm:prSet phldrT="[Text]"/>
-      <dgm:spPr/>
-      <dgm:t>
-        <a:bodyPr/>
-        <a:lstStyle/>
-        <a:p>
-          <a:r>
-            <a:rPr lang="de-DE" b="1" dirty="0"/>
-            <a:t>Erstkontakt</a:t>
-          </a:r>
-        </a:p>
-      </dgm:t>
-    </dgm:pt>
-    <dgm:pt modelId="{40F182E8-274E-4517-8101-D26BFFD35558}" type="parTrans" cxnId="{6AEEEB49-8251-42CA-8D9D-39EF5D9D6FBC}">
-      <dgm:prSet/>
-      <dgm:spPr/>
-      <dgm:t>
-        <a:bodyPr/>
-        <a:lstStyle/>
-        <a:p>
-          <a:endParaRPr lang="de-DE"/>
-        </a:p>
-      </dgm:t>
-    </dgm:pt>
-    <dgm:pt modelId="{6A680978-8A2F-4022-8458-B2C596402B3F}" type="sibTrans" cxnId="{6AEEEB49-8251-42CA-8D9D-39EF5D9D6FBC}">
-      <dgm:prSet/>
-      <dgm:spPr/>
-      <dgm:t>
-        <a:bodyPr/>
-        <a:lstStyle/>
-        <a:p>
-          <a:endParaRPr lang="de-DE"/>
-        </a:p>
-      </dgm:t>
-    </dgm:pt>
-    <dgm:pt modelId="{CFDA05CF-CB0C-470B-91AD-E59EDA99E98E}">
-      <dgm:prSet phldrT="[Text]"/>
-      <dgm:spPr/>
-      <dgm:t>
-        <a:bodyPr/>
-        <a:lstStyle/>
-        <a:p>
-          <a:r>
-            <a:rPr lang="de-DE" b="1" dirty="0" err="1"/>
-            <a:t>Pre</a:t>
-          </a:r>
-          <a:r>
-            <a:rPr lang="de-DE" b="1" dirty="0"/>
-            <a:t>-Sales-Kontakt</a:t>
-          </a:r>
-        </a:p>
-      </dgm:t>
-    </dgm:pt>
-    <dgm:pt modelId="{06BEBF7E-3437-4BC0-AD1F-AC7E414CD1E0}" type="parTrans" cxnId="{09AD3525-5C96-4AAB-B10E-08E179DA4976}">
-      <dgm:prSet/>
-      <dgm:spPr/>
-      <dgm:t>
-        <a:bodyPr/>
-        <a:lstStyle/>
-        <a:p>
-          <a:endParaRPr lang="de-DE"/>
-        </a:p>
-      </dgm:t>
-    </dgm:pt>
-    <dgm:pt modelId="{24F1AEDF-F700-4DB0-8D3B-49CB1B14E5DD}" type="sibTrans" cxnId="{09AD3525-5C96-4AAB-B10E-08E179DA4976}">
-      <dgm:prSet/>
-      <dgm:spPr/>
-      <dgm:t>
-        <a:bodyPr/>
-        <a:lstStyle/>
-        <a:p>
-          <a:endParaRPr lang="de-DE"/>
-        </a:p>
-      </dgm:t>
-    </dgm:pt>
-    <dgm:pt modelId="{A5F4844E-B842-4855-92B0-8FE432BF2678}">
-      <dgm:prSet phldrT="[Text]"/>
-      <dgm:spPr/>
-      <dgm:t>
-        <a:bodyPr/>
-        <a:lstStyle/>
-        <a:p>
-          <a:r>
-            <a:rPr lang="de-DE" b="1" dirty="0"/>
-            <a:t>Sales</a:t>
-          </a:r>
-          <a:r>
-            <a:rPr lang="de-DE" dirty="0"/>
-            <a:t> </a:t>
-          </a:r>
-          <a:r>
-            <a:rPr lang="de-DE" b="1" dirty="0"/>
-            <a:t>Kontakt</a:t>
-          </a:r>
-        </a:p>
-      </dgm:t>
-    </dgm:pt>
-    <dgm:pt modelId="{919EFBDB-F542-4EE0-8BB1-ED072079B2E6}" type="parTrans" cxnId="{6408AD44-409C-4B4B-BD07-269D0282BBFA}">
-      <dgm:prSet/>
-      <dgm:spPr/>
-      <dgm:t>
-        <a:bodyPr/>
-        <a:lstStyle/>
-        <a:p>
-          <a:endParaRPr lang="de-DE"/>
-        </a:p>
-      </dgm:t>
-    </dgm:pt>
-    <dgm:pt modelId="{DFAE51A5-A7D1-4AA6-AFD0-CCEA7E1B5B1E}" type="sibTrans" cxnId="{6408AD44-409C-4B4B-BD07-269D0282BBFA}">
-      <dgm:prSet/>
-      <dgm:spPr/>
-      <dgm:t>
-        <a:bodyPr/>
-        <a:lstStyle/>
-        <a:p>
-          <a:endParaRPr lang="de-DE"/>
-        </a:p>
-      </dgm:t>
-    </dgm:pt>
-    <dgm:pt modelId="{35F9CC82-7B32-4119-A8E0-0D15BF178DD3}">
-      <dgm:prSet phldrT="[Text]"/>
-      <dgm:spPr/>
-      <dgm:t>
-        <a:bodyPr/>
-        <a:lstStyle/>
-        <a:p>
-          <a:r>
-            <a:rPr lang="de-DE" b="1" dirty="0"/>
-            <a:t>After-Sales</a:t>
-          </a:r>
-          <a:r>
-            <a:rPr lang="de-DE" dirty="0"/>
-            <a:t> </a:t>
-          </a:r>
-          <a:r>
-            <a:rPr lang="de-DE" b="1" dirty="0"/>
-            <a:t>Kontakt</a:t>
-          </a:r>
-        </a:p>
-      </dgm:t>
-    </dgm:pt>
-    <dgm:pt modelId="{D6C8FCB6-FB50-4911-8126-AE48F13650EB}" type="parTrans" cxnId="{1746384E-CB65-47DD-A2BE-DB37BDCFF78F}">
-      <dgm:prSet/>
-      <dgm:spPr/>
-      <dgm:t>
-        <a:bodyPr/>
-        <a:lstStyle/>
-        <a:p>
-          <a:endParaRPr lang="de-DE"/>
-        </a:p>
-      </dgm:t>
-    </dgm:pt>
-    <dgm:pt modelId="{B83ACABF-8E79-47F8-A143-4A085514F24F}" type="sibTrans" cxnId="{1746384E-CB65-47DD-A2BE-DB37BDCFF78F}">
-      <dgm:prSet/>
-      <dgm:spPr/>
-      <dgm:t>
-        <a:bodyPr/>
-        <a:lstStyle/>
-        <a:p>
-          <a:endParaRPr lang="de-DE"/>
-        </a:p>
-      </dgm:t>
-    </dgm:pt>
-    <dgm:pt modelId="{8C949BB6-9BD4-4014-A91C-58E0A41EBD94}">
-      <dgm:prSet phldrT="[Text]"/>
-      <dgm:spPr/>
-      <dgm:t>
-        <a:bodyPr/>
-        <a:lstStyle/>
-        <a:p>
-          <a:r>
-            <a:rPr lang="de-DE" b="1" dirty="0"/>
-            <a:t>Re-Sales</a:t>
-          </a:r>
-          <a:r>
-            <a:rPr lang="de-DE" dirty="0"/>
-            <a:t> </a:t>
-          </a:r>
-          <a:r>
-            <a:rPr lang="de-DE" b="1" dirty="0"/>
-            <a:t>Kontakt</a:t>
-          </a:r>
-        </a:p>
-      </dgm:t>
-    </dgm:pt>
-    <dgm:pt modelId="{DB94606A-1642-4CF9-A313-7F40CA017EAE}" type="parTrans" cxnId="{8ED7EC1A-81CC-40C9-9BDB-6F7080982973}">
-      <dgm:prSet/>
-      <dgm:spPr/>
-      <dgm:t>
-        <a:bodyPr/>
-        <a:lstStyle/>
-        <a:p>
-          <a:endParaRPr lang="de-DE"/>
-        </a:p>
-      </dgm:t>
-    </dgm:pt>
-    <dgm:pt modelId="{A04F7A59-49B9-49D6-9EDD-6AD161A5BF76}" type="sibTrans" cxnId="{8ED7EC1A-81CC-40C9-9BDB-6F7080982973}">
-      <dgm:prSet/>
-      <dgm:spPr/>
-      <dgm:t>
-        <a:bodyPr/>
-        <a:lstStyle/>
-        <a:p>
-          <a:endParaRPr lang="de-DE"/>
-        </a:p>
-      </dgm:t>
-    </dgm:pt>
-    <dgm:pt modelId="{DC93FCDA-1676-4E27-8BFD-88084C88AA97}" type="pres">
-      <dgm:prSet presAssocID="{09E2A536-6FD8-4AB8-8ADC-07719F12782A}" presName="diagram" presStyleCnt="0">
-        <dgm:presLayoutVars>
-          <dgm:dir/>
-          <dgm:resizeHandles val="exact"/>
-        </dgm:presLayoutVars>
-      </dgm:prSet>
-      <dgm:spPr/>
-    </dgm:pt>
-    <dgm:pt modelId="{BBDE617B-AF31-4638-BE6F-6202C8F5DD8A}" type="pres">
-      <dgm:prSet presAssocID="{0CEE8376-BD33-4FFC-BA7B-6BDABBF95737}" presName="node" presStyleLbl="node1" presStyleIdx="0" presStyleCnt="5">
-        <dgm:presLayoutVars>
-          <dgm:bulletEnabled val="1"/>
-        </dgm:presLayoutVars>
-      </dgm:prSet>
-      <dgm:spPr/>
-    </dgm:pt>
-    <dgm:pt modelId="{605F639C-F610-436C-A063-CA410A8B9002}" type="pres">
-      <dgm:prSet presAssocID="{6A680978-8A2F-4022-8458-B2C596402B3F}" presName="sibTrans" presStyleLbl="sibTrans2D1" presStyleIdx="0" presStyleCnt="4"/>
-      <dgm:spPr/>
-    </dgm:pt>
-    <dgm:pt modelId="{B2442091-63AC-45C4-9CB8-602611A3098A}" type="pres">
-      <dgm:prSet presAssocID="{6A680978-8A2F-4022-8458-B2C596402B3F}" presName="connectorText" presStyleLbl="sibTrans2D1" presStyleIdx="0" presStyleCnt="4"/>
-      <dgm:spPr/>
-    </dgm:pt>
-    <dgm:pt modelId="{3FD7FB81-AD1F-4F55-840B-DE20647989E0}" type="pres">
-      <dgm:prSet presAssocID="{CFDA05CF-CB0C-470B-91AD-E59EDA99E98E}" presName="node" presStyleLbl="node1" presStyleIdx="1" presStyleCnt="5">
-        <dgm:presLayoutVars>
-          <dgm:bulletEnabled val="1"/>
-        </dgm:presLayoutVars>
-      </dgm:prSet>
-      <dgm:spPr/>
-    </dgm:pt>
-    <dgm:pt modelId="{C2FB4F32-2C1F-4F59-9314-1654FF6981DE}" type="pres">
-      <dgm:prSet presAssocID="{24F1AEDF-F700-4DB0-8D3B-49CB1B14E5DD}" presName="sibTrans" presStyleLbl="sibTrans2D1" presStyleIdx="1" presStyleCnt="4"/>
-      <dgm:spPr/>
-    </dgm:pt>
-    <dgm:pt modelId="{9DA06422-3C38-4D3D-844F-99C7AA96D760}" type="pres">
-      <dgm:prSet presAssocID="{24F1AEDF-F700-4DB0-8D3B-49CB1B14E5DD}" presName="connectorText" presStyleLbl="sibTrans2D1" presStyleIdx="1" presStyleCnt="4"/>
-      <dgm:spPr/>
-    </dgm:pt>
-    <dgm:pt modelId="{15117A7A-3F09-405F-9C89-E3A7BD46D697}" type="pres">
-      <dgm:prSet presAssocID="{A5F4844E-B842-4855-92B0-8FE432BF2678}" presName="node" presStyleLbl="node1" presStyleIdx="2" presStyleCnt="5">
-        <dgm:presLayoutVars>
-          <dgm:bulletEnabled val="1"/>
-        </dgm:presLayoutVars>
-      </dgm:prSet>
-      <dgm:spPr/>
-    </dgm:pt>
-    <dgm:pt modelId="{5E0F91AA-BF74-42BB-920C-E463302ADE7C}" type="pres">
-      <dgm:prSet presAssocID="{DFAE51A5-A7D1-4AA6-AFD0-CCEA7E1B5B1E}" presName="sibTrans" presStyleLbl="sibTrans2D1" presStyleIdx="2" presStyleCnt="4" custLinFactNeighborY="19612"/>
-      <dgm:spPr/>
-    </dgm:pt>
-    <dgm:pt modelId="{D350FD60-22DA-480A-B55F-8888FB91330E}" type="pres">
-      <dgm:prSet presAssocID="{DFAE51A5-A7D1-4AA6-AFD0-CCEA7E1B5B1E}" presName="connectorText" presStyleLbl="sibTrans2D1" presStyleIdx="2" presStyleCnt="4"/>
-      <dgm:spPr/>
-    </dgm:pt>
-    <dgm:pt modelId="{D28FABF2-8E47-4287-ABF0-EAD22D2B8E86}" type="pres">
-      <dgm:prSet presAssocID="{35F9CC82-7B32-4119-A8E0-0D15BF178DD3}" presName="node" presStyleLbl="node1" presStyleIdx="3" presStyleCnt="5" custLinFactNeighborX="-64850" custLinFactNeighborY="4507">
-        <dgm:presLayoutVars>
-          <dgm:bulletEnabled val="1"/>
-        </dgm:presLayoutVars>
-      </dgm:prSet>
-      <dgm:spPr/>
-    </dgm:pt>
-    <dgm:pt modelId="{733AEB1A-A4E9-49C3-8324-32FAD273B427}" type="pres">
-      <dgm:prSet presAssocID="{B83ACABF-8E79-47F8-A143-4A085514F24F}" presName="sibTrans" presStyleLbl="sibTrans2D1" presStyleIdx="3" presStyleCnt="4"/>
-      <dgm:spPr/>
-    </dgm:pt>
-    <dgm:pt modelId="{C09591B7-259C-4066-AB54-342DA3D1213C}" type="pres">
-      <dgm:prSet presAssocID="{B83ACABF-8E79-47F8-A143-4A085514F24F}" presName="connectorText" presStyleLbl="sibTrans2D1" presStyleIdx="3" presStyleCnt="4"/>
-      <dgm:spPr/>
-    </dgm:pt>
-    <dgm:pt modelId="{E55C3D36-87B2-495F-BC2A-453A5389EF44}" type="pres">
-      <dgm:prSet presAssocID="{8C949BB6-9BD4-4014-A91C-58E0A41EBD94}" presName="node" presStyleLbl="node1" presStyleIdx="4" presStyleCnt="5" custLinFactX="-3759" custLinFactNeighborX="-100000" custLinFactNeighborY="540">
-        <dgm:presLayoutVars>
-          <dgm:bulletEnabled val="1"/>
-        </dgm:presLayoutVars>
-      </dgm:prSet>
-      <dgm:spPr/>
-    </dgm:pt>
-  </dgm:ptLst>
-  <dgm:cxnLst>
-    <dgm:cxn modelId="{8ED7EC1A-81CC-40C9-9BDB-6F7080982973}" srcId="{09E2A536-6FD8-4AB8-8ADC-07719F12782A}" destId="{8C949BB6-9BD4-4014-A91C-58E0A41EBD94}" srcOrd="4" destOrd="0" parTransId="{DB94606A-1642-4CF9-A313-7F40CA017EAE}" sibTransId="{A04F7A59-49B9-49D6-9EDD-6AD161A5BF76}"/>
-    <dgm:cxn modelId="{09AD3525-5C96-4AAB-B10E-08E179DA4976}" srcId="{09E2A536-6FD8-4AB8-8ADC-07719F12782A}" destId="{CFDA05CF-CB0C-470B-91AD-E59EDA99E98E}" srcOrd="1" destOrd="0" parTransId="{06BEBF7E-3437-4BC0-AD1F-AC7E414CD1E0}" sibTransId="{24F1AEDF-F700-4DB0-8D3B-49CB1B14E5DD}"/>
-    <dgm:cxn modelId="{EEAFBB2E-780E-45B4-8586-BEB404BBBA9F}" type="presOf" srcId="{B83ACABF-8E79-47F8-A143-4A085514F24F}" destId="{C09591B7-259C-4066-AB54-342DA3D1213C}" srcOrd="1" destOrd="0" presId="urn:microsoft.com/office/officeart/2005/8/layout/process5"/>
-    <dgm:cxn modelId="{08511731-6E33-4DB8-88C8-040B49B4A3BA}" type="presOf" srcId="{24F1AEDF-F700-4DB0-8D3B-49CB1B14E5DD}" destId="{C2FB4F32-2C1F-4F59-9314-1654FF6981DE}" srcOrd="0" destOrd="0" presId="urn:microsoft.com/office/officeart/2005/8/layout/process5"/>
-    <dgm:cxn modelId="{77D30E3B-2BCC-4584-A8E9-A6688E8D7B36}" type="presOf" srcId="{09E2A536-6FD8-4AB8-8ADC-07719F12782A}" destId="{DC93FCDA-1676-4E27-8BFD-88084C88AA97}" srcOrd="0" destOrd="0" presId="urn:microsoft.com/office/officeart/2005/8/layout/process5"/>
-    <dgm:cxn modelId="{2E10FF5D-511D-4433-B771-A8063D5AA04E}" type="presOf" srcId="{0CEE8376-BD33-4FFC-BA7B-6BDABBF95737}" destId="{BBDE617B-AF31-4638-BE6F-6202C8F5DD8A}" srcOrd="0" destOrd="0" presId="urn:microsoft.com/office/officeart/2005/8/layout/process5"/>
-    <dgm:cxn modelId="{17AE3360-ADFC-4683-B36F-1040E56C843F}" type="presOf" srcId="{6A680978-8A2F-4022-8458-B2C596402B3F}" destId="{605F639C-F610-436C-A063-CA410A8B9002}" srcOrd="0" destOrd="0" presId="urn:microsoft.com/office/officeart/2005/8/layout/process5"/>
-    <dgm:cxn modelId="{6408AD44-409C-4B4B-BD07-269D0282BBFA}" srcId="{09E2A536-6FD8-4AB8-8ADC-07719F12782A}" destId="{A5F4844E-B842-4855-92B0-8FE432BF2678}" srcOrd="2" destOrd="0" parTransId="{919EFBDB-F542-4EE0-8BB1-ED072079B2E6}" sibTransId="{DFAE51A5-A7D1-4AA6-AFD0-CCEA7E1B5B1E}"/>
-    <dgm:cxn modelId="{6AEEEB49-8251-42CA-8D9D-39EF5D9D6FBC}" srcId="{09E2A536-6FD8-4AB8-8ADC-07719F12782A}" destId="{0CEE8376-BD33-4FFC-BA7B-6BDABBF95737}" srcOrd="0" destOrd="0" parTransId="{40F182E8-274E-4517-8101-D26BFFD35558}" sibTransId="{6A680978-8A2F-4022-8458-B2C596402B3F}"/>
-    <dgm:cxn modelId="{7B68924A-0157-499D-B6E2-F78A0B3BAE92}" type="presOf" srcId="{35F9CC82-7B32-4119-A8E0-0D15BF178DD3}" destId="{D28FABF2-8E47-4287-ABF0-EAD22D2B8E86}" srcOrd="0" destOrd="0" presId="urn:microsoft.com/office/officeart/2005/8/layout/process5"/>
-    <dgm:cxn modelId="{1746384E-CB65-47DD-A2BE-DB37BDCFF78F}" srcId="{09E2A536-6FD8-4AB8-8ADC-07719F12782A}" destId="{35F9CC82-7B32-4119-A8E0-0D15BF178DD3}" srcOrd="3" destOrd="0" parTransId="{D6C8FCB6-FB50-4911-8126-AE48F13650EB}" sibTransId="{B83ACABF-8E79-47F8-A143-4A085514F24F}"/>
-    <dgm:cxn modelId="{B452BF56-9665-42C6-87E2-5BDEFE4C1036}" type="presOf" srcId="{DFAE51A5-A7D1-4AA6-AFD0-CCEA7E1B5B1E}" destId="{5E0F91AA-BF74-42BB-920C-E463302ADE7C}" srcOrd="0" destOrd="0" presId="urn:microsoft.com/office/officeart/2005/8/layout/process5"/>
-    <dgm:cxn modelId="{6FF4D97C-FE9F-4FC0-A9C9-B8891519E62E}" type="presOf" srcId="{DFAE51A5-A7D1-4AA6-AFD0-CCEA7E1B5B1E}" destId="{D350FD60-22DA-480A-B55F-8888FB91330E}" srcOrd="1" destOrd="0" presId="urn:microsoft.com/office/officeart/2005/8/layout/process5"/>
-    <dgm:cxn modelId="{78E939A5-E8E2-4D02-9054-93821FC5C63A}" type="presOf" srcId="{8C949BB6-9BD4-4014-A91C-58E0A41EBD94}" destId="{E55C3D36-87B2-495F-BC2A-453A5389EF44}" srcOrd="0" destOrd="0" presId="urn:microsoft.com/office/officeart/2005/8/layout/process5"/>
-    <dgm:cxn modelId="{6F4D8ABA-EFF0-403F-A524-125E3635E3D0}" type="presOf" srcId="{6A680978-8A2F-4022-8458-B2C596402B3F}" destId="{B2442091-63AC-45C4-9CB8-602611A3098A}" srcOrd="1" destOrd="0" presId="urn:microsoft.com/office/officeart/2005/8/layout/process5"/>
-    <dgm:cxn modelId="{84F032C8-2A2D-4F5F-8307-4079EDDD63CA}" type="presOf" srcId="{B83ACABF-8E79-47F8-A143-4A085514F24F}" destId="{733AEB1A-A4E9-49C3-8324-32FAD273B427}" srcOrd="0" destOrd="0" presId="urn:microsoft.com/office/officeart/2005/8/layout/process5"/>
-    <dgm:cxn modelId="{0C4479EC-557E-43B6-B84E-8C0CF1F4C29E}" type="presOf" srcId="{CFDA05CF-CB0C-470B-91AD-E59EDA99E98E}" destId="{3FD7FB81-AD1F-4F55-840B-DE20647989E0}" srcOrd="0" destOrd="0" presId="urn:microsoft.com/office/officeart/2005/8/layout/process5"/>
-    <dgm:cxn modelId="{AA221AF0-CEC0-47E4-B193-EE01E04C1DB1}" type="presOf" srcId="{24F1AEDF-F700-4DB0-8D3B-49CB1B14E5DD}" destId="{9DA06422-3C38-4D3D-844F-99C7AA96D760}" srcOrd="1" destOrd="0" presId="urn:microsoft.com/office/officeart/2005/8/layout/process5"/>
-    <dgm:cxn modelId="{3E1B5AFC-0E74-426C-824D-A9F57ECE53D4}" type="presOf" srcId="{A5F4844E-B842-4855-92B0-8FE432BF2678}" destId="{15117A7A-3F09-405F-9C89-E3A7BD46D697}" srcOrd="0" destOrd="0" presId="urn:microsoft.com/office/officeart/2005/8/layout/process5"/>
-    <dgm:cxn modelId="{6EFDE7C1-4291-4533-8A3F-3EC82C24910D}" type="presParOf" srcId="{DC93FCDA-1676-4E27-8BFD-88084C88AA97}" destId="{BBDE617B-AF31-4638-BE6F-6202C8F5DD8A}" srcOrd="0" destOrd="0" presId="urn:microsoft.com/office/officeart/2005/8/layout/process5"/>
-    <dgm:cxn modelId="{71779688-9CF4-42ED-A60A-F4023EFABA00}" type="presParOf" srcId="{DC93FCDA-1676-4E27-8BFD-88084C88AA97}" destId="{605F639C-F610-436C-A063-CA410A8B9002}" srcOrd="1" destOrd="0" presId="urn:microsoft.com/office/officeart/2005/8/layout/process5"/>
-    <dgm:cxn modelId="{9DE65FAE-2AC4-40B6-91CC-E81B6973FA25}" type="presParOf" srcId="{605F639C-F610-436C-A063-CA410A8B9002}" destId="{B2442091-63AC-45C4-9CB8-602611A3098A}" srcOrd="0" destOrd="0" presId="urn:microsoft.com/office/officeart/2005/8/layout/process5"/>
-    <dgm:cxn modelId="{ACFD8C1C-FAE7-4240-BBC1-BE064F4E2C11}" type="presParOf" srcId="{DC93FCDA-1676-4E27-8BFD-88084C88AA97}" destId="{3FD7FB81-AD1F-4F55-840B-DE20647989E0}" srcOrd="2" destOrd="0" presId="urn:microsoft.com/office/officeart/2005/8/layout/process5"/>
-    <dgm:cxn modelId="{F0CE9E9C-18FB-4616-8495-D9E925EA6F06}" type="presParOf" srcId="{DC93FCDA-1676-4E27-8BFD-88084C88AA97}" destId="{C2FB4F32-2C1F-4F59-9314-1654FF6981DE}" srcOrd="3" destOrd="0" presId="urn:microsoft.com/office/officeart/2005/8/layout/process5"/>
-    <dgm:cxn modelId="{E7CD2587-BA3D-45B3-85D2-AE36EAF201D3}" type="presParOf" srcId="{C2FB4F32-2C1F-4F59-9314-1654FF6981DE}" destId="{9DA06422-3C38-4D3D-844F-99C7AA96D760}" srcOrd="0" destOrd="0" presId="urn:microsoft.com/office/officeart/2005/8/layout/process5"/>
-    <dgm:cxn modelId="{6E8E5BF6-60C9-4DDF-A0C1-3E27247D75FB}" type="presParOf" srcId="{DC93FCDA-1676-4E27-8BFD-88084C88AA97}" destId="{15117A7A-3F09-405F-9C89-E3A7BD46D697}" srcOrd="4" destOrd="0" presId="urn:microsoft.com/office/officeart/2005/8/layout/process5"/>
-    <dgm:cxn modelId="{7FBF95F8-5495-4BC4-AF1C-E70DC96DF421}" type="presParOf" srcId="{DC93FCDA-1676-4E27-8BFD-88084C88AA97}" destId="{5E0F91AA-BF74-42BB-920C-E463302ADE7C}" srcOrd="5" destOrd="0" presId="urn:microsoft.com/office/officeart/2005/8/layout/process5"/>
-    <dgm:cxn modelId="{DEFB9976-404C-4CFB-8253-86E027054F4A}" type="presParOf" srcId="{5E0F91AA-BF74-42BB-920C-E463302ADE7C}" destId="{D350FD60-22DA-480A-B55F-8888FB91330E}" srcOrd="0" destOrd="0" presId="urn:microsoft.com/office/officeart/2005/8/layout/process5"/>
-    <dgm:cxn modelId="{8B6E313A-DAEB-4B70-8629-72B411439292}" type="presParOf" srcId="{DC93FCDA-1676-4E27-8BFD-88084C88AA97}" destId="{D28FABF2-8E47-4287-ABF0-EAD22D2B8E86}" srcOrd="6" destOrd="0" presId="urn:microsoft.com/office/officeart/2005/8/layout/process5"/>
-    <dgm:cxn modelId="{5D408690-C875-41C7-A1E0-5CF13231AFC8}" type="presParOf" srcId="{DC93FCDA-1676-4E27-8BFD-88084C88AA97}" destId="{733AEB1A-A4E9-49C3-8324-32FAD273B427}" srcOrd="7" destOrd="0" presId="urn:microsoft.com/office/officeart/2005/8/layout/process5"/>
-    <dgm:cxn modelId="{0B7C149E-09B4-4154-89F2-DF3C93E27AC7}" type="presParOf" srcId="{733AEB1A-A4E9-49C3-8324-32FAD273B427}" destId="{C09591B7-259C-4066-AB54-342DA3D1213C}" srcOrd="0" destOrd="0" presId="urn:microsoft.com/office/officeart/2005/8/layout/process5"/>
-    <dgm:cxn modelId="{F7FE64AA-2E02-4581-AA96-03D71817AB72}" type="presParOf" srcId="{DC93FCDA-1676-4E27-8BFD-88084C88AA97}" destId="{E55C3D36-87B2-495F-BC2A-453A5389EF44}" srcOrd="8" destOrd="0" presId="urn:microsoft.com/office/officeart/2005/8/layout/process5"/>
-  </dgm:cxnLst>
-  <dgm:bg/>
-  <dgm:whole/>
-  <dgm:extLst>
-    <a:ext uri="http://schemas.microsoft.com/office/drawing/2008/diagram">
-      <dsp:dataModelExt xmlns:dsp="http://schemas.microsoft.com/office/drawing/2008/diagram" relId="rId6" minVer="http://schemas.openxmlformats.org/drawingml/2006/diagram"/>
-    </a:ext>
-  </dgm:extLst>
-</dgm:dataModel>
-</file>
-
 <file path=ppt/diagrams/drawing1.xml><?xml version="1.0" encoding="utf-8"?>
-<dsp:drawing xmlns:dgm="http://schemas.openxmlformats.org/drawingml/2006/diagram" xmlns:dsp="http://schemas.microsoft.com/office/drawing/2008/diagram" xmlns:a="http://schemas.openxmlformats.org/drawingml/2006/main">
-  <dsp:spTree>
-    <dsp:nvGrpSpPr>
-      <dsp:cNvPr id="0" name=""/>
-      <dsp:cNvGrpSpPr/>
-    </dsp:nvGrpSpPr>
-    <dsp:grpSpPr/>
-    <dsp:sp modelId="{0E9722EA-5F8B-4174-BDC7-772ACB6F8BFE}">
-      <dsp:nvSpPr>
-        <dsp:cNvPr id="0" name=""/>
-        <dsp:cNvSpPr/>
-      </dsp:nvSpPr>
-      <dsp:spPr>
-        <a:xfrm>
-          <a:off x="0" y="3844668"/>
-          <a:ext cx="10515600" cy="504610"/>
-        </a:xfrm>
-        <a:prstGeom prst="rect">
-          <a:avLst/>
-        </a:prstGeom>
-        <a:solidFill>
-          <a:schemeClr val="accent2">
-            <a:hueOff val="0"/>
-            <a:satOff val="0"/>
-            <a:lumOff val="0"/>
-            <a:alphaOff val="0"/>
-          </a:schemeClr>
-        </a:solidFill>
-        <a:ln w="12700" cap="flat" cmpd="sng" algn="ctr">
-          <a:solidFill>
-            <a:schemeClr val="lt1">
-              <a:hueOff val="0"/>
-              <a:satOff val="0"/>
-              <a:lumOff val="0"/>
-              <a:alphaOff val="0"/>
-            </a:schemeClr>
-          </a:solidFill>
-          <a:prstDash val="solid"/>
-          <a:miter lim="800000"/>
-        </a:ln>
-        <a:effectLst/>
-      </dsp:spPr>
-      <dsp:style>
-        <a:lnRef idx="2">
-          <a:scrgbClr r="0" g="0" b="0"/>
-        </a:lnRef>
-        <a:fillRef idx="1">
-          <a:scrgbClr r="0" g="0" b="0"/>
-        </a:fillRef>
-        <a:effectRef idx="0">
-          <a:scrgbClr r="0" g="0" b="0"/>
-        </a:effectRef>
-        <a:fontRef idx="minor">
-          <a:schemeClr val="lt1"/>
-        </a:fontRef>
-      </dsp:style>
-      <dsp:txBody>
-        <a:bodyPr spcFirstLastPara="0" vert="horz" wrap="square" lIns="312928" tIns="312928" rIns="312928" bIns="312928" numCol="1" spcCol="1270" anchor="ctr" anchorCtr="0">
-          <a:noAutofit/>
-        </a:bodyPr>
-        <a:lstStyle/>
-        <a:p>
-          <a:pPr marL="0" lvl="0" indent="0" algn="ctr" defTabSz="1955800">
-            <a:lnSpc>
-              <a:spcPct val="90000"/>
-            </a:lnSpc>
-            <a:spcBef>
-              <a:spcPct val="0"/>
-            </a:spcBef>
-            <a:spcAft>
-              <a:spcPct val="35000"/>
-            </a:spcAft>
-            <a:buNone/>
-          </a:pPr>
-          <a:r>
-            <a:rPr lang="de-DE" sz="4400" b="1" u="sng" kern="1200" dirty="0"/>
-            <a:t>Unternehmenserfolg</a:t>
-          </a:r>
-          <a:endParaRPr lang="de-DE" sz="1800" b="1" u="sng" kern="1200" dirty="0"/>
-        </a:p>
-      </dsp:txBody>
-      <dsp:txXfrm>
-        <a:off x="0" y="3844668"/>
-        <a:ext cx="10515600" cy="504610"/>
-      </dsp:txXfrm>
-    </dsp:sp>
-    <dsp:sp modelId="{939594A1-6FA1-4747-846A-1EA9453A6FCE}">
-      <dsp:nvSpPr>
-        <dsp:cNvPr id="0" name=""/>
-        <dsp:cNvSpPr/>
-      </dsp:nvSpPr>
-      <dsp:spPr>
-        <a:xfrm rot="10800000">
-          <a:off x="0" y="3076146"/>
-          <a:ext cx="10515600" cy="776091"/>
-        </a:xfrm>
-        <a:prstGeom prst="upArrowCallout">
-          <a:avLst/>
-        </a:prstGeom>
-        <a:solidFill>
-          <a:schemeClr val="accent2">
-            <a:hueOff val="191613"/>
-            <a:satOff val="-1095"/>
-            <a:lumOff val="1059"/>
-            <a:alphaOff val="0"/>
-          </a:schemeClr>
-        </a:solidFill>
-        <a:ln w="12700" cap="flat" cmpd="sng" algn="ctr">
-          <a:solidFill>
-            <a:schemeClr val="lt1">
-              <a:hueOff val="0"/>
-              <a:satOff val="0"/>
-              <a:lumOff val="0"/>
-              <a:alphaOff val="0"/>
-            </a:schemeClr>
-          </a:solidFill>
-          <a:prstDash val="solid"/>
-          <a:miter lim="800000"/>
-        </a:ln>
-        <a:effectLst/>
-      </dsp:spPr>
-      <dsp:style>
-        <a:lnRef idx="2">
-          <a:scrgbClr r="0" g="0" b="0"/>
-        </a:lnRef>
-        <a:fillRef idx="1">
-          <a:scrgbClr r="0" g="0" b="0"/>
-        </a:fillRef>
-        <a:effectRef idx="0">
-          <a:scrgbClr r="0" g="0" b="0"/>
-        </a:effectRef>
-        <a:fontRef idx="minor">
-          <a:schemeClr val="lt1"/>
-        </a:fontRef>
-      </dsp:style>
-      <dsp:txBody>
-        <a:bodyPr spcFirstLastPara="0" vert="horz" wrap="square" lIns="199136" tIns="199136" rIns="199136" bIns="199136" numCol="1" spcCol="1270" anchor="ctr" anchorCtr="0">
-          <a:noAutofit/>
-        </a:bodyPr>
-        <a:lstStyle/>
-        <a:p>
-          <a:pPr marL="0" lvl="0" indent="0" algn="ctr" defTabSz="1244600">
-            <a:lnSpc>
-              <a:spcPct val="90000"/>
-            </a:lnSpc>
-            <a:spcBef>
-              <a:spcPct val="0"/>
-            </a:spcBef>
-            <a:spcAft>
-              <a:spcPct val="35000"/>
-            </a:spcAft>
-            <a:buNone/>
-          </a:pPr>
-          <a:r>
-            <a:rPr lang="de-DE" sz="2800" b="1" kern="1200" dirty="0"/>
-            <a:t>Kundenwert</a:t>
-          </a:r>
-          <a:r>
-            <a:rPr lang="de-DE" sz="1800" kern="1200" dirty="0"/>
-            <a:t> </a:t>
-          </a:r>
-          <a:r>
-            <a:rPr lang="de-DE" sz="1800" b="1" kern="1200" dirty="0"/>
-            <a:t>steigt</a:t>
-          </a:r>
-        </a:p>
-      </dsp:txBody>
-      <dsp:txXfrm rot="10800000">
-        <a:off x="0" y="3076146"/>
-        <a:ext cx="10515600" cy="504281"/>
-      </dsp:txXfrm>
-    </dsp:sp>
-    <dsp:sp modelId="{BE812203-547F-49BE-958D-18E35F91568A}">
-      <dsp:nvSpPr>
-        <dsp:cNvPr id="0" name=""/>
-        <dsp:cNvSpPr/>
-      </dsp:nvSpPr>
-      <dsp:spPr>
-        <a:xfrm rot="10800000">
-          <a:off x="0" y="2307624"/>
-          <a:ext cx="10515600" cy="776091"/>
-        </a:xfrm>
-        <a:prstGeom prst="upArrowCallout">
-          <a:avLst/>
-        </a:prstGeom>
-        <a:solidFill>
-          <a:schemeClr val="accent2">
-            <a:hueOff val="383227"/>
-            <a:satOff val="-2190"/>
-            <a:lumOff val="2118"/>
-            <a:alphaOff val="0"/>
-          </a:schemeClr>
-        </a:solidFill>
-        <a:ln w="12700" cap="flat" cmpd="sng" algn="ctr">
-          <a:solidFill>
-            <a:schemeClr val="lt1">
-              <a:hueOff val="0"/>
-              <a:satOff val="0"/>
-              <a:lumOff val="0"/>
-              <a:alphaOff val="0"/>
-            </a:schemeClr>
-          </a:solidFill>
-          <a:prstDash val="solid"/>
-          <a:miter lim="800000"/>
-        </a:ln>
-        <a:effectLst/>
-      </dsp:spPr>
-      <dsp:style>
-        <a:lnRef idx="2">
-          <a:scrgbClr r="0" g="0" b="0"/>
-        </a:lnRef>
-        <a:fillRef idx="1">
-          <a:scrgbClr r="0" g="0" b="0"/>
-        </a:fillRef>
-        <a:effectRef idx="0">
-          <a:scrgbClr r="0" g="0" b="0"/>
-        </a:effectRef>
-        <a:fontRef idx="minor">
-          <a:schemeClr val="lt1"/>
-        </a:fontRef>
-      </dsp:style>
-      <dsp:txBody>
-        <a:bodyPr spcFirstLastPara="0" vert="horz" wrap="square" lIns="199136" tIns="199136" rIns="199136" bIns="199136" numCol="1" spcCol="1270" anchor="ctr" anchorCtr="0">
-          <a:noAutofit/>
-        </a:bodyPr>
-        <a:lstStyle/>
-        <a:p>
-          <a:pPr marL="0" lvl="0" indent="0" algn="ctr" defTabSz="1244600">
-            <a:lnSpc>
-              <a:spcPct val="90000"/>
-            </a:lnSpc>
-            <a:spcBef>
-              <a:spcPct val="0"/>
-            </a:spcBef>
-            <a:spcAft>
-              <a:spcPct val="35000"/>
-            </a:spcAft>
-            <a:buNone/>
-          </a:pPr>
-          <a:r>
-            <a:rPr lang="de-DE" sz="2800" b="1" kern="1200" dirty="0"/>
-            <a:t>Kundenbindung</a:t>
-          </a:r>
-          <a:endParaRPr lang="de-DE" sz="1800" b="1" kern="1200" dirty="0"/>
-        </a:p>
-      </dsp:txBody>
-      <dsp:txXfrm rot="10800000">
-        <a:off x="0" y="2307624"/>
-        <a:ext cx="10515600" cy="504281"/>
-      </dsp:txXfrm>
-    </dsp:sp>
-    <dsp:sp modelId="{8F38590C-6BBD-4813-B051-9BC1D5C68318}">
-      <dsp:nvSpPr>
-        <dsp:cNvPr id="0" name=""/>
-        <dsp:cNvSpPr/>
-      </dsp:nvSpPr>
-      <dsp:spPr>
-        <a:xfrm rot="10800000">
-          <a:off x="0" y="1539102"/>
-          <a:ext cx="10515600" cy="776091"/>
-        </a:xfrm>
-        <a:prstGeom prst="upArrowCallout">
-          <a:avLst/>
-        </a:prstGeom>
-        <a:solidFill>
-          <a:schemeClr val="accent2">
-            <a:hueOff val="574840"/>
-            <a:satOff val="-3285"/>
-            <a:lumOff val="3177"/>
-            <a:alphaOff val="0"/>
-          </a:schemeClr>
-        </a:solidFill>
-        <a:ln w="12700" cap="flat" cmpd="sng" algn="ctr">
-          <a:solidFill>
-            <a:schemeClr val="lt1">
-              <a:hueOff val="0"/>
-              <a:satOff val="0"/>
-              <a:lumOff val="0"/>
-              <a:alphaOff val="0"/>
-            </a:schemeClr>
-          </a:solidFill>
-          <a:prstDash val="solid"/>
-          <a:miter lim="800000"/>
-        </a:ln>
-        <a:effectLst/>
-      </dsp:spPr>
-      <dsp:style>
-        <a:lnRef idx="2">
-          <a:scrgbClr r="0" g="0" b="0"/>
-        </a:lnRef>
-        <a:fillRef idx="1">
-          <a:scrgbClr r="0" g="0" b="0"/>
-        </a:fillRef>
-        <a:effectRef idx="0">
-          <a:scrgbClr r="0" g="0" b="0"/>
-        </a:effectRef>
-        <a:fontRef idx="minor">
-          <a:schemeClr val="lt1"/>
-        </a:fontRef>
-      </dsp:style>
-      <dsp:txBody>
-        <a:bodyPr spcFirstLastPara="0" vert="horz" wrap="square" lIns="199136" tIns="199136" rIns="199136" bIns="199136" numCol="1" spcCol="1270" anchor="ctr" anchorCtr="0">
-          <a:noAutofit/>
-        </a:bodyPr>
-        <a:lstStyle/>
-        <a:p>
-          <a:pPr marL="0" lvl="0" indent="0" algn="ctr" defTabSz="1244600">
-            <a:lnSpc>
-              <a:spcPct val="90000"/>
-            </a:lnSpc>
-            <a:spcBef>
-              <a:spcPct val="0"/>
-            </a:spcBef>
-            <a:spcAft>
-              <a:spcPct val="35000"/>
-            </a:spcAft>
-            <a:buNone/>
-          </a:pPr>
-          <a:r>
-            <a:rPr lang="de-DE" sz="2800" b="1" kern="1200" dirty="0"/>
-            <a:t>Kundenzufriedenheit</a:t>
-          </a:r>
-          <a:r>
-            <a:rPr lang="de-DE" sz="2800" kern="1200" dirty="0"/>
-            <a:t> steigt</a:t>
-          </a:r>
-        </a:p>
-      </dsp:txBody>
-      <dsp:txXfrm rot="10800000">
-        <a:off x="0" y="1539102"/>
-        <a:ext cx="10515600" cy="504281"/>
-      </dsp:txXfrm>
-    </dsp:sp>
-    <dsp:sp modelId="{FD9E2CB3-6582-40BF-994A-BDD3471F7056}">
-      <dsp:nvSpPr>
-        <dsp:cNvPr id="0" name=""/>
-        <dsp:cNvSpPr/>
-      </dsp:nvSpPr>
-      <dsp:spPr>
-        <a:xfrm rot="10800000">
-          <a:off x="0" y="770580"/>
-          <a:ext cx="10515600" cy="776091"/>
-        </a:xfrm>
-        <a:prstGeom prst="upArrowCallout">
-          <a:avLst/>
-        </a:prstGeom>
-        <a:solidFill>
-          <a:schemeClr val="accent2">
-            <a:hueOff val="766454"/>
-            <a:satOff val="-4380"/>
-            <a:lumOff val="4236"/>
-            <a:alphaOff val="0"/>
-          </a:schemeClr>
-        </a:solidFill>
-        <a:ln w="12700" cap="flat" cmpd="sng" algn="ctr">
-          <a:solidFill>
-            <a:schemeClr val="lt1">
-              <a:hueOff val="0"/>
-              <a:satOff val="0"/>
-              <a:lumOff val="0"/>
-              <a:alphaOff val="0"/>
-            </a:schemeClr>
-          </a:solidFill>
-          <a:prstDash val="solid"/>
-          <a:miter lim="800000"/>
-        </a:ln>
-        <a:effectLst/>
-      </dsp:spPr>
-      <dsp:style>
-        <a:lnRef idx="2">
-          <a:scrgbClr r="0" g="0" b="0"/>
-        </a:lnRef>
-        <a:fillRef idx="1">
-          <a:scrgbClr r="0" g="0" b="0"/>
-        </a:fillRef>
-        <a:effectRef idx="0">
-          <a:scrgbClr r="0" g="0" b="0"/>
-        </a:effectRef>
-        <a:fontRef idx="minor">
-          <a:schemeClr val="lt1"/>
-        </a:fontRef>
-      </dsp:style>
-      <dsp:txBody>
-        <a:bodyPr spcFirstLastPara="0" vert="horz" wrap="square" lIns="199136" tIns="199136" rIns="199136" bIns="199136" numCol="1" spcCol="1270" anchor="ctr" anchorCtr="0">
-          <a:noAutofit/>
-        </a:bodyPr>
-        <a:lstStyle/>
-        <a:p>
-          <a:pPr marL="0" lvl="0" indent="0" algn="ctr" defTabSz="1244600">
-            <a:lnSpc>
-              <a:spcPct val="90000"/>
-            </a:lnSpc>
-            <a:spcBef>
-              <a:spcPct val="0"/>
-            </a:spcBef>
-            <a:spcAft>
-              <a:spcPct val="35000"/>
-            </a:spcAft>
-            <a:buNone/>
-          </a:pPr>
-          <a:r>
-            <a:rPr lang="de-DE" sz="2800" b="1" kern="1200" dirty="0"/>
-            <a:t>Produktqualität</a:t>
-          </a:r>
-          <a:r>
-            <a:rPr lang="de-DE" sz="2800" kern="1200" dirty="0"/>
-            <a:t> steigt</a:t>
-          </a:r>
-        </a:p>
-      </dsp:txBody>
-      <dsp:txXfrm rot="10800000">
-        <a:off x="0" y="770580"/>
-        <a:ext cx="10515600" cy="504281"/>
-      </dsp:txXfrm>
-    </dsp:sp>
-    <dsp:sp modelId="{6180B596-02BB-401F-9B1D-1B165D3AC997}">
-      <dsp:nvSpPr>
-        <dsp:cNvPr id="0" name=""/>
-        <dsp:cNvSpPr/>
-      </dsp:nvSpPr>
-      <dsp:spPr>
-        <a:xfrm rot="10800000">
-          <a:off x="0" y="2058"/>
-          <a:ext cx="10515600" cy="776091"/>
-        </a:xfrm>
-        <a:prstGeom prst="upArrowCallout">
-          <a:avLst/>
-        </a:prstGeom>
-        <a:solidFill>
-          <a:schemeClr val="accent2">
-            <a:hueOff val="958067"/>
-            <a:satOff val="-5475"/>
-            <a:lumOff val="5295"/>
-            <a:alphaOff val="0"/>
-          </a:schemeClr>
-        </a:solidFill>
-        <a:ln w="12700" cap="flat" cmpd="sng" algn="ctr">
-          <a:solidFill>
-            <a:schemeClr val="lt1">
-              <a:hueOff val="0"/>
-              <a:satOff val="0"/>
-              <a:lumOff val="0"/>
-              <a:alphaOff val="0"/>
-            </a:schemeClr>
-          </a:solidFill>
-          <a:prstDash val="solid"/>
-          <a:miter lim="800000"/>
-        </a:ln>
-        <a:effectLst/>
-      </dsp:spPr>
-      <dsp:style>
-        <a:lnRef idx="2">
-          <a:scrgbClr r="0" g="0" b="0"/>
-        </a:lnRef>
-        <a:fillRef idx="1">
-          <a:scrgbClr r="0" g="0" b="0"/>
-        </a:fillRef>
-        <a:effectRef idx="0">
-          <a:scrgbClr r="0" g="0" b="0"/>
-        </a:effectRef>
-        <a:fontRef idx="minor">
-          <a:schemeClr val="lt1"/>
-        </a:fontRef>
-      </dsp:style>
-      <dsp:txBody>
-        <a:bodyPr spcFirstLastPara="0" vert="horz" wrap="square" lIns="199136" tIns="199136" rIns="199136" bIns="199136" numCol="1" spcCol="1270" anchor="ctr" anchorCtr="0">
-          <a:noAutofit/>
-        </a:bodyPr>
-        <a:lstStyle/>
-        <a:p>
-          <a:pPr marL="0" lvl="0" indent="0" algn="ctr" defTabSz="1244600">
-            <a:lnSpc>
-              <a:spcPct val="90000"/>
-            </a:lnSpc>
-            <a:spcBef>
-              <a:spcPct val="0"/>
-            </a:spcBef>
-            <a:spcAft>
-              <a:spcPct val="35000"/>
-            </a:spcAft>
-            <a:buNone/>
-          </a:pPr>
-          <a:r>
-            <a:rPr lang="de-DE" sz="2800" b="1" kern="1200" dirty="0"/>
-            <a:t>Kundenorientierung</a:t>
-          </a:r>
-          <a:endParaRPr lang="de-DE" sz="1800" b="1" kern="1200" dirty="0"/>
-        </a:p>
-      </dsp:txBody>
-      <dsp:txXfrm rot="10800000">
-        <a:off x="0" y="2058"/>
-        <a:ext cx="10515600" cy="504281"/>
-      </dsp:txXfrm>
-    </dsp:sp>
-  </dsp:spTree>
-</dsp:drawing>
-</file>
-
-<file path=ppt/diagrams/drawing2.xml><?xml version="1.0" encoding="utf-8"?>
 <dsp:drawing xmlns:dgm="http://schemas.openxmlformats.org/drawingml/2006/diagram" xmlns:dsp="http://schemas.microsoft.com/office/drawing/2008/diagram" xmlns:a="http://schemas.openxmlformats.org/drawingml/2006/main">
   <dsp:spTree>
     <dsp:nvGrpSpPr>
@@ -4543,7 +4045,677 @@
 </dsp:drawing>
 </file>
 
+<file path=ppt/diagrams/drawing2.xml><?xml version="1.0" encoding="utf-8"?>
+<dsp:drawing xmlns:dgm="http://schemas.openxmlformats.org/drawingml/2006/diagram" xmlns:dsp="http://schemas.microsoft.com/office/drawing/2008/diagram" xmlns:a="http://schemas.openxmlformats.org/drawingml/2006/main">
+  <dsp:spTree>
+    <dsp:nvGrpSpPr>
+      <dsp:cNvPr id="0" name=""/>
+      <dsp:cNvGrpSpPr/>
+    </dsp:nvGrpSpPr>
+    <dsp:grpSpPr/>
+    <dsp:sp modelId="{0E9722EA-5F8B-4174-BDC7-772ACB6F8BFE}">
+      <dsp:nvSpPr>
+        <dsp:cNvPr id="0" name=""/>
+        <dsp:cNvSpPr/>
+      </dsp:nvSpPr>
+      <dsp:spPr>
+        <a:xfrm>
+          <a:off x="0" y="3844668"/>
+          <a:ext cx="10515600" cy="504610"/>
+        </a:xfrm>
+        <a:prstGeom prst="rect">
+          <a:avLst/>
+        </a:prstGeom>
+        <a:solidFill>
+          <a:schemeClr val="accent2">
+            <a:hueOff val="0"/>
+            <a:satOff val="0"/>
+            <a:lumOff val="0"/>
+            <a:alphaOff val="0"/>
+          </a:schemeClr>
+        </a:solidFill>
+        <a:ln w="12700" cap="flat" cmpd="sng" algn="ctr">
+          <a:solidFill>
+            <a:schemeClr val="lt1">
+              <a:hueOff val="0"/>
+              <a:satOff val="0"/>
+              <a:lumOff val="0"/>
+              <a:alphaOff val="0"/>
+            </a:schemeClr>
+          </a:solidFill>
+          <a:prstDash val="solid"/>
+          <a:miter lim="800000"/>
+        </a:ln>
+        <a:effectLst/>
+      </dsp:spPr>
+      <dsp:style>
+        <a:lnRef idx="2">
+          <a:scrgbClr r="0" g="0" b="0"/>
+        </a:lnRef>
+        <a:fillRef idx="1">
+          <a:scrgbClr r="0" g="0" b="0"/>
+        </a:fillRef>
+        <a:effectRef idx="0">
+          <a:scrgbClr r="0" g="0" b="0"/>
+        </a:effectRef>
+        <a:fontRef idx="minor">
+          <a:schemeClr val="lt1"/>
+        </a:fontRef>
+      </dsp:style>
+      <dsp:txBody>
+        <a:bodyPr spcFirstLastPara="0" vert="horz" wrap="square" lIns="312928" tIns="312928" rIns="312928" bIns="312928" numCol="1" spcCol="1270" anchor="ctr" anchorCtr="0">
+          <a:noAutofit/>
+        </a:bodyPr>
+        <a:lstStyle/>
+        <a:p>
+          <a:pPr marL="0" lvl="0" indent="0" algn="ctr" defTabSz="1955800">
+            <a:lnSpc>
+              <a:spcPct val="90000"/>
+            </a:lnSpc>
+            <a:spcBef>
+              <a:spcPct val="0"/>
+            </a:spcBef>
+            <a:spcAft>
+              <a:spcPct val="35000"/>
+            </a:spcAft>
+            <a:buNone/>
+          </a:pPr>
+          <a:r>
+            <a:rPr lang="de-DE" sz="4400" b="1" u="sng" kern="1200" dirty="0"/>
+            <a:t>Unternehmenserfolg</a:t>
+          </a:r>
+          <a:endParaRPr lang="de-DE" sz="1800" b="1" u="sng" kern="1200" dirty="0"/>
+        </a:p>
+      </dsp:txBody>
+      <dsp:txXfrm>
+        <a:off x="0" y="3844668"/>
+        <a:ext cx="10515600" cy="504610"/>
+      </dsp:txXfrm>
+    </dsp:sp>
+    <dsp:sp modelId="{939594A1-6FA1-4747-846A-1EA9453A6FCE}">
+      <dsp:nvSpPr>
+        <dsp:cNvPr id="0" name=""/>
+        <dsp:cNvSpPr/>
+      </dsp:nvSpPr>
+      <dsp:spPr>
+        <a:xfrm rot="10800000">
+          <a:off x="0" y="3076146"/>
+          <a:ext cx="10515600" cy="776091"/>
+        </a:xfrm>
+        <a:prstGeom prst="upArrowCallout">
+          <a:avLst/>
+        </a:prstGeom>
+        <a:solidFill>
+          <a:schemeClr val="accent2">
+            <a:hueOff val="191613"/>
+            <a:satOff val="-1095"/>
+            <a:lumOff val="1059"/>
+            <a:alphaOff val="0"/>
+          </a:schemeClr>
+        </a:solidFill>
+        <a:ln w="12700" cap="flat" cmpd="sng" algn="ctr">
+          <a:solidFill>
+            <a:schemeClr val="lt1">
+              <a:hueOff val="0"/>
+              <a:satOff val="0"/>
+              <a:lumOff val="0"/>
+              <a:alphaOff val="0"/>
+            </a:schemeClr>
+          </a:solidFill>
+          <a:prstDash val="solid"/>
+          <a:miter lim="800000"/>
+        </a:ln>
+        <a:effectLst/>
+      </dsp:spPr>
+      <dsp:style>
+        <a:lnRef idx="2">
+          <a:scrgbClr r="0" g="0" b="0"/>
+        </a:lnRef>
+        <a:fillRef idx="1">
+          <a:scrgbClr r="0" g="0" b="0"/>
+        </a:fillRef>
+        <a:effectRef idx="0">
+          <a:scrgbClr r="0" g="0" b="0"/>
+        </a:effectRef>
+        <a:fontRef idx="minor">
+          <a:schemeClr val="lt1"/>
+        </a:fontRef>
+      </dsp:style>
+      <dsp:txBody>
+        <a:bodyPr spcFirstLastPara="0" vert="horz" wrap="square" lIns="199136" tIns="199136" rIns="199136" bIns="199136" numCol="1" spcCol="1270" anchor="ctr" anchorCtr="0">
+          <a:noAutofit/>
+        </a:bodyPr>
+        <a:lstStyle/>
+        <a:p>
+          <a:pPr marL="0" lvl="0" indent="0" algn="ctr" defTabSz="1244600">
+            <a:lnSpc>
+              <a:spcPct val="90000"/>
+            </a:lnSpc>
+            <a:spcBef>
+              <a:spcPct val="0"/>
+            </a:spcBef>
+            <a:spcAft>
+              <a:spcPct val="35000"/>
+            </a:spcAft>
+            <a:buNone/>
+          </a:pPr>
+          <a:r>
+            <a:rPr lang="de-DE" sz="2800" b="1" kern="1200" dirty="0"/>
+            <a:t>Kundenwert</a:t>
+          </a:r>
+          <a:r>
+            <a:rPr lang="de-DE" sz="1800" kern="1200" dirty="0"/>
+            <a:t> </a:t>
+          </a:r>
+          <a:r>
+            <a:rPr lang="de-DE" sz="1800" b="1" kern="1200" dirty="0"/>
+            <a:t>steigt</a:t>
+          </a:r>
+        </a:p>
+      </dsp:txBody>
+      <dsp:txXfrm rot="10800000">
+        <a:off x="0" y="3076146"/>
+        <a:ext cx="10515600" cy="504281"/>
+      </dsp:txXfrm>
+    </dsp:sp>
+    <dsp:sp modelId="{BE812203-547F-49BE-958D-18E35F91568A}">
+      <dsp:nvSpPr>
+        <dsp:cNvPr id="0" name=""/>
+        <dsp:cNvSpPr/>
+      </dsp:nvSpPr>
+      <dsp:spPr>
+        <a:xfrm rot="10800000">
+          <a:off x="0" y="2307624"/>
+          <a:ext cx="10515600" cy="776091"/>
+        </a:xfrm>
+        <a:prstGeom prst="upArrowCallout">
+          <a:avLst/>
+        </a:prstGeom>
+        <a:solidFill>
+          <a:schemeClr val="accent2">
+            <a:hueOff val="383227"/>
+            <a:satOff val="-2190"/>
+            <a:lumOff val="2118"/>
+            <a:alphaOff val="0"/>
+          </a:schemeClr>
+        </a:solidFill>
+        <a:ln w="12700" cap="flat" cmpd="sng" algn="ctr">
+          <a:solidFill>
+            <a:schemeClr val="lt1">
+              <a:hueOff val="0"/>
+              <a:satOff val="0"/>
+              <a:lumOff val="0"/>
+              <a:alphaOff val="0"/>
+            </a:schemeClr>
+          </a:solidFill>
+          <a:prstDash val="solid"/>
+          <a:miter lim="800000"/>
+        </a:ln>
+        <a:effectLst/>
+      </dsp:spPr>
+      <dsp:style>
+        <a:lnRef idx="2">
+          <a:scrgbClr r="0" g="0" b="0"/>
+        </a:lnRef>
+        <a:fillRef idx="1">
+          <a:scrgbClr r="0" g="0" b="0"/>
+        </a:fillRef>
+        <a:effectRef idx="0">
+          <a:scrgbClr r="0" g="0" b="0"/>
+        </a:effectRef>
+        <a:fontRef idx="minor">
+          <a:schemeClr val="lt1"/>
+        </a:fontRef>
+      </dsp:style>
+      <dsp:txBody>
+        <a:bodyPr spcFirstLastPara="0" vert="horz" wrap="square" lIns="199136" tIns="199136" rIns="199136" bIns="199136" numCol="1" spcCol="1270" anchor="ctr" anchorCtr="0">
+          <a:noAutofit/>
+        </a:bodyPr>
+        <a:lstStyle/>
+        <a:p>
+          <a:pPr marL="0" lvl="0" indent="0" algn="ctr" defTabSz="1244600">
+            <a:lnSpc>
+              <a:spcPct val="90000"/>
+            </a:lnSpc>
+            <a:spcBef>
+              <a:spcPct val="0"/>
+            </a:spcBef>
+            <a:spcAft>
+              <a:spcPct val="35000"/>
+            </a:spcAft>
+            <a:buNone/>
+          </a:pPr>
+          <a:r>
+            <a:rPr lang="de-DE" sz="2800" b="1" kern="1200" dirty="0"/>
+            <a:t>Kundenbindung</a:t>
+          </a:r>
+          <a:endParaRPr lang="de-DE" sz="1800" b="1" kern="1200" dirty="0"/>
+        </a:p>
+      </dsp:txBody>
+      <dsp:txXfrm rot="10800000">
+        <a:off x="0" y="2307624"/>
+        <a:ext cx="10515600" cy="504281"/>
+      </dsp:txXfrm>
+    </dsp:sp>
+    <dsp:sp modelId="{8F38590C-6BBD-4813-B051-9BC1D5C68318}">
+      <dsp:nvSpPr>
+        <dsp:cNvPr id="0" name=""/>
+        <dsp:cNvSpPr/>
+      </dsp:nvSpPr>
+      <dsp:spPr>
+        <a:xfrm rot="10800000">
+          <a:off x="0" y="1539102"/>
+          <a:ext cx="10515600" cy="776091"/>
+        </a:xfrm>
+        <a:prstGeom prst="upArrowCallout">
+          <a:avLst/>
+        </a:prstGeom>
+        <a:solidFill>
+          <a:schemeClr val="accent2">
+            <a:hueOff val="574840"/>
+            <a:satOff val="-3285"/>
+            <a:lumOff val="3177"/>
+            <a:alphaOff val="0"/>
+          </a:schemeClr>
+        </a:solidFill>
+        <a:ln w="12700" cap="flat" cmpd="sng" algn="ctr">
+          <a:solidFill>
+            <a:schemeClr val="lt1">
+              <a:hueOff val="0"/>
+              <a:satOff val="0"/>
+              <a:lumOff val="0"/>
+              <a:alphaOff val="0"/>
+            </a:schemeClr>
+          </a:solidFill>
+          <a:prstDash val="solid"/>
+          <a:miter lim="800000"/>
+        </a:ln>
+        <a:effectLst/>
+      </dsp:spPr>
+      <dsp:style>
+        <a:lnRef idx="2">
+          <a:scrgbClr r="0" g="0" b="0"/>
+        </a:lnRef>
+        <a:fillRef idx="1">
+          <a:scrgbClr r="0" g="0" b="0"/>
+        </a:fillRef>
+        <a:effectRef idx="0">
+          <a:scrgbClr r="0" g="0" b="0"/>
+        </a:effectRef>
+        <a:fontRef idx="minor">
+          <a:schemeClr val="lt1"/>
+        </a:fontRef>
+      </dsp:style>
+      <dsp:txBody>
+        <a:bodyPr spcFirstLastPara="0" vert="horz" wrap="square" lIns="199136" tIns="199136" rIns="199136" bIns="199136" numCol="1" spcCol="1270" anchor="ctr" anchorCtr="0">
+          <a:noAutofit/>
+        </a:bodyPr>
+        <a:lstStyle/>
+        <a:p>
+          <a:pPr marL="0" lvl="0" indent="0" algn="ctr" defTabSz="1244600">
+            <a:lnSpc>
+              <a:spcPct val="90000"/>
+            </a:lnSpc>
+            <a:spcBef>
+              <a:spcPct val="0"/>
+            </a:spcBef>
+            <a:spcAft>
+              <a:spcPct val="35000"/>
+            </a:spcAft>
+            <a:buNone/>
+          </a:pPr>
+          <a:r>
+            <a:rPr lang="de-DE" sz="2800" b="1" kern="1200" dirty="0"/>
+            <a:t>Kundenzufriedenheit</a:t>
+          </a:r>
+          <a:r>
+            <a:rPr lang="de-DE" sz="2800" kern="1200" dirty="0"/>
+            <a:t> steigt</a:t>
+          </a:r>
+        </a:p>
+      </dsp:txBody>
+      <dsp:txXfrm rot="10800000">
+        <a:off x="0" y="1539102"/>
+        <a:ext cx="10515600" cy="504281"/>
+      </dsp:txXfrm>
+    </dsp:sp>
+    <dsp:sp modelId="{FD9E2CB3-6582-40BF-994A-BDD3471F7056}">
+      <dsp:nvSpPr>
+        <dsp:cNvPr id="0" name=""/>
+        <dsp:cNvSpPr/>
+      </dsp:nvSpPr>
+      <dsp:spPr>
+        <a:xfrm rot="10800000">
+          <a:off x="0" y="770580"/>
+          <a:ext cx="10515600" cy="776091"/>
+        </a:xfrm>
+        <a:prstGeom prst="upArrowCallout">
+          <a:avLst/>
+        </a:prstGeom>
+        <a:solidFill>
+          <a:schemeClr val="accent2">
+            <a:hueOff val="766454"/>
+            <a:satOff val="-4380"/>
+            <a:lumOff val="4236"/>
+            <a:alphaOff val="0"/>
+          </a:schemeClr>
+        </a:solidFill>
+        <a:ln w="12700" cap="flat" cmpd="sng" algn="ctr">
+          <a:solidFill>
+            <a:schemeClr val="lt1">
+              <a:hueOff val="0"/>
+              <a:satOff val="0"/>
+              <a:lumOff val="0"/>
+              <a:alphaOff val="0"/>
+            </a:schemeClr>
+          </a:solidFill>
+          <a:prstDash val="solid"/>
+          <a:miter lim="800000"/>
+        </a:ln>
+        <a:effectLst/>
+      </dsp:spPr>
+      <dsp:style>
+        <a:lnRef idx="2">
+          <a:scrgbClr r="0" g="0" b="0"/>
+        </a:lnRef>
+        <a:fillRef idx="1">
+          <a:scrgbClr r="0" g="0" b="0"/>
+        </a:fillRef>
+        <a:effectRef idx="0">
+          <a:scrgbClr r="0" g="0" b="0"/>
+        </a:effectRef>
+        <a:fontRef idx="minor">
+          <a:schemeClr val="lt1"/>
+        </a:fontRef>
+      </dsp:style>
+      <dsp:txBody>
+        <a:bodyPr spcFirstLastPara="0" vert="horz" wrap="square" lIns="199136" tIns="199136" rIns="199136" bIns="199136" numCol="1" spcCol="1270" anchor="ctr" anchorCtr="0">
+          <a:noAutofit/>
+        </a:bodyPr>
+        <a:lstStyle/>
+        <a:p>
+          <a:pPr marL="0" lvl="0" indent="0" algn="ctr" defTabSz="1244600">
+            <a:lnSpc>
+              <a:spcPct val="90000"/>
+            </a:lnSpc>
+            <a:spcBef>
+              <a:spcPct val="0"/>
+            </a:spcBef>
+            <a:spcAft>
+              <a:spcPct val="35000"/>
+            </a:spcAft>
+            <a:buNone/>
+          </a:pPr>
+          <a:r>
+            <a:rPr lang="de-DE" sz="2800" b="1" kern="1200" dirty="0"/>
+            <a:t>Produktqualität</a:t>
+          </a:r>
+          <a:r>
+            <a:rPr lang="de-DE" sz="2800" kern="1200" dirty="0"/>
+            <a:t> steigt</a:t>
+          </a:r>
+        </a:p>
+      </dsp:txBody>
+      <dsp:txXfrm rot="10800000">
+        <a:off x="0" y="770580"/>
+        <a:ext cx="10515600" cy="504281"/>
+      </dsp:txXfrm>
+    </dsp:sp>
+    <dsp:sp modelId="{6180B596-02BB-401F-9B1D-1B165D3AC997}">
+      <dsp:nvSpPr>
+        <dsp:cNvPr id="0" name=""/>
+        <dsp:cNvSpPr/>
+      </dsp:nvSpPr>
+      <dsp:spPr>
+        <a:xfrm rot="10800000">
+          <a:off x="0" y="2058"/>
+          <a:ext cx="10515600" cy="776091"/>
+        </a:xfrm>
+        <a:prstGeom prst="upArrowCallout">
+          <a:avLst/>
+        </a:prstGeom>
+        <a:solidFill>
+          <a:schemeClr val="accent2">
+            <a:hueOff val="958067"/>
+            <a:satOff val="-5475"/>
+            <a:lumOff val="5295"/>
+            <a:alphaOff val="0"/>
+          </a:schemeClr>
+        </a:solidFill>
+        <a:ln w="12700" cap="flat" cmpd="sng" algn="ctr">
+          <a:solidFill>
+            <a:schemeClr val="lt1">
+              <a:hueOff val="0"/>
+              <a:satOff val="0"/>
+              <a:lumOff val="0"/>
+              <a:alphaOff val="0"/>
+            </a:schemeClr>
+          </a:solidFill>
+          <a:prstDash val="solid"/>
+          <a:miter lim="800000"/>
+        </a:ln>
+        <a:effectLst/>
+      </dsp:spPr>
+      <dsp:style>
+        <a:lnRef idx="2">
+          <a:scrgbClr r="0" g="0" b="0"/>
+        </a:lnRef>
+        <a:fillRef idx="1">
+          <a:scrgbClr r="0" g="0" b="0"/>
+        </a:fillRef>
+        <a:effectRef idx="0">
+          <a:scrgbClr r="0" g="0" b="0"/>
+        </a:effectRef>
+        <a:fontRef idx="minor">
+          <a:schemeClr val="lt1"/>
+        </a:fontRef>
+      </dsp:style>
+      <dsp:txBody>
+        <a:bodyPr spcFirstLastPara="0" vert="horz" wrap="square" lIns="199136" tIns="199136" rIns="199136" bIns="199136" numCol="1" spcCol="1270" anchor="ctr" anchorCtr="0">
+          <a:noAutofit/>
+        </a:bodyPr>
+        <a:lstStyle/>
+        <a:p>
+          <a:pPr marL="0" lvl="0" indent="0" algn="ctr" defTabSz="1244600">
+            <a:lnSpc>
+              <a:spcPct val="90000"/>
+            </a:lnSpc>
+            <a:spcBef>
+              <a:spcPct val="0"/>
+            </a:spcBef>
+            <a:spcAft>
+              <a:spcPct val="35000"/>
+            </a:spcAft>
+            <a:buNone/>
+          </a:pPr>
+          <a:r>
+            <a:rPr lang="de-DE" sz="2800" b="1" kern="1200" dirty="0"/>
+            <a:t>Kundenorientierung</a:t>
+          </a:r>
+          <a:endParaRPr lang="de-DE" sz="1800" b="1" kern="1200" dirty="0"/>
+        </a:p>
+      </dsp:txBody>
+      <dsp:txXfrm rot="10800000">
+        <a:off x="0" y="2058"/>
+        <a:ext cx="10515600" cy="504281"/>
+      </dsp:txXfrm>
+    </dsp:sp>
+  </dsp:spTree>
+</dsp:drawing>
+</file>
+
 <file path=ppt/diagrams/layout1.xml><?xml version="1.0" encoding="utf-8"?>
+<dgm:layoutDef xmlns:dgm="http://schemas.openxmlformats.org/drawingml/2006/diagram" xmlns:a="http://schemas.openxmlformats.org/drawingml/2006/main" uniqueId="urn:microsoft.com/office/officeart/2005/8/layout/process5">
+  <dgm:title val=""/>
+  <dgm:desc val=""/>
+  <dgm:catLst>
+    <dgm:cat type="process" pri="17000"/>
+  </dgm:catLst>
+  <dgm:sampData>
+    <dgm:dataModel>
+      <dgm:ptLst>
+        <dgm:pt modelId="0" type="doc"/>
+        <dgm:pt modelId="1">
+          <dgm:prSet phldr="1"/>
+        </dgm:pt>
+        <dgm:pt modelId="2">
+          <dgm:prSet phldr="1"/>
+        </dgm:pt>
+        <dgm:pt modelId="3">
+          <dgm:prSet phldr="1"/>
+        </dgm:pt>
+        <dgm:pt modelId="4">
+          <dgm:prSet phldr="1"/>
+        </dgm:pt>
+        <dgm:pt modelId="5">
+          <dgm:prSet phldr="1"/>
+        </dgm:pt>
+      </dgm:ptLst>
+      <dgm:cxnLst>
+        <dgm:cxn modelId="7" srcId="0" destId="1" srcOrd="0" destOrd="0"/>
+        <dgm:cxn modelId="8" srcId="0" destId="2" srcOrd="1" destOrd="0"/>
+        <dgm:cxn modelId="9" srcId="0" destId="3" srcOrd="2" destOrd="0"/>
+        <dgm:cxn modelId="10" srcId="0" destId="4" srcOrd="3" destOrd="0"/>
+        <dgm:cxn modelId="11" srcId="0" destId="5" srcOrd="4" destOrd="0"/>
+      </dgm:cxnLst>
+      <dgm:bg/>
+      <dgm:whole/>
+    </dgm:dataModel>
+  </dgm:sampData>
+  <dgm:styleData>
+    <dgm:dataModel>
+      <dgm:ptLst>
+        <dgm:pt modelId="0" type="doc"/>
+        <dgm:pt modelId="1"/>
+        <dgm:pt modelId="2"/>
+      </dgm:ptLst>
+      <dgm:cxnLst>
+        <dgm:cxn modelId="3" srcId="0" destId="1" srcOrd="0" destOrd="0"/>
+        <dgm:cxn modelId="4" srcId="0" destId="2" srcOrd="1" destOrd="0"/>
+      </dgm:cxnLst>
+      <dgm:bg/>
+      <dgm:whole/>
+    </dgm:dataModel>
+  </dgm:styleData>
+  <dgm:clrData>
+    <dgm:dataModel>
+      <dgm:ptLst>
+        <dgm:pt modelId="0" type="doc"/>
+        <dgm:pt modelId="1"/>
+        <dgm:pt modelId="2"/>
+        <dgm:pt modelId="3"/>
+        <dgm:pt modelId="4"/>
+      </dgm:ptLst>
+      <dgm:cxnLst>
+        <dgm:cxn modelId="5" srcId="0" destId="1" srcOrd="0" destOrd="0"/>
+        <dgm:cxn modelId="6" srcId="0" destId="2" srcOrd="1" destOrd="0"/>
+        <dgm:cxn modelId="7" srcId="0" destId="3" srcOrd="2" destOrd="0"/>
+        <dgm:cxn modelId="8" srcId="0" destId="4" srcOrd="3" destOrd="0"/>
+      </dgm:cxnLst>
+      <dgm:bg/>
+      <dgm:whole/>
+    </dgm:dataModel>
+  </dgm:clrData>
+  <dgm:layoutNode name="diagram">
+    <dgm:varLst>
+      <dgm:dir/>
+      <dgm:resizeHandles val="exact"/>
+    </dgm:varLst>
+    <dgm:choose name="Name0">
+      <dgm:if name="Name1" axis="self" func="var" arg="dir" op="equ" val="norm">
+        <dgm:alg type="snake">
+          <dgm:param type="grDir" val="tL"/>
+          <dgm:param type="flowDir" val="row"/>
+          <dgm:param type="contDir" val="revDir"/>
+          <dgm:param type="bkpt" val="endCnv"/>
+        </dgm:alg>
+      </dgm:if>
+      <dgm:else name="Name2">
+        <dgm:alg type="snake">
+          <dgm:param type="grDir" val="tR"/>
+          <dgm:param type="flowDir" val="row"/>
+          <dgm:param type="contDir" val="revDir"/>
+          <dgm:param type="bkpt" val="endCnv"/>
+        </dgm:alg>
+      </dgm:else>
+    </dgm:choose>
+    <dgm:shape xmlns:r="http://schemas.openxmlformats.org/officeDocument/2006/relationships" r:blip="">
+      <dgm:adjLst/>
+    </dgm:shape>
+    <dgm:presOf/>
+    <dgm:constrLst>
+      <dgm:constr type="w" for="ch" ptType="node" refType="w"/>
+      <dgm:constr type="w" for="ch" forName="sibTrans" refType="w" refFor="ch" refPtType="node" op="equ" fact="0.4"/>
+      <dgm:constr type="sp" refType="w" refFor="ch" refForName="sibTrans" op="equ"/>
+      <dgm:constr type="primFontSz" for="ch" ptType="node" op="equ" val="65"/>
+      <dgm:constr type="primFontSz" for="des" forName="connectorText" op="equ" val="55"/>
+      <dgm:constr type="primFontSz" for="des" forName="connectorText" refType="primFontSz" refFor="ch" refPtType="node" op="lte" fact="0.8"/>
+    </dgm:constrLst>
+    <dgm:ruleLst/>
+    <dgm:forEach name="nodesForEach" axis="ch" ptType="node">
+      <dgm:layoutNode name="node">
+        <dgm:varLst>
+          <dgm:bulletEnabled val="1"/>
+        </dgm:varLst>
+        <dgm:alg type="tx"/>
+        <dgm:shape xmlns:r="http://schemas.openxmlformats.org/officeDocument/2006/relationships" type="roundRect" r:blip="">
+          <dgm:adjLst>
+            <dgm:adj idx="1" val="0.1"/>
+          </dgm:adjLst>
+        </dgm:shape>
+        <dgm:presOf axis="desOrSelf" ptType="node"/>
+        <dgm:constrLst>
+          <dgm:constr type="h" refType="w" fact="0.6"/>
+          <dgm:constr type="tMarg" refType="primFontSz" fact="0.3"/>
+          <dgm:constr type="bMarg" refType="primFontSz" fact="0.3"/>
+          <dgm:constr type="lMarg" refType="primFontSz" fact="0.3"/>
+          <dgm:constr type="rMarg" refType="primFontSz" fact="0.3"/>
+        </dgm:constrLst>
+        <dgm:ruleLst>
+          <dgm:rule type="primFontSz" val="5" fact="NaN" max="NaN"/>
+        </dgm:ruleLst>
+      </dgm:layoutNode>
+      <dgm:forEach name="sibTransForEach" axis="followSib" ptType="sibTrans" cnt="1">
+        <dgm:layoutNode name="sibTrans">
+          <dgm:alg type="conn">
+            <dgm:param type="begPts" val="auto"/>
+            <dgm:param type="endPts" val="auto"/>
+          </dgm:alg>
+          <dgm:shape xmlns:r="http://schemas.openxmlformats.org/officeDocument/2006/relationships" type="conn" r:blip="">
+            <dgm:adjLst/>
+          </dgm:shape>
+          <dgm:presOf axis="self"/>
+          <dgm:constrLst>
+            <dgm:constr type="h" refType="w" fact="0.62"/>
+            <dgm:constr type="connDist"/>
+          </dgm:constrLst>
+          <dgm:ruleLst/>
+          <dgm:layoutNode name="connectorText">
+            <dgm:alg type="tx">
+              <dgm:param type="autoTxRot" val="upr"/>
+            </dgm:alg>
+            <dgm:shape xmlns:r="http://schemas.openxmlformats.org/officeDocument/2006/relationships" type="conn" r:blip="" hideGeom="1">
+              <dgm:adjLst/>
+            </dgm:shape>
+            <dgm:presOf axis="self"/>
+            <dgm:constrLst>
+              <dgm:constr type="lMarg"/>
+              <dgm:constr type="rMarg"/>
+              <dgm:constr type="tMarg"/>
+              <dgm:constr type="bMarg"/>
+            </dgm:constrLst>
+            <dgm:ruleLst>
+              <dgm:rule type="primFontSz" val="5" fact="NaN" max="NaN"/>
+            </dgm:ruleLst>
+          </dgm:layoutNode>
+        </dgm:layoutNode>
+      </dgm:forEach>
+    </dgm:forEach>
+  </dgm:layoutNode>
+</dgm:layoutDef>
+</file>
+
+<file path=ppt/diagrams/layout2.xml><?xml version="1.0" encoding="utf-8"?>
 <dgm:layoutDef xmlns:dgm="http://schemas.openxmlformats.org/drawingml/2006/diagram" xmlns:a="http://schemas.openxmlformats.org/drawingml/2006/main" uniqueId="urn:microsoft.com/office/officeart/2005/8/layout/process4">
   <dgm:title val=""/>
   <dgm:desc val=""/>
@@ -4896,177 +5068,6 @@
 </dgm:layoutDef>
 </file>
 
-<file path=ppt/diagrams/layout2.xml><?xml version="1.0" encoding="utf-8"?>
-<dgm:layoutDef xmlns:dgm="http://schemas.openxmlformats.org/drawingml/2006/diagram" xmlns:a="http://schemas.openxmlformats.org/drawingml/2006/main" uniqueId="urn:microsoft.com/office/officeart/2005/8/layout/process5">
-  <dgm:title val=""/>
-  <dgm:desc val=""/>
-  <dgm:catLst>
-    <dgm:cat type="process" pri="17000"/>
-  </dgm:catLst>
-  <dgm:sampData>
-    <dgm:dataModel>
-      <dgm:ptLst>
-        <dgm:pt modelId="0" type="doc"/>
-        <dgm:pt modelId="1">
-          <dgm:prSet phldr="1"/>
-        </dgm:pt>
-        <dgm:pt modelId="2">
-          <dgm:prSet phldr="1"/>
-        </dgm:pt>
-        <dgm:pt modelId="3">
-          <dgm:prSet phldr="1"/>
-        </dgm:pt>
-        <dgm:pt modelId="4">
-          <dgm:prSet phldr="1"/>
-        </dgm:pt>
-        <dgm:pt modelId="5">
-          <dgm:prSet phldr="1"/>
-        </dgm:pt>
-      </dgm:ptLst>
-      <dgm:cxnLst>
-        <dgm:cxn modelId="7" srcId="0" destId="1" srcOrd="0" destOrd="0"/>
-        <dgm:cxn modelId="8" srcId="0" destId="2" srcOrd="1" destOrd="0"/>
-        <dgm:cxn modelId="9" srcId="0" destId="3" srcOrd="2" destOrd="0"/>
-        <dgm:cxn modelId="10" srcId="0" destId="4" srcOrd="3" destOrd="0"/>
-        <dgm:cxn modelId="11" srcId="0" destId="5" srcOrd="4" destOrd="0"/>
-      </dgm:cxnLst>
-      <dgm:bg/>
-      <dgm:whole/>
-    </dgm:dataModel>
-  </dgm:sampData>
-  <dgm:styleData>
-    <dgm:dataModel>
-      <dgm:ptLst>
-        <dgm:pt modelId="0" type="doc"/>
-        <dgm:pt modelId="1"/>
-        <dgm:pt modelId="2"/>
-      </dgm:ptLst>
-      <dgm:cxnLst>
-        <dgm:cxn modelId="3" srcId="0" destId="1" srcOrd="0" destOrd="0"/>
-        <dgm:cxn modelId="4" srcId="0" destId="2" srcOrd="1" destOrd="0"/>
-      </dgm:cxnLst>
-      <dgm:bg/>
-      <dgm:whole/>
-    </dgm:dataModel>
-  </dgm:styleData>
-  <dgm:clrData>
-    <dgm:dataModel>
-      <dgm:ptLst>
-        <dgm:pt modelId="0" type="doc"/>
-        <dgm:pt modelId="1"/>
-        <dgm:pt modelId="2"/>
-        <dgm:pt modelId="3"/>
-        <dgm:pt modelId="4"/>
-      </dgm:ptLst>
-      <dgm:cxnLst>
-        <dgm:cxn modelId="5" srcId="0" destId="1" srcOrd="0" destOrd="0"/>
-        <dgm:cxn modelId="6" srcId="0" destId="2" srcOrd="1" destOrd="0"/>
-        <dgm:cxn modelId="7" srcId="0" destId="3" srcOrd="2" destOrd="0"/>
-        <dgm:cxn modelId="8" srcId="0" destId="4" srcOrd="3" destOrd="0"/>
-      </dgm:cxnLst>
-      <dgm:bg/>
-      <dgm:whole/>
-    </dgm:dataModel>
-  </dgm:clrData>
-  <dgm:layoutNode name="diagram">
-    <dgm:varLst>
-      <dgm:dir/>
-      <dgm:resizeHandles val="exact"/>
-    </dgm:varLst>
-    <dgm:choose name="Name0">
-      <dgm:if name="Name1" axis="self" func="var" arg="dir" op="equ" val="norm">
-        <dgm:alg type="snake">
-          <dgm:param type="grDir" val="tL"/>
-          <dgm:param type="flowDir" val="row"/>
-          <dgm:param type="contDir" val="revDir"/>
-          <dgm:param type="bkpt" val="endCnv"/>
-        </dgm:alg>
-      </dgm:if>
-      <dgm:else name="Name2">
-        <dgm:alg type="snake">
-          <dgm:param type="grDir" val="tR"/>
-          <dgm:param type="flowDir" val="row"/>
-          <dgm:param type="contDir" val="revDir"/>
-          <dgm:param type="bkpt" val="endCnv"/>
-        </dgm:alg>
-      </dgm:else>
-    </dgm:choose>
-    <dgm:shape xmlns:r="http://schemas.openxmlformats.org/officeDocument/2006/relationships" r:blip="">
-      <dgm:adjLst/>
-    </dgm:shape>
-    <dgm:presOf/>
-    <dgm:constrLst>
-      <dgm:constr type="w" for="ch" ptType="node" refType="w"/>
-      <dgm:constr type="w" for="ch" forName="sibTrans" refType="w" refFor="ch" refPtType="node" op="equ" fact="0.4"/>
-      <dgm:constr type="sp" refType="w" refFor="ch" refForName="sibTrans" op="equ"/>
-      <dgm:constr type="primFontSz" for="ch" ptType="node" op="equ" val="65"/>
-      <dgm:constr type="primFontSz" for="des" forName="connectorText" op="equ" val="55"/>
-      <dgm:constr type="primFontSz" for="des" forName="connectorText" refType="primFontSz" refFor="ch" refPtType="node" op="lte" fact="0.8"/>
-    </dgm:constrLst>
-    <dgm:ruleLst/>
-    <dgm:forEach name="nodesForEach" axis="ch" ptType="node">
-      <dgm:layoutNode name="node">
-        <dgm:varLst>
-          <dgm:bulletEnabled val="1"/>
-        </dgm:varLst>
-        <dgm:alg type="tx"/>
-        <dgm:shape xmlns:r="http://schemas.openxmlformats.org/officeDocument/2006/relationships" type="roundRect" r:blip="">
-          <dgm:adjLst>
-            <dgm:adj idx="1" val="0.1"/>
-          </dgm:adjLst>
-        </dgm:shape>
-        <dgm:presOf axis="desOrSelf" ptType="node"/>
-        <dgm:constrLst>
-          <dgm:constr type="h" refType="w" fact="0.6"/>
-          <dgm:constr type="tMarg" refType="primFontSz" fact="0.3"/>
-          <dgm:constr type="bMarg" refType="primFontSz" fact="0.3"/>
-          <dgm:constr type="lMarg" refType="primFontSz" fact="0.3"/>
-          <dgm:constr type="rMarg" refType="primFontSz" fact="0.3"/>
-        </dgm:constrLst>
-        <dgm:ruleLst>
-          <dgm:rule type="primFontSz" val="5" fact="NaN" max="NaN"/>
-        </dgm:ruleLst>
-      </dgm:layoutNode>
-      <dgm:forEach name="sibTransForEach" axis="followSib" ptType="sibTrans" cnt="1">
-        <dgm:layoutNode name="sibTrans">
-          <dgm:alg type="conn">
-            <dgm:param type="begPts" val="auto"/>
-            <dgm:param type="endPts" val="auto"/>
-          </dgm:alg>
-          <dgm:shape xmlns:r="http://schemas.openxmlformats.org/officeDocument/2006/relationships" type="conn" r:blip="">
-            <dgm:adjLst/>
-          </dgm:shape>
-          <dgm:presOf axis="self"/>
-          <dgm:constrLst>
-            <dgm:constr type="h" refType="w" fact="0.62"/>
-            <dgm:constr type="connDist"/>
-          </dgm:constrLst>
-          <dgm:ruleLst/>
-          <dgm:layoutNode name="connectorText">
-            <dgm:alg type="tx">
-              <dgm:param type="autoTxRot" val="upr"/>
-            </dgm:alg>
-            <dgm:shape xmlns:r="http://schemas.openxmlformats.org/officeDocument/2006/relationships" type="conn" r:blip="" hideGeom="1">
-              <dgm:adjLst/>
-            </dgm:shape>
-            <dgm:presOf axis="self"/>
-            <dgm:constrLst>
-              <dgm:constr type="lMarg"/>
-              <dgm:constr type="rMarg"/>
-              <dgm:constr type="tMarg"/>
-              <dgm:constr type="bMarg"/>
-            </dgm:constrLst>
-            <dgm:ruleLst>
-              <dgm:rule type="primFontSz" val="5" fact="NaN" max="NaN"/>
-            </dgm:ruleLst>
-          </dgm:layoutNode>
-        </dgm:layoutNode>
-      </dgm:forEach>
-    </dgm:forEach>
-  </dgm:layoutNode>
-</dgm:layoutDef>
-</file>
-
 <file path=ppt/diagrams/quickStyle1.xml><?xml version="1.0" encoding="utf-8"?>
 <dgm:styleDef xmlns:dgm="http://schemas.openxmlformats.org/drawingml/2006/diagram" xmlns:a="http://schemas.openxmlformats.org/drawingml/2006/main" uniqueId="urn:microsoft.com/office/officeart/2005/8/quickstyle/simple1">
   <dgm:title val=""/>
@@ -7217,7 +7218,7 @@
           <a:p>
             <a:fld id="{859BA711-06A9-47CE-8725-105218D2C14B}" type="datetimeFigureOut">
               <a:rPr lang="de-DE" smtClean="0"/>
-              <a:t>08.05.2022</a:t>
+              <a:t>09.05.2022</a:t>
             </a:fld>
             <a:endParaRPr lang="de-DE"/>
           </a:p>
@@ -7528,7 +7529,32 @@
           <a:bodyPr/>
           <a:lstStyle/>
           <a:p>
-            <a:endParaRPr lang="de-DE" dirty="0"/>
+            <a:r>
+              <a:rPr lang="de-DE" dirty="0"/>
+              <a:t>Anbietermarkt -&gt; Nachfragemarkt, gesättigter Markt, </a:t>
+            </a:r>
+            <a:r>
+              <a:rPr lang="de-DE" dirty="0" err="1"/>
+              <a:t>austausc´hbare</a:t>
+            </a:r>
+            <a:r>
+              <a:rPr lang="de-DE" dirty="0"/>
+              <a:t> Produkte, </a:t>
+            </a:r>
+            <a:r>
+              <a:rPr lang="de-DE" dirty="0" err="1"/>
+              <a:t>gestiegende</a:t>
+            </a:r>
+            <a:r>
+              <a:rPr lang="de-DE" dirty="0"/>
+              <a:t> Markttransparenz</a:t>
+            </a:r>
+          </a:p>
+          <a:p>
+            <a:r>
+              <a:rPr lang="de-DE" dirty="0"/>
+              <a:t>Kundenzufriedenheit: Mundpropaganda, weniger Kundenabwanderung, Wiederverkaufsrate, geringe Preisempfindlichkeit, sinkende Marketing, </a:t>
+            </a:r>
           </a:p>
         </p:txBody>
       </p:sp>
@@ -7549,7 +7575,7 @@
           <a:p>
             <a:fld id="{541701BE-069E-49EA-A8B8-5819325C202F}" type="slidenum">
               <a:rPr lang="de-DE" smtClean="0"/>
-              <a:t>4</a:t>
+              <a:t>6</a:t>
             </a:fld>
             <a:endParaRPr lang="de-DE"/>
           </a:p>
@@ -7558,7 +7584,7 @@
     </p:spTree>
     <p:extLst>
       <p:ext uri="{BB962C8B-B14F-4D97-AF65-F5344CB8AC3E}">
-        <p14:creationId xmlns:p14="http://schemas.microsoft.com/office/powerpoint/2010/main" val="900654201"/>
+        <p14:creationId xmlns:p14="http://schemas.microsoft.com/office/powerpoint/2010/main" val="3698299510"/>
       </p:ext>
     </p:extLst>
   </p:cSld>
@@ -7612,32 +7638,7 @@
           <a:bodyPr/>
           <a:lstStyle/>
           <a:p>
-            <a:r>
-              <a:rPr lang="de-DE" dirty="0"/>
-              <a:t>Anbietermarkt -&gt; Nachfragemarkt, gesättigter Markt, </a:t>
-            </a:r>
-            <a:r>
-              <a:rPr lang="de-DE" dirty="0" err="1"/>
-              <a:t>austausc´hbare</a:t>
-            </a:r>
-            <a:r>
-              <a:rPr lang="de-DE" dirty="0"/>
-              <a:t> Produkte, </a:t>
-            </a:r>
-            <a:r>
-              <a:rPr lang="de-DE" dirty="0" err="1"/>
-              <a:t>gestiegende</a:t>
-            </a:r>
-            <a:r>
-              <a:rPr lang="de-DE" dirty="0"/>
-              <a:t> Markttransparenz</a:t>
-            </a:r>
-          </a:p>
-          <a:p>
-            <a:r>
-              <a:rPr lang="de-DE" dirty="0"/>
-              <a:t>Kundenzufriedenheit: Mundpropaganda, weniger Kundenabwanderung, Wiederverkaufsrate, geringe Preisempfindlichkeit, sinkende Marketing, </a:t>
-            </a:r>
+            <a:endParaRPr lang="de-DE" dirty="0"/>
           </a:p>
         </p:txBody>
       </p:sp>
@@ -7658,7 +7659,7 @@
           <a:p>
             <a:fld id="{541701BE-069E-49EA-A8B8-5819325C202F}" type="slidenum">
               <a:rPr lang="de-DE" smtClean="0"/>
-              <a:t>7</a:t>
+              <a:t>11</a:t>
             </a:fld>
             <a:endParaRPr lang="de-DE"/>
           </a:p>
@@ -7667,7 +7668,7 @@
     </p:spTree>
     <p:extLst>
       <p:ext uri="{BB962C8B-B14F-4D97-AF65-F5344CB8AC3E}">
-        <p14:creationId xmlns:p14="http://schemas.microsoft.com/office/powerpoint/2010/main" val="3698299510"/>
+        <p14:creationId xmlns:p14="http://schemas.microsoft.com/office/powerpoint/2010/main" val="900654201"/>
       </p:ext>
     </p:extLst>
   </p:cSld>
@@ -7825,7 +7826,7 @@
             <a:fld id="{82EDB8D0-98ED-4B86-9D5F-E61ADC70144D}" type="datetimeFigureOut">
               <a:rPr lang="en-US" smtClean="0"/>
               <a:pPr/>
-              <a:t>5/8/2022</a:t>
+              <a:t>5/9/2022</a:t>
             </a:fld>
             <a:endParaRPr lang="en-US" dirty="0"/>
           </a:p>
@@ -8025,7 +8026,7 @@
             <a:fld id="{82EDB8D0-98ED-4B86-9D5F-E61ADC70144D}" type="datetimeFigureOut">
               <a:rPr lang="en-US" smtClean="0"/>
               <a:pPr/>
-              <a:t>5/8/2022</a:t>
+              <a:t>5/9/2022</a:t>
             </a:fld>
             <a:endParaRPr lang="en-US" dirty="0"/>
           </a:p>
@@ -8235,7 +8236,7 @@
             <a:fld id="{82EDB8D0-98ED-4B86-9D5F-E61ADC70144D}" type="datetimeFigureOut">
               <a:rPr lang="en-US" smtClean="0"/>
               <a:pPr/>
-              <a:t>5/8/2022</a:t>
+              <a:t>5/9/2022</a:t>
             </a:fld>
             <a:endParaRPr lang="en-US" dirty="0"/>
           </a:p>
@@ -8435,7 +8436,7 @@
             <a:fld id="{82EDB8D0-98ED-4B86-9D5F-E61ADC70144D}" type="datetimeFigureOut">
               <a:rPr lang="en-US" smtClean="0"/>
               <a:pPr/>
-              <a:t>5/8/2022</a:t>
+              <a:t>5/9/2022</a:t>
             </a:fld>
             <a:endParaRPr lang="en-US" dirty="0"/>
           </a:p>
@@ -8712,7 +8713,7 @@
             <a:fld id="{82EDB8D0-98ED-4B86-9D5F-E61ADC70144D}" type="datetimeFigureOut">
               <a:rPr lang="en-US" smtClean="0"/>
               <a:pPr/>
-              <a:t>5/8/2022</a:t>
+              <a:t>5/9/2022</a:t>
             </a:fld>
             <a:endParaRPr lang="en-US" dirty="0"/>
           </a:p>
@@ -8979,7 +8980,7 @@
             <a:fld id="{82EDB8D0-98ED-4B86-9D5F-E61ADC70144D}" type="datetimeFigureOut">
               <a:rPr lang="en-US" smtClean="0"/>
               <a:pPr/>
-              <a:t>5/8/2022</a:t>
+              <a:t>5/9/2022</a:t>
             </a:fld>
             <a:endParaRPr lang="en-US" dirty="0"/>
           </a:p>
@@ -9393,7 +9394,7 @@
             <a:fld id="{82EDB8D0-98ED-4B86-9D5F-E61ADC70144D}" type="datetimeFigureOut">
               <a:rPr lang="en-US" smtClean="0"/>
               <a:pPr/>
-              <a:t>5/8/2022</a:t>
+              <a:t>5/9/2022</a:t>
             </a:fld>
             <a:endParaRPr lang="en-US" dirty="0"/>
           </a:p>
@@ -9536,7 +9537,7 @@
             <a:fld id="{82EDB8D0-98ED-4B86-9D5F-E61ADC70144D}" type="datetimeFigureOut">
               <a:rPr lang="en-US" smtClean="0"/>
               <a:pPr/>
-              <a:t>5/8/2022</a:t>
+              <a:t>5/9/2022</a:t>
             </a:fld>
             <a:endParaRPr lang="en-US" dirty="0"/>
           </a:p>
@@ -9651,7 +9652,7 @@
             <a:fld id="{82EDB8D0-98ED-4B86-9D5F-E61ADC70144D}" type="datetimeFigureOut">
               <a:rPr lang="en-US" smtClean="0"/>
               <a:pPr/>
-              <a:t>5/8/2022</a:t>
+              <a:t>5/9/2022</a:t>
             </a:fld>
             <a:endParaRPr lang="en-US" dirty="0"/>
           </a:p>
@@ -9964,7 +9965,7 @@
             <a:fld id="{82EDB8D0-98ED-4B86-9D5F-E61ADC70144D}" type="datetimeFigureOut">
               <a:rPr lang="en-US" smtClean="0"/>
               <a:pPr/>
-              <a:t>5/8/2022</a:t>
+              <a:t>5/9/2022</a:t>
             </a:fld>
             <a:endParaRPr lang="en-US" dirty="0"/>
           </a:p>
@@ -10257,7 +10258,7 @@
             <a:fld id="{82EDB8D0-98ED-4B86-9D5F-E61ADC70144D}" type="datetimeFigureOut">
               <a:rPr lang="en-US" smtClean="0"/>
               <a:pPr/>
-              <a:t>5/8/2022</a:t>
+              <a:t>5/9/2022</a:t>
             </a:fld>
             <a:endParaRPr lang="en-US" dirty="0"/>
           </a:p>
@@ -10500,7 +10501,7 @@
             <a:fld id="{82EDB8D0-98ED-4B86-9D5F-E61ADC70144D}" type="datetimeFigureOut">
               <a:rPr lang="en-US" smtClean="0"/>
               <a:pPr/>
-              <a:t>5/8/2022</a:t>
+              <a:t>5/9/2022</a:t>
             </a:fld>
             <a:endParaRPr lang="en-US" dirty="0"/>
           </a:p>
@@ -11105,7 +11106,7 @@
           <a:p>
             <a:r>
               <a:rPr lang="de-DE" dirty="0"/>
-              <a:t>Was braucht ein gute CRM?</a:t>
+              <a:t>Was braucht ein gutes CRM?</a:t>
             </a:r>
           </a:p>
         </p:txBody>
@@ -11170,861 +11171,6 @@
 </file>
 
 <file path=ppt/slides/slide11.xml><?xml version="1.0" encoding="utf-8"?>
-<p:sld xmlns:a="http://schemas.openxmlformats.org/drawingml/2006/main" xmlns:r="http://schemas.openxmlformats.org/officeDocument/2006/relationships" xmlns:p="http://schemas.openxmlformats.org/presentationml/2006/main">
-  <p:cSld>
-    <p:spTree>
-      <p:nvGrpSpPr>
-        <p:cNvPr id="1" name=""/>
-        <p:cNvGrpSpPr/>
-        <p:nvPr/>
-      </p:nvGrpSpPr>
-      <p:grpSpPr>
-        <a:xfrm>
-          <a:off x="0" y="0"/>
-          <a:ext cx="0" cy="0"/>
-          <a:chOff x="0" y="0"/>
-          <a:chExt cx="0" cy="0"/>
-        </a:xfrm>
-      </p:grpSpPr>
-      <p:sp>
-        <p:nvSpPr>
-          <p:cNvPr id="2" name="Titel 1">
-            <a:extLst>
-              <a:ext uri="{FF2B5EF4-FFF2-40B4-BE49-F238E27FC236}">
-                <a16:creationId xmlns:a16="http://schemas.microsoft.com/office/drawing/2014/main" id="{3F8D1BD1-1640-94EF-A85A-F7B6CAB1B614}"/>
-              </a:ext>
-            </a:extLst>
-          </p:cNvPr>
-          <p:cNvSpPr>
-            <a:spLocks noGrp="1"/>
-          </p:cNvSpPr>
-          <p:nvPr>
-            <p:ph type="title"/>
-          </p:nvPr>
-        </p:nvSpPr>
-        <p:spPr/>
-        <p:txBody>
-          <a:bodyPr/>
-          <a:lstStyle/>
-          <a:p>
-            <a:r>
-              <a:rPr lang="de-DE" dirty="0"/>
-              <a:t>Herausforderungen bei der Implementierung</a:t>
-            </a:r>
-          </a:p>
-        </p:txBody>
-      </p:sp>
-      <p:sp>
-        <p:nvSpPr>
-          <p:cNvPr id="3" name="Inhaltsplatzhalter 2">
-            <a:extLst>
-              <a:ext uri="{FF2B5EF4-FFF2-40B4-BE49-F238E27FC236}">
-                <a16:creationId xmlns:a16="http://schemas.microsoft.com/office/drawing/2014/main" id="{10985DD8-96F8-E582-F36C-8010320AD04F}"/>
-              </a:ext>
-            </a:extLst>
-          </p:cNvPr>
-          <p:cNvSpPr>
-            <a:spLocks noGrp="1"/>
-          </p:cNvSpPr>
-          <p:nvPr>
-            <p:ph idx="1"/>
-          </p:nvPr>
-        </p:nvSpPr>
-        <p:spPr/>
-        <p:txBody>
-          <a:bodyPr/>
-          <a:lstStyle/>
-          <a:p>
-            <a:endParaRPr lang="de-DE"/>
-          </a:p>
-        </p:txBody>
-      </p:sp>
-    </p:spTree>
-    <p:extLst>
-      <p:ext uri="{BB962C8B-B14F-4D97-AF65-F5344CB8AC3E}">
-        <p14:creationId xmlns:p14="http://schemas.microsoft.com/office/powerpoint/2010/main" val="2841457938"/>
-      </p:ext>
-    </p:extLst>
-  </p:cSld>
-  <p:clrMapOvr>
-    <a:masterClrMapping/>
-  </p:clrMapOvr>
-</p:sld>
-</file>
-
-<file path=ppt/slides/slide12.xml><?xml version="1.0" encoding="utf-8"?>
-<p:sld xmlns:a="http://schemas.openxmlformats.org/drawingml/2006/main" xmlns:r="http://schemas.openxmlformats.org/officeDocument/2006/relationships" xmlns:p="http://schemas.openxmlformats.org/presentationml/2006/main">
-  <p:cSld>
-    <p:spTree>
-      <p:nvGrpSpPr>
-        <p:cNvPr id="1" name=""/>
-        <p:cNvGrpSpPr/>
-        <p:nvPr/>
-      </p:nvGrpSpPr>
-      <p:grpSpPr>
-        <a:xfrm>
-          <a:off x="0" y="0"/>
-          <a:ext cx="0" cy="0"/>
-          <a:chOff x="0" y="0"/>
-          <a:chExt cx="0" cy="0"/>
-        </a:xfrm>
-      </p:grpSpPr>
-      <p:sp>
-        <p:nvSpPr>
-          <p:cNvPr id="2" name="Titel 1">
-            <a:extLst>
-              <a:ext uri="{FF2B5EF4-FFF2-40B4-BE49-F238E27FC236}">
-                <a16:creationId xmlns:a16="http://schemas.microsoft.com/office/drawing/2014/main" id="{FD8201FD-4DED-422F-54BC-BFBCF475A076}"/>
-              </a:ext>
-            </a:extLst>
-          </p:cNvPr>
-          <p:cNvSpPr>
-            <a:spLocks noGrp="1"/>
-          </p:cNvSpPr>
-          <p:nvPr>
-            <p:ph type="title"/>
-          </p:nvPr>
-        </p:nvSpPr>
-        <p:spPr/>
-        <p:txBody>
-          <a:bodyPr/>
-          <a:lstStyle/>
-          <a:p>
-            <a:r>
-              <a:rPr lang="de-DE" dirty="0"/>
-              <a:t>Zukunftserwartungen</a:t>
-            </a:r>
-          </a:p>
-        </p:txBody>
-      </p:sp>
-      <p:sp>
-        <p:nvSpPr>
-          <p:cNvPr id="3" name="Inhaltsplatzhalter 2">
-            <a:extLst>
-              <a:ext uri="{FF2B5EF4-FFF2-40B4-BE49-F238E27FC236}">
-                <a16:creationId xmlns:a16="http://schemas.microsoft.com/office/drawing/2014/main" id="{F23D4E92-CFE8-BC2E-7146-01C3FFA1122E}"/>
-              </a:ext>
-            </a:extLst>
-          </p:cNvPr>
-          <p:cNvSpPr>
-            <a:spLocks noGrp="1"/>
-          </p:cNvSpPr>
-          <p:nvPr>
-            <p:ph idx="1"/>
-          </p:nvPr>
-        </p:nvSpPr>
-        <p:spPr/>
-        <p:txBody>
-          <a:bodyPr/>
-          <a:lstStyle/>
-          <a:p>
-            <a:r>
-              <a:rPr lang="de-DE" dirty="0"/>
-              <a:t>Mobile CRM Anwendungen</a:t>
-            </a:r>
-          </a:p>
-          <a:p>
-            <a:r>
-              <a:rPr lang="de-DE" dirty="0"/>
-              <a:t>Cloud basierte Technologien</a:t>
-            </a:r>
-          </a:p>
-          <a:p>
-            <a:r>
-              <a:rPr lang="de-DE" dirty="0"/>
-              <a:t>Anwendung von KI für CRM Systeme</a:t>
-            </a:r>
-          </a:p>
-          <a:p>
-            <a:r>
-              <a:rPr lang="de-DE" dirty="0" err="1"/>
-              <a:t>Social</a:t>
-            </a:r>
-            <a:r>
-              <a:rPr lang="de-DE" dirty="0"/>
-              <a:t> CRM</a:t>
-            </a:r>
-          </a:p>
-        </p:txBody>
-      </p:sp>
-    </p:spTree>
-    <p:extLst>
-      <p:ext uri="{BB962C8B-B14F-4D97-AF65-F5344CB8AC3E}">
-        <p14:creationId xmlns:p14="http://schemas.microsoft.com/office/powerpoint/2010/main" val="1141122462"/>
-      </p:ext>
-    </p:extLst>
-  </p:cSld>
-  <p:clrMapOvr>
-    <a:masterClrMapping/>
-  </p:clrMapOvr>
-</p:sld>
-</file>
-
-<file path=ppt/slides/slide13.xml><?xml version="1.0" encoding="utf-8"?>
-<p:sld xmlns:a="http://schemas.openxmlformats.org/drawingml/2006/main" xmlns:r="http://schemas.openxmlformats.org/officeDocument/2006/relationships" xmlns:p="http://schemas.openxmlformats.org/presentationml/2006/main">
-  <p:cSld>
-    <p:spTree>
-      <p:nvGrpSpPr>
-        <p:cNvPr id="1" name=""/>
-        <p:cNvGrpSpPr/>
-        <p:nvPr/>
-      </p:nvGrpSpPr>
-      <p:grpSpPr>
-        <a:xfrm>
-          <a:off x="0" y="0"/>
-          <a:ext cx="0" cy="0"/>
-          <a:chOff x="0" y="0"/>
-          <a:chExt cx="0" cy="0"/>
-        </a:xfrm>
-      </p:grpSpPr>
-      <p:sp>
-        <p:nvSpPr>
-          <p:cNvPr id="2" name="Titel 1">
-            <a:extLst>
-              <a:ext uri="{FF2B5EF4-FFF2-40B4-BE49-F238E27FC236}">
-                <a16:creationId xmlns:a16="http://schemas.microsoft.com/office/drawing/2014/main" id="{B0D54274-8C56-A844-9459-86D7CF9C5B31}"/>
-              </a:ext>
-            </a:extLst>
-          </p:cNvPr>
-          <p:cNvSpPr>
-            <a:spLocks noGrp="1"/>
-          </p:cNvSpPr>
-          <p:nvPr>
-            <p:ph type="title"/>
-          </p:nvPr>
-        </p:nvSpPr>
-        <p:spPr/>
-        <p:txBody>
-          <a:bodyPr/>
-          <a:lstStyle/>
-          <a:p>
-            <a:r>
-              <a:rPr lang="de-DE" dirty="0"/>
-              <a:t>Was ist cloudbasiertes CRM?</a:t>
-            </a:r>
-          </a:p>
-        </p:txBody>
-      </p:sp>
-      <p:sp>
-        <p:nvSpPr>
-          <p:cNvPr id="3" name="Inhaltsplatzhalter 2">
-            <a:extLst>
-              <a:ext uri="{FF2B5EF4-FFF2-40B4-BE49-F238E27FC236}">
-                <a16:creationId xmlns:a16="http://schemas.microsoft.com/office/drawing/2014/main" id="{59FC307E-2594-D506-633E-69BF3DBD57FC}"/>
-              </a:ext>
-            </a:extLst>
-          </p:cNvPr>
-          <p:cNvSpPr>
-            <a:spLocks noGrp="1"/>
-          </p:cNvSpPr>
-          <p:nvPr>
-            <p:ph idx="1"/>
-          </p:nvPr>
-        </p:nvSpPr>
-        <p:spPr/>
-        <p:txBody>
-          <a:bodyPr/>
-          <a:lstStyle/>
-          <a:p>
-            <a:r>
-              <a:rPr lang="de-DE" dirty="0"/>
-              <a:t>Online von CRM-Anbieter gehostet</a:t>
-            </a:r>
-          </a:p>
-          <a:p>
-            <a:r>
-              <a:rPr lang="de-DE" dirty="0"/>
-              <a:t>Mit Internetverbindung und Webbrowser auf Daten zugreifen</a:t>
-            </a:r>
-          </a:p>
-          <a:p>
-            <a:r>
-              <a:rPr lang="de-DE" dirty="0"/>
-              <a:t>Auch SaaS (Software </a:t>
-            </a:r>
-            <a:r>
-              <a:rPr lang="de-DE" dirty="0" err="1"/>
-              <a:t>as</a:t>
-            </a:r>
-            <a:r>
-              <a:rPr lang="de-DE" dirty="0"/>
-              <a:t> a Service) oder Online-/Web-CRM</a:t>
-            </a:r>
-          </a:p>
-          <a:p>
-            <a:endParaRPr lang="de-DE" dirty="0"/>
-          </a:p>
-          <a:p>
-            <a:pPr marL="0" indent="0">
-              <a:buNone/>
-            </a:pPr>
-            <a:r>
-              <a:rPr lang="de-DE" dirty="0"/>
-              <a:t>Gegenteil </a:t>
-            </a:r>
-            <a:r>
-              <a:rPr lang="de-DE" dirty="0">
-                <a:sym typeface="Wingdings" panose="05000000000000000000" pitchFamily="2" charset="2"/>
-              </a:rPr>
-              <a:t> Inhouse CRM</a:t>
-            </a:r>
-          </a:p>
-          <a:p>
-            <a:r>
-              <a:rPr lang="de-DE" dirty="0">
-                <a:sym typeface="Wingdings" panose="05000000000000000000" pitchFamily="2" charset="2"/>
-              </a:rPr>
-              <a:t>Auf Servern des Unternehmens</a:t>
-            </a:r>
-            <a:endParaRPr lang="de-DE" dirty="0"/>
-          </a:p>
-        </p:txBody>
-      </p:sp>
-    </p:spTree>
-    <p:extLst>
-      <p:ext uri="{BB962C8B-B14F-4D97-AF65-F5344CB8AC3E}">
-        <p14:creationId xmlns:p14="http://schemas.microsoft.com/office/powerpoint/2010/main" val="3915128059"/>
-      </p:ext>
-    </p:extLst>
-  </p:cSld>
-  <p:clrMapOvr>
-    <a:masterClrMapping/>
-  </p:clrMapOvr>
-</p:sld>
-</file>
-
-<file path=ppt/slides/slide14.xml><?xml version="1.0" encoding="utf-8"?>
-<p:sld xmlns:a="http://schemas.openxmlformats.org/drawingml/2006/main" xmlns:r="http://schemas.openxmlformats.org/officeDocument/2006/relationships" xmlns:p="http://schemas.openxmlformats.org/presentationml/2006/main">
-  <p:cSld>
-    <p:spTree>
-      <p:nvGrpSpPr>
-        <p:cNvPr id="1" name=""/>
-        <p:cNvGrpSpPr/>
-        <p:nvPr/>
-      </p:nvGrpSpPr>
-      <p:grpSpPr>
-        <a:xfrm>
-          <a:off x="0" y="0"/>
-          <a:ext cx="0" cy="0"/>
-          <a:chOff x="0" y="0"/>
-          <a:chExt cx="0" cy="0"/>
-        </a:xfrm>
-      </p:grpSpPr>
-      <p:sp>
-        <p:nvSpPr>
-          <p:cNvPr id="2" name="Titel 1">
-            <a:extLst>
-              <a:ext uri="{FF2B5EF4-FFF2-40B4-BE49-F238E27FC236}">
-                <a16:creationId xmlns:a16="http://schemas.microsoft.com/office/drawing/2014/main" id="{9F309B94-5B63-0B78-B54A-C2CF8BEA8C87}"/>
-              </a:ext>
-            </a:extLst>
-          </p:cNvPr>
-          <p:cNvSpPr>
-            <a:spLocks noGrp="1"/>
-          </p:cNvSpPr>
-          <p:nvPr>
-            <p:ph type="title"/>
-          </p:nvPr>
-        </p:nvSpPr>
-        <p:spPr/>
-        <p:txBody>
-          <a:bodyPr/>
-          <a:lstStyle/>
-          <a:p>
-            <a:r>
-              <a:rPr lang="de-DE" dirty="0"/>
-              <a:t>Vorteile von cloudbasiertem CRM</a:t>
-            </a:r>
-          </a:p>
-        </p:txBody>
-      </p:sp>
-      <p:sp>
-        <p:nvSpPr>
-          <p:cNvPr id="3" name="Inhaltsplatzhalter 2">
-            <a:extLst>
-              <a:ext uri="{FF2B5EF4-FFF2-40B4-BE49-F238E27FC236}">
-                <a16:creationId xmlns:a16="http://schemas.microsoft.com/office/drawing/2014/main" id="{98DE802F-461C-C0FD-86E0-B070E1DBBAB6}"/>
-              </a:ext>
-            </a:extLst>
-          </p:cNvPr>
-          <p:cNvSpPr>
-            <a:spLocks noGrp="1"/>
-          </p:cNvSpPr>
-          <p:nvPr>
-            <p:ph idx="1"/>
-          </p:nvPr>
-        </p:nvSpPr>
-        <p:spPr/>
-        <p:txBody>
-          <a:bodyPr/>
-          <a:lstStyle/>
-          <a:p>
-            <a:r>
-              <a:rPr lang="de-DE" dirty="0"/>
-              <a:t>Keine Hardware notwendig</a:t>
-            </a:r>
-          </a:p>
-          <a:p>
-            <a:r>
-              <a:rPr lang="de-DE" dirty="0"/>
-              <a:t>Geringere Kosten</a:t>
-            </a:r>
-          </a:p>
-          <a:p>
-            <a:r>
-              <a:rPr lang="de-DE" dirty="0"/>
-              <a:t>Zeitliche und örtliche Flexibilität</a:t>
-            </a:r>
-          </a:p>
-          <a:p>
-            <a:r>
-              <a:rPr lang="de-DE" dirty="0"/>
-              <a:t>Mit mobilen Endgeräten auf Daten zugreifen</a:t>
-            </a:r>
-          </a:p>
-          <a:p>
-            <a:r>
-              <a:rPr lang="de-DE" dirty="0"/>
-              <a:t>Höhere Sicherheit</a:t>
-            </a:r>
-          </a:p>
-        </p:txBody>
-      </p:sp>
-    </p:spTree>
-    <p:extLst>
-      <p:ext uri="{BB962C8B-B14F-4D97-AF65-F5344CB8AC3E}">
-        <p14:creationId xmlns:p14="http://schemas.microsoft.com/office/powerpoint/2010/main" val="122493801"/>
-      </p:ext>
-    </p:extLst>
-  </p:cSld>
-  <p:clrMapOvr>
-    <a:masterClrMapping/>
-  </p:clrMapOvr>
-</p:sld>
-</file>
-
-<file path=ppt/slides/slide15.xml><?xml version="1.0" encoding="utf-8"?>
-<p:sld xmlns:a="http://schemas.openxmlformats.org/drawingml/2006/main" xmlns:r="http://schemas.openxmlformats.org/officeDocument/2006/relationships" xmlns:p="http://schemas.openxmlformats.org/presentationml/2006/main">
-  <p:cSld>
-    <p:spTree>
-      <p:nvGrpSpPr>
-        <p:cNvPr id="1" name=""/>
-        <p:cNvGrpSpPr/>
-        <p:nvPr/>
-      </p:nvGrpSpPr>
-      <p:grpSpPr>
-        <a:xfrm>
-          <a:off x="0" y="0"/>
-          <a:ext cx="0" cy="0"/>
-          <a:chOff x="0" y="0"/>
-          <a:chExt cx="0" cy="0"/>
-        </a:xfrm>
-      </p:grpSpPr>
-      <p:sp>
-        <p:nvSpPr>
-          <p:cNvPr id="2" name="Titel 1">
-            <a:extLst>
-              <a:ext uri="{FF2B5EF4-FFF2-40B4-BE49-F238E27FC236}">
-                <a16:creationId xmlns:a16="http://schemas.microsoft.com/office/drawing/2014/main" id="{7FEB15A5-3792-715C-DC43-A89A17C8A7F3}"/>
-              </a:ext>
-            </a:extLst>
-          </p:cNvPr>
-          <p:cNvSpPr>
-            <a:spLocks noGrp="1"/>
-          </p:cNvSpPr>
-          <p:nvPr>
-            <p:ph type="title"/>
-          </p:nvPr>
-        </p:nvSpPr>
-        <p:spPr/>
-        <p:txBody>
-          <a:bodyPr/>
-          <a:lstStyle/>
-          <a:p>
-            <a:r>
-              <a:rPr lang="de-DE" dirty="0"/>
-              <a:t>KI und CRM</a:t>
-            </a:r>
-          </a:p>
-        </p:txBody>
-      </p:sp>
-      <p:sp>
-        <p:nvSpPr>
-          <p:cNvPr id="3" name="Inhaltsplatzhalter 2">
-            <a:extLst>
-              <a:ext uri="{FF2B5EF4-FFF2-40B4-BE49-F238E27FC236}">
-                <a16:creationId xmlns:a16="http://schemas.microsoft.com/office/drawing/2014/main" id="{CD217D6D-1132-F58F-E20D-02EDE39C7313}"/>
-              </a:ext>
-            </a:extLst>
-          </p:cNvPr>
-          <p:cNvSpPr>
-            <a:spLocks noGrp="1"/>
-          </p:cNvSpPr>
-          <p:nvPr>
-            <p:ph idx="1"/>
-          </p:nvPr>
-        </p:nvSpPr>
-        <p:spPr/>
-        <p:txBody>
-          <a:bodyPr/>
-          <a:lstStyle/>
-          <a:p>
-            <a:endParaRPr lang="de-DE"/>
-          </a:p>
-        </p:txBody>
-      </p:sp>
-    </p:spTree>
-    <p:extLst>
-      <p:ext uri="{BB962C8B-B14F-4D97-AF65-F5344CB8AC3E}">
-        <p14:creationId xmlns:p14="http://schemas.microsoft.com/office/powerpoint/2010/main" val="486286641"/>
-      </p:ext>
-    </p:extLst>
-  </p:cSld>
-  <p:clrMapOvr>
-    <a:masterClrMapping/>
-  </p:clrMapOvr>
-</p:sld>
-</file>
-
-<file path=ppt/slides/slide16.xml><?xml version="1.0" encoding="utf-8"?>
-<p:sld xmlns:a="http://schemas.openxmlformats.org/drawingml/2006/main" xmlns:r="http://schemas.openxmlformats.org/officeDocument/2006/relationships" xmlns:p="http://schemas.openxmlformats.org/presentationml/2006/main">
-  <p:cSld>
-    <p:spTree>
-      <p:nvGrpSpPr>
-        <p:cNvPr id="1" name=""/>
-        <p:cNvGrpSpPr/>
-        <p:nvPr/>
-      </p:nvGrpSpPr>
-      <p:grpSpPr>
-        <a:xfrm>
-          <a:off x="0" y="0"/>
-          <a:ext cx="0" cy="0"/>
-          <a:chOff x="0" y="0"/>
-          <a:chExt cx="0" cy="0"/>
-        </a:xfrm>
-      </p:grpSpPr>
-      <p:sp>
-        <p:nvSpPr>
-          <p:cNvPr id="2" name="Titel 1">
-            <a:extLst>
-              <a:ext uri="{FF2B5EF4-FFF2-40B4-BE49-F238E27FC236}">
-                <a16:creationId xmlns:a16="http://schemas.microsoft.com/office/drawing/2014/main" id="{CBEE4DFE-D485-6A43-A4BA-F91D3B9567E5}"/>
-              </a:ext>
-            </a:extLst>
-          </p:cNvPr>
-          <p:cNvSpPr>
-            <a:spLocks noGrp="1"/>
-          </p:cNvSpPr>
-          <p:nvPr>
-            <p:ph type="title"/>
-          </p:nvPr>
-        </p:nvSpPr>
-        <p:spPr/>
-        <p:txBody>
-          <a:bodyPr/>
-          <a:lstStyle/>
-          <a:p>
-            <a:r>
-              <a:rPr lang="de-DE" dirty="0"/>
-              <a:t>Vorteile von der Anwendung von KI bei CRM</a:t>
-            </a:r>
-          </a:p>
-        </p:txBody>
-      </p:sp>
-      <p:sp>
-        <p:nvSpPr>
-          <p:cNvPr id="3" name="Inhaltsplatzhalter 2">
-            <a:extLst>
-              <a:ext uri="{FF2B5EF4-FFF2-40B4-BE49-F238E27FC236}">
-                <a16:creationId xmlns:a16="http://schemas.microsoft.com/office/drawing/2014/main" id="{9DB65AFA-A65A-47E9-430C-8CDDF30AF48A}"/>
-              </a:ext>
-            </a:extLst>
-          </p:cNvPr>
-          <p:cNvSpPr>
-            <a:spLocks noGrp="1"/>
-          </p:cNvSpPr>
-          <p:nvPr>
-            <p:ph idx="1"/>
-          </p:nvPr>
-        </p:nvSpPr>
-        <p:spPr/>
-        <p:txBody>
-          <a:bodyPr/>
-          <a:lstStyle/>
-          <a:p>
-            <a:endParaRPr lang="de-DE"/>
-          </a:p>
-        </p:txBody>
-      </p:sp>
-    </p:spTree>
-    <p:extLst>
-      <p:ext uri="{BB962C8B-B14F-4D97-AF65-F5344CB8AC3E}">
-        <p14:creationId xmlns:p14="http://schemas.microsoft.com/office/powerpoint/2010/main" val="2556253994"/>
-      </p:ext>
-    </p:extLst>
-  </p:cSld>
-  <p:clrMapOvr>
-    <a:masterClrMapping/>
-  </p:clrMapOvr>
-</p:sld>
-</file>
-
-<file path=ppt/slides/slide2.xml><?xml version="1.0" encoding="utf-8"?>
-<p:sld xmlns:a="http://schemas.openxmlformats.org/drawingml/2006/main" xmlns:r="http://schemas.openxmlformats.org/officeDocument/2006/relationships" xmlns:p="http://schemas.openxmlformats.org/presentationml/2006/main">
-  <p:cSld>
-    <p:spTree>
-      <p:nvGrpSpPr>
-        <p:cNvPr id="1" name=""/>
-        <p:cNvGrpSpPr/>
-        <p:nvPr/>
-      </p:nvGrpSpPr>
-      <p:grpSpPr>
-        <a:xfrm>
-          <a:off x="0" y="0"/>
-          <a:ext cx="0" cy="0"/>
-          <a:chOff x="0" y="0"/>
-          <a:chExt cx="0" cy="0"/>
-        </a:xfrm>
-      </p:grpSpPr>
-      <p:sp>
-        <p:nvSpPr>
-          <p:cNvPr id="2" name="Titel 1">
-            <a:extLst>
-              <a:ext uri="{FF2B5EF4-FFF2-40B4-BE49-F238E27FC236}">
-                <a16:creationId xmlns:a16="http://schemas.microsoft.com/office/drawing/2014/main" id="{D35888CE-4D8C-C4DC-72B1-FB217E5D2FF7}"/>
-              </a:ext>
-            </a:extLst>
-          </p:cNvPr>
-          <p:cNvSpPr>
-            <a:spLocks noGrp="1"/>
-          </p:cNvSpPr>
-          <p:nvPr>
-            <p:ph type="title"/>
-          </p:nvPr>
-        </p:nvSpPr>
-        <p:spPr/>
-        <p:txBody>
-          <a:bodyPr/>
-          <a:lstStyle/>
-          <a:p>
-            <a:r>
-              <a:rPr lang="de-DE" dirty="0"/>
-              <a:t>1 nice Gliederung</a:t>
-            </a:r>
-          </a:p>
-        </p:txBody>
-      </p:sp>
-      <p:sp>
-        <p:nvSpPr>
-          <p:cNvPr id="3" name="Inhaltsplatzhalter 2">
-            <a:extLst>
-              <a:ext uri="{FF2B5EF4-FFF2-40B4-BE49-F238E27FC236}">
-                <a16:creationId xmlns:a16="http://schemas.microsoft.com/office/drawing/2014/main" id="{295DB2C8-2302-7E3A-76ED-8904A433FAC1}"/>
-              </a:ext>
-            </a:extLst>
-          </p:cNvPr>
-          <p:cNvSpPr>
-            <a:spLocks noGrp="1"/>
-          </p:cNvSpPr>
-          <p:nvPr>
-            <p:ph idx="1"/>
-          </p:nvPr>
-        </p:nvSpPr>
-        <p:spPr/>
-        <p:txBody>
-          <a:bodyPr/>
-          <a:lstStyle/>
-          <a:p>
-            <a:endParaRPr lang="de-DE" dirty="0"/>
-          </a:p>
-        </p:txBody>
-      </p:sp>
-    </p:spTree>
-    <p:extLst>
-      <p:ext uri="{BB962C8B-B14F-4D97-AF65-F5344CB8AC3E}">
-        <p14:creationId xmlns:p14="http://schemas.microsoft.com/office/powerpoint/2010/main" val="1280743430"/>
-      </p:ext>
-    </p:extLst>
-  </p:cSld>
-  <p:clrMapOvr>
-    <a:masterClrMapping/>
-  </p:clrMapOvr>
-</p:sld>
-</file>
-
-<file path=ppt/slides/slide3.xml><?xml version="1.0" encoding="utf-8"?>
-<p:sld xmlns:a="http://schemas.openxmlformats.org/drawingml/2006/main" xmlns:r="http://schemas.openxmlformats.org/officeDocument/2006/relationships" xmlns:p="http://schemas.openxmlformats.org/presentationml/2006/main">
-  <p:cSld>
-    <p:spTree>
-      <p:nvGrpSpPr>
-        <p:cNvPr id="1" name=""/>
-        <p:cNvGrpSpPr/>
-        <p:nvPr/>
-      </p:nvGrpSpPr>
-      <p:grpSpPr>
-        <a:xfrm>
-          <a:off x="0" y="0"/>
-          <a:ext cx="0" cy="0"/>
-          <a:chOff x="0" y="0"/>
-          <a:chExt cx="0" cy="0"/>
-        </a:xfrm>
-      </p:grpSpPr>
-      <p:sp>
-        <p:nvSpPr>
-          <p:cNvPr id="2" name="Titel 1">
-            <a:extLst>
-              <a:ext uri="{FF2B5EF4-FFF2-40B4-BE49-F238E27FC236}">
-                <a16:creationId xmlns:a16="http://schemas.microsoft.com/office/drawing/2014/main" id="{A965F112-4829-303F-91EE-66DF5B8B651E}"/>
-              </a:ext>
-            </a:extLst>
-          </p:cNvPr>
-          <p:cNvSpPr>
-            <a:spLocks noGrp="1"/>
-          </p:cNvSpPr>
-          <p:nvPr>
-            <p:ph type="title"/>
-          </p:nvPr>
-        </p:nvSpPr>
-        <p:spPr/>
-        <p:txBody>
-          <a:bodyPr/>
-          <a:lstStyle/>
-          <a:p>
-            <a:pPr algn="ctr"/>
-            <a:r>
-              <a:rPr lang="de-DE" dirty="0"/>
-              <a:t>Lead vs. Kunde</a:t>
-            </a:r>
-          </a:p>
-        </p:txBody>
-      </p:sp>
-      <p:sp>
-        <p:nvSpPr>
-          <p:cNvPr id="5" name="Inhaltsplatzhalter 4">
-            <a:extLst>
-              <a:ext uri="{FF2B5EF4-FFF2-40B4-BE49-F238E27FC236}">
-                <a16:creationId xmlns:a16="http://schemas.microsoft.com/office/drawing/2014/main" id="{9F56ECBB-9519-4197-B114-735C07CC727B}"/>
-              </a:ext>
-            </a:extLst>
-          </p:cNvPr>
-          <p:cNvSpPr>
-            <a:spLocks noGrp="1"/>
-          </p:cNvSpPr>
-          <p:nvPr>
-            <p:ph sz="half" idx="2"/>
-          </p:nvPr>
-        </p:nvSpPr>
-        <p:spPr/>
-        <p:txBody>
-          <a:bodyPr/>
-          <a:lstStyle/>
-          <a:p>
-            <a:r>
-              <a:rPr lang="de-DE" dirty="0"/>
-              <a:t>Potentieller Kunde</a:t>
-            </a:r>
-          </a:p>
-          <a:p>
-            <a:r>
-              <a:rPr lang="de-DE" dirty="0"/>
-              <a:t>unbekannte Wirtschaftskraft</a:t>
-            </a:r>
-          </a:p>
-          <a:p>
-            <a:r>
-              <a:rPr lang="de-DE" dirty="0"/>
-              <a:t>unbekanntes Kaufverhalten</a:t>
-            </a:r>
-          </a:p>
-          <a:p>
-            <a:r>
-              <a:rPr lang="de-DE" dirty="0"/>
-              <a:t>Bedürfnisermittlung</a:t>
-            </a:r>
-          </a:p>
-          <a:p>
-            <a:endParaRPr lang="de-DE" dirty="0"/>
-          </a:p>
-          <a:p>
-            <a:endParaRPr lang="de-DE" dirty="0"/>
-          </a:p>
-          <a:p>
-            <a:endParaRPr lang="de-DE" dirty="0"/>
-          </a:p>
-          <a:p>
-            <a:endParaRPr lang="de-DE" dirty="0"/>
-          </a:p>
-        </p:txBody>
-      </p:sp>
-      <p:sp>
-        <p:nvSpPr>
-          <p:cNvPr id="7" name="Inhaltsplatzhalter 6">
-            <a:extLst>
-              <a:ext uri="{FF2B5EF4-FFF2-40B4-BE49-F238E27FC236}">
-                <a16:creationId xmlns:a16="http://schemas.microsoft.com/office/drawing/2014/main" id="{B4EDF357-F95E-511D-6914-0C489535C25D}"/>
-              </a:ext>
-            </a:extLst>
-          </p:cNvPr>
-          <p:cNvSpPr>
-            <a:spLocks noGrp="1"/>
-          </p:cNvSpPr>
-          <p:nvPr>
-            <p:ph sz="quarter" idx="4"/>
-          </p:nvPr>
-        </p:nvSpPr>
-        <p:spPr/>
-        <p:txBody>
-          <a:bodyPr/>
-          <a:lstStyle/>
-          <a:p>
-            <a:r>
-              <a:rPr lang="de-DE" dirty="0"/>
-              <a:t>Bedürfnisse bekannt</a:t>
-            </a:r>
-          </a:p>
-          <a:p>
-            <a:r>
-              <a:rPr lang="de-DE" dirty="0"/>
-              <a:t>Kontakt bereits hergestellt</a:t>
-            </a:r>
-          </a:p>
-          <a:p>
-            <a:r>
-              <a:rPr lang="de-DE" dirty="0"/>
-              <a:t>Informationen über Zusatzprodukte </a:t>
-            </a:r>
-          </a:p>
-          <a:p>
-            <a:r>
-              <a:rPr lang="de-DE" dirty="0"/>
-              <a:t>Servicebindung</a:t>
-            </a:r>
-          </a:p>
-          <a:p>
-            <a:r>
-              <a:rPr lang="de-DE" dirty="0"/>
-              <a:t>ABC Klassifizierung</a:t>
-            </a:r>
-          </a:p>
-          <a:p>
-            <a:endParaRPr lang="de-DE" dirty="0"/>
-          </a:p>
-        </p:txBody>
-      </p:sp>
-    </p:spTree>
-    <p:extLst>
-      <p:ext uri="{BB962C8B-B14F-4D97-AF65-F5344CB8AC3E}">
-        <p14:creationId xmlns:p14="http://schemas.microsoft.com/office/powerpoint/2010/main" val="4209253751"/>
-      </p:ext>
-    </p:extLst>
-  </p:cSld>
-  <p:clrMapOvr>
-    <a:masterClrMapping/>
-  </p:clrMapOvr>
-</p:sld>
-</file>
-
-<file path=ppt/slides/slide4.xml><?xml version="1.0" encoding="utf-8"?>
 <p:sld xmlns:a="http://schemas.openxmlformats.org/drawingml/2006/main" xmlns:r="http://schemas.openxmlformats.org/officeDocument/2006/relationships" xmlns:p="http://schemas.openxmlformats.org/presentationml/2006/main">
   <p:cSld>
     <p:spTree>
@@ -12149,7 +11295,729 @@
 </p:sld>
 </file>
 
-<file path=ppt/slides/slide5.xml><?xml version="1.0" encoding="utf-8"?>
+<file path=ppt/slides/slide12.xml><?xml version="1.0" encoding="utf-8"?>
+<p:sld xmlns:a="http://schemas.openxmlformats.org/drawingml/2006/main" xmlns:r="http://schemas.openxmlformats.org/officeDocument/2006/relationships" xmlns:p="http://schemas.openxmlformats.org/presentationml/2006/main">
+  <p:cSld>
+    <p:spTree>
+      <p:nvGrpSpPr>
+        <p:cNvPr id="1" name=""/>
+        <p:cNvGrpSpPr/>
+        <p:nvPr/>
+      </p:nvGrpSpPr>
+      <p:grpSpPr>
+        <a:xfrm>
+          <a:off x="0" y="0"/>
+          <a:ext cx="0" cy="0"/>
+          <a:chOff x="0" y="0"/>
+          <a:chExt cx="0" cy="0"/>
+        </a:xfrm>
+      </p:grpSpPr>
+      <p:sp>
+        <p:nvSpPr>
+          <p:cNvPr id="2" name="Titel 1">
+            <a:extLst>
+              <a:ext uri="{FF2B5EF4-FFF2-40B4-BE49-F238E27FC236}">
+                <a16:creationId xmlns:a16="http://schemas.microsoft.com/office/drawing/2014/main" id="{3F8D1BD1-1640-94EF-A85A-F7B6CAB1B614}"/>
+              </a:ext>
+            </a:extLst>
+          </p:cNvPr>
+          <p:cNvSpPr>
+            <a:spLocks noGrp="1"/>
+          </p:cNvSpPr>
+          <p:nvPr>
+            <p:ph type="title"/>
+          </p:nvPr>
+        </p:nvSpPr>
+        <p:spPr/>
+        <p:txBody>
+          <a:bodyPr/>
+          <a:lstStyle/>
+          <a:p>
+            <a:r>
+              <a:rPr lang="de-DE" dirty="0"/>
+              <a:t>Herausforderungen bei der Implementierung</a:t>
+            </a:r>
+          </a:p>
+        </p:txBody>
+      </p:sp>
+      <p:sp>
+        <p:nvSpPr>
+          <p:cNvPr id="3" name="Inhaltsplatzhalter 2">
+            <a:extLst>
+              <a:ext uri="{FF2B5EF4-FFF2-40B4-BE49-F238E27FC236}">
+                <a16:creationId xmlns:a16="http://schemas.microsoft.com/office/drawing/2014/main" id="{10985DD8-96F8-E582-F36C-8010320AD04F}"/>
+              </a:ext>
+            </a:extLst>
+          </p:cNvPr>
+          <p:cNvSpPr>
+            <a:spLocks noGrp="1"/>
+          </p:cNvSpPr>
+          <p:nvPr>
+            <p:ph idx="1"/>
+          </p:nvPr>
+        </p:nvSpPr>
+        <p:spPr/>
+        <p:txBody>
+          <a:bodyPr/>
+          <a:lstStyle/>
+          <a:p>
+            <a:endParaRPr lang="de-DE"/>
+          </a:p>
+        </p:txBody>
+      </p:sp>
+    </p:spTree>
+    <p:extLst>
+      <p:ext uri="{BB962C8B-B14F-4D97-AF65-F5344CB8AC3E}">
+        <p14:creationId xmlns:p14="http://schemas.microsoft.com/office/powerpoint/2010/main" val="2841457938"/>
+      </p:ext>
+    </p:extLst>
+  </p:cSld>
+  <p:clrMapOvr>
+    <a:masterClrMapping/>
+  </p:clrMapOvr>
+</p:sld>
+</file>
+
+<file path=ppt/slides/slide13.xml><?xml version="1.0" encoding="utf-8"?>
+<p:sld xmlns:a="http://schemas.openxmlformats.org/drawingml/2006/main" xmlns:r="http://schemas.openxmlformats.org/officeDocument/2006/relationships" xmlns:p="http://schemas.openxmlformats.org/presentationml/2006/main">
+  <p:cSld>
+    <p:spTree>
+      <p:nvGrpSpPr>
+        <p:cNvPr id="1" name=""/>
+        <p:cNvGrpSpPr/>
+        <p:nvPr/>
+      </p:nvGrpSpPr>
+      <p:grpSpPr>
+        <a:xfrm>
+          <a:off x="0" y="0"/>
+          <a:ext cx="0" cy="0"/>
+          <a:chOff x="0" y="0"/>
+          <a:chExt cx="0" cy="0"/>
+        </a:xfrm>
+      </p:grpSpPr>
+      <p:sp>
+        <p:nvSpPr>
+          <p:cNvPr id="2" name="Titel 1">
+            <a:extLst>
+              <a:ext uri="{FF2B5EF4-FFF2-40B4-BE49-F238E27FC236}">
+                <a16:creationId xmlns:a16="http://schemas.microsoft.com/office/drawing/2014/main" id="{FD8201FD-4DED-422F-54BC-BFBCF475A076}"/>
+              </a:ext>
+            </a:extLst>
+          </p:cNvPr>
+          <p:cNvSpPr>
+            <a:spLocks noGrp="1"/>
+          </p:cNvSpPr>
+          <p:nvPr>
+            <p:ph type="title"/>
+          </p:nvPr>
+        </p:nvSpPr>
+        <p:spPr/>
+        <p:txBody>
+          <a:bodyPr/>
+          <a:lstStyle/>
+          <a:p>
+            <a:r>
+              <a:rPr lang="de-DE" dirty="0"/>
+              <a:t>Zukunftserwartungen</a:t>
+            </a:r>
+          </a:p>
+        </p:txBody>
+      </p:sp>
+      <p:sp>
+        <p:nvSpPr>
+          <p:cNvPr id="3" name="Inhaltsplatzhalter 2">
+            <a:extLst>
+              <a:ext uri="{FF2B5EF4-FFF2-40B4-BE49-F238E27FC236}">
+                <a16:creationId xmlns:a16="http://schemas.microsoft.com/office/drawing/2014/main" id="{F23D4E92-CFE8-BC2E-7146-01C3FFA1122E}"/>
+              </a:ext>
+            </a:extLst>
+          </p:cNvPr>
+          <p:cNvSpPr>
+            <a:spLocks noGrp="1"/>
+          </p:cNvSpPr>
+          <p:nvPr>
+            <p:ph idx="1"/>
+          </p:nvPr>
+        </p:nvSpPr>
+        <p:spPr/>
+        <p:txBody>
+          <a:bodyPr/>
+          <a:lstStyle/>
+          <a:p>
+            <a:r>
+              <a:rPr lang="de-DE" dirty="0"/>
+              <a:t>Mobile CRM Anwendungen</a:t>
+            </a:r>
+          </a:p>
+          <a:p>
+            <a:r>
+              <a:rPr lang="de-DE" dirty="0"/>
+              <a:t>Cloud basierte Technologien</a:t>
+            </a:r>
+          </a:p>
+          <a:p>
+            <a:r>
+              <a:rPr lang="de-DE" dirty="0"/>
+              <a:t>Anwendung von KI für CRM Systeme</a:t>
+            </a:r>
+          </a:p>
+          <a:p>
+            <a:r>
+              <a:rPr lang="de-DE" dirty="0" err="1"/>
+              <a:t>Social</a:t>
+            </a:r>
+            <a:r>
+              <a:rPr lang="de-DE" dirty="0"/>
+              <a:t> CRM</a:t>
+            </a:r>
+          </a:p>
+        </p:txBody>
+      </p:sp>
+    </p:spTree>
+    <p:extLst>
+      <p:ext uri="{BB962C8B-B14F-4D97-AF65-F5344CB8AC3E}">
+        <p14:creationId xmlns:p14="http://schemas.microsoft.com/office/powerpoint/2010/main" val="1141122462"/>
+      </p:ext>
+    </p:extLst>
+  </p:cSld>
+  <p:clrMapOvr>
+    <a:masterClrMapping/>
+  </p:clrMapOvr>
+</p:sld>
+</file>
+
+<file path=ppt/slides/slide14.xml><?xml version="1.0" encoding="utf-8"?>
+<p:sld xmlns:a="http://schemas.openxmlformats.org/drawingml/2006/main" xmlns:r="http://schemas.openxmlformats.org/officeDocument/2006/relationships" xmlns:p="http://schemas.openxmlformats.org/presentationml/2006/main">
+  <p:cSld>
+    <p:spTree>
+      <p:nvGrpSpPr>
+        <p:cNvPr id="1" name=""/>
+        <p:cNvGrpSpPr/>
+        <p:nvPr/>
+      </p:nvGrpSpPr>
+      <p:grpSpPr>
+        <a:xfrm>
+          <a:off x="0" y="0"/>
+          <a:ext cx="0" cy="0"/>
+          <a:chOff x="0" y="0"/>
+          <a:chExt cx="0" cy="0"/>
+        </a:xfrm>
+      </p:grpSpPr>
+      <p:sp>
+        <p:nvSpPr>
+          <p:cNvPr id="2" name="Titel 1">
+            <a:extLst>
+              <a:ext uri="{FF2B5EF4-FFF2-40B4-BE49-F238E27FC236}">
+                <a16:creationId xmlns:a16="http://schemas.microsoft.com/office/drawing/2014/main" id="{B0D54274-8C56-A844-9459-86D7CF9C5B31}"/>
+              </a:ext>
+            </a:extLst>
+          </p:cNvPr>
+          <p:cNvSpPr>
+            <a:spLocks noGrp="1"/>
+          </p:cNvSpPr>
+          <p:nvPr>
+            <p:ph type="title"/>
+          </p:nvPr>
+        </p:nvSpPr>
+        <p:spPr/>
+        <p:txBody>
+          <a:bodyPr/>
+          <a:lstStyle/>
+          <a:p>
+            <a:r>
+              <a:rPr lang="de-DE" dirty="0"/>
+              <a:t>Was ist cloudbasiertes CRM?</a:t>
+            </a:r>
+          </a:p>
+        </p:txBody>
+      </p:sp>
+      <p:sp>
+        <p:nvSpPr>
+          <p:cNvPr id="3" name="Inhaltsplatzhalter 2">
+            <a:extLst>
+              <a:ext uri="{FF2B5EF4-FFF2-40B4-BE49-F238E27FC236}">
+                <a16:creationId xmlns:a16="http://schemas.microsoft.com/office/drawing/2014/main" id="{59FC307E-2594-D506-633E-69BF3DBD57FC}"/>
+              </a:ext>
+            </a:extLst>
+          </p:cNvPr>
+          <p:cNvSpPr>
+            <a:spLocks noGrp="1"/>
+          </p:cNvSpPr>
+          <p:nvPr>
+            <p:ph idx="1"/>
+          </p:nvPr>
+        </p:nvSpPr>
+        <p:spPr/>
+        <p:txBody>
+          <a:bodyPr/>
+          <a:lstStyle/>
+          <a:p>
+            <a:r>
+              <a:rPr lang="de-DE" dirty="0"/>
+              <a:t>Online von CRM-Anbieter gehostet</a:t>
+            </a:r>
+          </a:p>
+          <a:p>
+            <a:r>
+              <a:rPr lang="de-DE" dirty="0"/>
+              <a:t>Mit Internetverbindung und Webbrowser auf Daten zugreifen</a:t>
+            </a:r>
+          </a:p>
+          <a:p>
+            <a:r>
+              <a:rPr lang="de-DE" dirty="0"/>
+              <a:t>Auch SaaS (Software </a:t>
+            </a:r>
+            <a:r>
+              <a:rPr lang="de-DE" dirty="0" err="1"/>
+              <a:t>as</a:t>
+            </a:r>
+            <a:r>
+              <a:rPr lang="de-DE" dirty="0"/>
+              <a:t> a Service) oder Online-/Web-CRM</a:t>
+            </a:r>
+          </a:p>
+          <a:p>
+            <a:endParaRPr lang="de-DE" dirty="0"/>
+          </a:p>
+          <a:p>
+            <a:pPr marL="0" indent="0">
+              <a:buNone/>
+            </a:pPr>
+            <a:r>
+              <a:rPr lang="de-DE" dirty="0"/>
+              <a:t>Gegenteil </a:t>
+            </a:r>
+            <a:r>
+              <a:rPr lang="de-DE" dirty="0">
+                <a:sym typeface="Wingdings" panose="05000000000000000000" pitchFamily="2" charset="2"/>
+              </a:rPr>
+              <a:t> Inhouse CRM</a:t>
+            </a:r>
+          </a:p>
+          <a:p>
+            <a:r>
+              <a:rPr lang="de-DE" dirty="0">
+                <a:sym typeface="Wingdings" panose="05000000000000000000" pitchFamily="2" charset="2"/>
+              </a:rPr>
+              <a:t>Auf Servern des Unternehmens</a:t>
+            </a:r>
+            <a:endParaRPr lang="de-DE" dirty="0"/>
+          </a:p>
+        </p:txBody>
+      </p:sp>
+    </p:spTree>
+    <p:extLst>
+      <p:ext uri="{BB962C8B-B14F-4D97-AF65-F5344CB8AC3E}">
+        <p14:creationId xmlns:p14="http://schemas.microsoft.com/office/powerpoint/2010/main" val="3915128059"/>
+      </p:ext>
+    </p:extLst>
+  </p:cSld>
+  <p:clrMapOvr>
+    <a:masterClrMapping/>
+  </p:clrMapOvr>
+</p:sld>
+</file>
+
+<file path=ppt/slides/slide15.xml><?xml version="1.0" encoding="utf-8"?>
+<p:sld xmlns:a="http://schemas.openxmlformats.org/drawingml/2006/main" xmlns:r="http://schemas.openxmlformats.org/officeDocument/2006/relationships" xmlns:p="http://schemas.openxmlformats.org/presentationml/2006/main">
+  <p:cSld>
+    <p:spTree>
+      <p:nvGrpSpPr>
+        <p:cNvPr id="1" name=""/>
+        <p:cNvGrpSpPr/>
+        <p:nvPr/>
+      </p:nvGrpSpPr>
+      <p:grpSpPr>
+        <a:xfrm>
+          <a:off x="0" y="0"/>
+          <a:ext cx="0" cy="0"/>
+          <a:chOff x="0" y="0"/>
+          <a:chExt cx="0" cy="0"/>
+        </a:xfrm>
+      </p:grpSpPr>
+      <p:sp>
+        <p:nvSpPr>
+          <p:cNvPr id="2" name="Titel 1">
+            <a:extLst>
+              <a:ext uri="{FF2B5EF4-FFF2-40B4-BE49-F238E27FC236}">
+                <a16:creationId xmlns:a16="http://schemas.microsoft.com/office/drawing/2014/main" id="{9F309B94-5B63-0B78-B54A-C2CF8BEA8C87}"/>
+              </a:ext>
+            </a:extLst>
+          </p:cNvPr>
+          <p:cNvSpPr>
+            <a:spLocks noGrp="1"/>
+          </p:cNvSpPr>
+          <p:nvPr>
+            <p:ph type="title"/>
+          </p:nvPr>
+        </p:nvSpPr>
+        <p:spPr/>
+        <p:txBody>
+          <a:bodyPr/>
+          <a:lstStyle/>
+          <a:p>
+            <a:r>
+              <a:rPr lang="de-DE" dirty="0"/>
+              <a:t>Vorteile von cloudbasiertem CRM</a:t>
+            </a:r>
+          </a:p>
+        </p:txBody>
+      </p:sp>
+      <p:sp>
+        <p:nvSpPr>
+          <p:cNvPr id="3" name="Inhaltsplatzhalter 2">
+            <a:extLst>
+              <a:ext uri="{FF2B5EF4-FFF2-40B4-BE49-F238E27FC236}">
+                <a16:creationId xmlns:a16="http://schemas.microsoft.com/office/drawing/2014/main" id="{98DE802F-461C-C0FD-86E0-B070E1DBBAB6}"/>
+              </a:ext>
+            </a:extLst>
+          </p:cNvPr>
+          <p:cNvSpPr>
+            <a:spLocks noGrp="1"/>
+          </p:cNvSpPr>
+          <p:nvPr>
+            <p:ph idx="1"/>
+          </p:nvPr>
+        </p:nvSpPr>
+        <p:spPr/>
+        <p:txBody>
+          <a:bodyPr/>
+          <a:lstStyle/>
+          <a:p>
+            <a:r>
+              <a:rPr lang="de-DE" dirty="0"/>
+              <a:t>Keine Hardware notwendig</a:t>
+            </a:r>
+          </a:p>
+          <a:p>
+            <a:r>
+              <a:rPr lang="de-DE" dirty="0"/>
+              <a:t>Geringere Kosten</a:t>
+            </a:r>
+          </a:p>
+          <a:p>
+            <a:r>
+              <a:rPr lang="de-DE" dirty="0"/>
+              <a:t>Zeitliche und örtliche Flexibilität</a:t>
+            </a:r>
+          </a:p>
+          <a:p>
+            <a:r>
+              <a:rPr lang="de-DE" dirty="0"/>
+              <a:t>Mit mobilen Endgeräten auf Daten zugreifen</a:t>
+            </a:r>
+          </a:p>
+          <a:p>
+            <a:r>
+              <a:rPr lang="de-DE" dirty="0"/>
+              <a:t>Höhere Sicherheit</a:t>
+            </a:r>
+          </a:p>
+        </p:txBody>
+      </p:sp>
+    </p:spTree>
+    <p:extLst>
+      <p:ext uri="{BB962C8B-B14F-4D97-AF65-F5344CB8AC3E}">
+        <p14:creationId xmlns:p14="http://schemas.microsoft.com/office/powerpoint/2010/main" val="122493801"/>
+      </p:ext>
+    </p:extLst>
+  </p:cSld>
+  <p:clrMapOvr>
+    <a:masterClrMapping/>
+  </p:clrMapOvr>
+</p:sld>
+</file>
+
+<file path=ppt/slides/slide16.xml><?xml version="1.0" encoding="utf-8"?>
+<p:sld xmlns:a="http://schemas.openxmlformats.org/drawingml/2006/main" xmlns:r="http://schemas.openxmlformats.org/officeDocument/2006/relationships" xmlns:p="http://schemas.openxmlformats.org/presentationml/2006/main">
+  <p:cSld>
+    <p:spTree>
+      <p:nvGrpSpPr>
+        <p:cNvPr id="1" name=""/>
+        <p:cNvGrpSpPr/>
+        <p:nvPr/>
+      </p:nvGrpSpPr>
+      <p:grpSpPr>
+        <a:xfrm>
+          <a:off x="0" y="0"/>
+          <a:ext cx="0" cy="0"/>
+          <a:chOff x="0" y="0"/>
+          <a:chExt cx="0" cy="0"/>
+        </a:xfrm>
+      </p:grpSpPr>
+      <p:sp>
+        <p:nvSpPr>
+          <p:cNvPr id="2" name="Titel 1">
+            <a:extLst>
+              <a:ext uri="{FF2B5EF4-FFF2-40B4-BE49-F238E27FC236}">
+                <a16:creationId xmlns:a16="http://schemas.microsoft.com/office/drawing/2014/main" id="{7FEB15A5-3792-715C-DC43-A89A17C8A7F3}"/>
+              </a:ext>
+            </a:extLst>
+          </p:cNvPr>
+          <p:cNvSpPr>
+            <a:spLocks noGrp="1"/>
+          </p:cNvSpPr>
+          <p:nvPr>
+            <p:ph type="title"/>
+          </p:nvPr>
+        </p:nvSpPr>
+        <p:spPr/>
+        <p:txBody>
+          <a:bodyPr/>
+          <a:lstStyle/>
+          <a:p>
+            <a:r>
+              <a:rPr lang="de-DE" dirty="0"/>
+              <a:t>KI und CRM</a:t>
+            </a:r>
+          </a:p>
+        </p:txBody>
+      </p:sp>
+      <p:sp>
+        <p:nvSpPr>
+          <p:cNvPr id="3" name="Inhaltsplatzhalter 2">
+            <a:extLst>
+              <a:ext uri="{FF2B5EF4-FFF2-40B4-BE49-F238E27FC236}">
+                <a16:creationId xmlns:a16="http://schemas.microsoft.com/office/drawing/2014/main" id="{CD217D6D-1132-F58F-E20D-02EDE39C7313}"/>
+              </a:ext>
+            </a:extLst>
+          </p:cNvPr>
+          <p:cNvSpPr>
+            <a:spLocks noGrp="1"/>
+          </p:cNvSpPr>
+          <p:nvPr>
+            <p:ph idx="1"/>
+          </p:nvPr>
+        </p:nvSpPr>
+        <p:spPr/>
+        <p:txBody>
+          <a:bodyPr/>
+          <a:lstStyle/>
+          <a:p>
+            <a:endParaRPr lang="de-DE"/>
+          </a:p>
+        </p:txBody>
+      </p:sp>
+    </p:spTree>
+    <p:extLst>
+      <p:ext uri="{BB962C8B-B14F-4D97-AF65-F5344CB8AC3E}">
+        <p14:creationId xmlns:p14="http://schemas.microsoft.com/office/powerpoint/2010/main" val="486286641"/>
+      </p:ext>
+    </p:extLst>
+  </p:cSld>
+  <p:clrMapOvr>
+    <a:masterClrMapping/>
+  </p:clrMapOvr>
+</p:sld>
+</file>
+
+<file path=ppt/slides/slide17.xml><?xml version="1.0" encoding="utf-8"?>
+<p:sld xmlns:a="http://schemas.openxmlformats.org/drawingml/2006/main" xmlns:r="http://schemas.openxmlformats.org/officeDocument/2006/relationships" xmlns:p="http://schemas.openxmlformats.org/presentationml/2006/main">
+  <p:cSld>
+    <p:spTree>
+      <p:nvGrpSpPr>
+        <p:cNvPr id="1" name=""/>
+        <p:cNvGrpSpPr/>
+        <p:nvPr/>
+      </p:nvGrpSpPr>
+      <p:grpSpPr>
+        <a:xfrm>
+          <a:off x="0" y="0"/>
+          <a:ext cx="0" cy="0"/>
+          <a:chOff x="0" y="0"/>
+          <a:chExt cx="0" cy="0"/>
+        </a:xfrm>
+      </p:grpSpPr>
+      <p:sp>
+        <p:nvSpPr>
+          <p:cNvPr id="2" name="Titel 1">
+            <a:extLst>
+              <a:ext uri="{FF2B5EF4-FFF2-40B4-BE49-F238E27FC236}">
+                <a16:creationId xmlns:a16="http://schemas.microsoft.com/office/drawing/2014/main" id="{CBEE4DFE-D485-6A43-A4BA-F91D3B9567E5}"/>
+              </a:ext>
+            </a:extLst>
+          </p:cNvPr>
+          <p:cNvSpPr>
+            <a:spLocks noGrp="1"/>
+          </p:cNvSpPr>
+          <p:nvPr>
+            <p:ph type="title"/>
+          </p:nvPr>
+        </p:nvSpPr>
+        <p:spPr/>
+        <p:txBody>
+          <a:bodyPr/>
+          <a:lstStyle/>
+          <a:p>
+            <a:r>
+              <a:rPr lang="de-DE" dirty="0"/>
+              <a:t>Vorteile von der Anwendung von KI bei CRM</a:t>
+            </a:r>
+          </a:p>
+        </p:txBody>
+      </p:sp>
+      <p:sp>
+        <p:nvSpPr>
+          <p:cNvPr id="3" name="Inhaltsplatzhalter 2">
+            <a:extLst>
+              <a:ext uri="{FF2B5EF4-FFF2-40B4-BE49-F238E27FC236}">
+                <a16:creationId xmlns:a16="http://schemas.microsoft.com/office/drawing/2014/main" id="{9DB65AFA-A65A-47E9-430C-8CDDF30AF48A}"/>
+              </a:ext>
+            </a:extLst>
+          </p:cNvPr>
+          <p:cNvSpPr>
+            <a:spLocks noGrp="1"/>
+          </p:cNvSpPr>
+          <p:nvPr>
+            <p:ph idx="1"/>
+          </p:nvPr>
+        </p:nvSpPr>
+        <p:spPr/>
+        <p:txBody>
+          <a:bodyPr/>
+          <a:lstStyle/>
+          <a:p>
+            <a:endParaRPr lang="de-DE"/>
+          </a:p>
+        </p:txBody>
+      </p:sp>
+    </p:spTree>
+    <p:extLst>
+      <p:ext uri="{BB962C8B-B14F-4D97-AF65-F5344CB8AC3E}">
+        <p14:creationId xmlns:p14="http://schemas.microsoft.com/office/powerpoint/2010/main" val="2556253994"/>
+      </p:ext>
+    </p:extLst>
+  </p:cSld>
+  <p:clrMapOvr>
+    <a:masterClrMapping/>
+  </p:clrMapOvr>
+</p:sld>
+</file>
+
+<file path=ppt/slides/slide2.xml><?xml version="1.0" encoding="utf-8"?>
+<p:sld xmlns:a="http://schemas.openxmlformats.org/drawingml/2006/main" xmlns:r="http://schemas.openxmlformats.org/officeDocument/2006/relationships" xmlns:p="http://schemas.openxmlformats.org/presentationml/2006/main">
+  <p:cSld>
+    <p:spTree>
+      <p:nvGrpSpPr>
+        <p:cNvPr id="1" name=""/>
+        <p:cNvGrpSpPr/>
+        <p:nvPr/>
+      </p:nvGrpSpPr>
+      <p:grpSpPr>
+        <a:xfrm>
+          <a:off x="0" y="0"/>
+          <a:ext cx="0" cy="0"/>
+          <a:chOff x="0" y="0"/>
+          <a:chExt cx="0" cy="0"/>
+        </a:xfrm>
+      </p:grpSpPr>
+      <p:sp>
+        <p:nvSpPr>
+          <p:cNvPr id="2" name="Titel 1">
+            <a:extLst>
+              <a:ext uri="{FF2B5EF4-FFF2-40B4-BE49-F238E27FC236}">
+                <a16:creationId xmlns:a16="http://schemas.microsoft.com/office/drawing/2014/main" id="{D35888CE-4D8C-C4DC-72B1-FB217E5D2FF7}"/>
+              </a:ext>
+            </a:extLst>
+          </p:cNvPr>
+          <p:cNvSpPr>
+            <a:spLocks noGrp="1"/>
+          </p:cNvSpPr>
+          <p:nvPr>
+            <p:ph type="title"/>
+          </p:nvPr>
+        </p:nvSpPr>
+        <p:spPr/>
+        <p:txBody>
+          <a:bodyPr/>
+          <a:lstStyle/>
+          <a:p>
+            <a:r>
+              <a:rPr lang="de-DE" dirty="0"/>
+              <a:t>Gliederung</a:t>
+            </a:r>
+          </a:p>
+        </p:txBody>
+      </p:sp>
+      <p:sp>
+        <p:nvSpPr>
+          <p:cNvPr id="3" name="Inhaltsplatzhalter 2">
+            <a:extLst>
+              <a:ext uri="{FF2B5EF4-FFF2-40B4-BE49-F238E27FC236}">
+                <a16:creationId xmlns:a16="http://schemas.microsoft.com/office/drawing/2014/main" id="{295DB2C8-2302-7E3A-76ED-8904A433FAC1}"/>
+              </a:ext>
+            </a:extLst>
+          </p:cNvPr>
+          <p:cNvSpPr>
+            <a:spLocks noGrp="1"/>
+          </p:cNvSpPr>
+          <p:nvPr>
+            <p:ph idx="1"/>
+          </p:nvPr>
+        </p:nvSpPr>
+        <p:spPr/>
+        <p:txBody>
+          <a:bodyPr/>
+          <a:lstStyle/>
+          <a:p>
+            <a:r>
+              <a:rPr lang="de-DE" dirty="0"/>
+              <a:t>Was ist ein CRM?</a:t>
+            </a:r>
+          </a:p>
+          <a:p>
+            <a:r>
+              <a:rPr lang="de-DE" dirty="0"/>
+              <a:t>Historie</a:t>
+            </a:r>
+          </a:p>
+          <a:p>
+            <a:r>
+              <a:rPr lang="de-DE" dirty="0"/>
+              <a:t>Arten des CRM</a:t>
+            </a:r>
+          </a:p>
+          <a:p>
+            <a:r>
+              <a:rPr lang="de-DE" dirty="0"/>
+              <a:t>Beispiel</a:t>
+            </a:r>
+          </a:p>
+          <a:p>
+            <a:r>
+              <a:rPr lang="de-DE" dirty="0"/>
+              <a:t>Herausforderungen</a:t>
+            </a:r>
+          </a:p>
+          <a:p>
+            <a:r>
+              <a:rPr lang="de-DE" dirty="0"/>
+              <a:t>Zukunftstrends</a:t>
+            </a:r>
+          </a:p>
+          <a:p>
+            <a:r>
+              <a:rPr lang="de-DE" dirty="0"/>
+              <a:t>KI</a:t>
+            </a:r>
+          </a:p>
+        </p:txBody>
+      </p:sp>
+    </p:spTree>
+    <p:extLst>
+      <p:ext uri="{BB962C8B-B14F-4D97-AF65-F5344CB8AC3E}">
+        <p14:creationId xmlns:p14="http://schemas.microsoft.com/office/powerpoint/2010/main" val="1280743430"/>
+      </p:ext>
+    </p:extLst>
+  </p:cSld>
+  <p:clrMapOvr>
+    <a:masterClrMapping/>
+  </p:clrMapOvr>
+</p:sld>
+</file>
+
+<file path=ppt/slides/slide3.xml><?xml version="1.0" encoding="utf-8"?>
 <p:sld xmlns:a="http://schemas.openxmlformats.org/drawingml/2006/main" xmlns:r="http://schemas.openxmlformats.org/officeDocument/2006/relationships" xmlns:p="http://schemas.openxmlformats.org/presentationml/2006/main">
   <p:cSld>
     <p:spTree>
@@ -12287,7 +12155,7 @@
 </p:sld>
 </file>
 
-<file path=ppt/slides/slide6.xml><?xml version="1.0" encoding="utf-8"?>
+<file path=ppt/slides/slide4.xml><?xml version="1.0" encoding="utf-8"?>
 <p:sld xmlns:a="http://schemas.openxmlformats.org/drawingml/2006/main" xmlns:r="http://schemas.openxmlformats.org/officeDocument/2006/relationships" xmlns:p="http://schemas.openxmlformats.org/presentationml/2006/main">
   <p:cSld>
     <p:spTree>
@@ -12385,7 +12253,234 @@
 </p:sld>
 </file>
 
-<file path=ppt/slides/slide7.xml><?xml version="1.0" encoding="utf-8"?>
+<file path=ppt/slides/slide5.xml><?xml version="1.0" encoding="utf-8"?>
+<p:sld xmlns:a="http://schemas.openxmlformats.org/drawingml/2006/main" xmlns:r="http://schemas.openxmlformats.org/officeDocument/2006/relationships" xmlns:p="http://schemas.openxmlformats.org/presentationml/2006/main">
+  <p:cSld>
+    <p:spTree>
+      <p:nvGrpSpPr>
+        <p:cNvPr id="1" name=""/>
+        <p:cNvGrpSpPr/>
+        <p:nvPr/>
+      </p:nvGrpSpPr>
+      <p:grpSpPr>
+        <a:xfrm>
+          <a:off x="0" y="0"/>
+          <a:ext cx="0" cy="0"/>
+          <a:chOff x="0" y="0"/>
+          <a:chExt cx="0" cy="0"/>
+        </a:xfrm>
+      </p:grpSpPr>
+      <p:sp>
+        <p:nvSpPr>
+          <p:cNvPr id="2" name="Titel 1">
+            <a:extLst>
+              <a:ext uri="{FF2B5EF4-FFF2-40B4-BE49-F238E27FC236}">
+                <a16:creationId xmlns:a16="http://schemas.microsoft.com/office/drawing/2014/main" id="{276FA261-A484-0DD7-12F3-737305D514DE}"/>
+              </a:ext>
+            </a:extLst>
+          </p:cNvPr>
+          <p:cNvSpPr>
+            <a:spLocks noGrp="1"/>
+          </p:cNvSpPr>
+          <p:nvPr>
+            <p:ph type="title"/>
+          </p:nvPr>
+        </p:nvSpPr>
+        <p:spPr/>
+        <p:txBody>
+          <a:bodyPr/>
+          <a:lstStyle/>
+          <a:p>
+            <a:r>
+              <a:rPr lang="de-DE" dirty="0"/>
+              <a:t>Warum CRM?</a:t>
+            </a:r>
+          </a:p>
+        </p:txBody>
+      </p:sp>
+      <p:pic>
+        <p:nvPicPr>
+          <p:cNvPr id="4" name="Onlinemedien 3" title="CRM Software und wofür man sie braucht">
+            <a:hlinkClick r:id="" action="ppaction://media"/>
+            <a:extLst>
+              <a:ext uri="{FF2B5EF4-FFF2-40B4-BE49-F238E27FC236}">
+                <a16:creationId xmlns:a16="http://schemas.microsoft.com/office/drawing/2014/main" id="{6F7D3915-81A7-699A-B419-45134D400AED}"/>
+              </a:ext>
+            </a:extLst>
+          </p:cNvPr>
+          <p:cNvPicPr>
+            <a:picLocks noGrp="1" noRot="1" noChangeAspect="1"/>
+          </p:cNvPicPr>
+          <p:nvPr>
+            <p:ph idx="1"/>
+            <a:videoFile r:link="rId1"/>
+          </p:nvPr>
+        </p:nvPicPr>
+        <p:blipFill>
+          <a:blip r:embed="rId3"/>
+          <a:stretch>
+            <a:fillRect/>
+          </a:stretch>
+        </p:blipFill>
+        <p:spPr>
+          <a:xfrm>
+            <a:off x="2245519" y="1951945"/>
+            <a:ext cx="7700962" cy="4351338"/>
+          </a:xfrm>
+          <a:prstGeom prst="rect">
+            <a:avLst/>
+          </a:prstGeom>
+        </p:spPr>
+      </p:pic>
+    </p:spTree>
+    <p:extLst>
+      <p:ext uri="{BB962C8B-B14F-4D97-AF65-F5344CB8AC3E}">
+        <p14:creationId xmlns:p14="http://schemas.microsoft.com/office/powerpoint/2010/main" val="265600694"/>
+      </p:ext>
+    </p:extLst>
+  </p:cSld>
+  <p:clrMapOvr>
+    <a:masterClrMapping/>
+  </p:clrMapOvr>
+  <p:timing>
+    <p:tnLst>
+      <p:par>
+        <p:cTn id="1" dur="indefinite" restart="never" nodeType="tmRoot">
+          <p:childTnLst>
+            <p:seq concurrent="1" nextAc="seek">
+              <p:cTn id="2" dur="indefinite" nodeType="mainSeq">
+                <p:childTnLst>
+                  <p:par>
+                    <p:cTn id="3" fill="hold">
+                      <p:stCondLst>
+                        <p:cond delay="indefinite"/>
+                      </p:stCondLst>
+                      <p:childTnLst>
+                        <p:par>
+                          <p:cTn id="4" fill="hold">
+                            <p:stCondLst>
+                              <p:cond delay="0"/>
+                            </p:stCondLst>
+                            <p:childTnLst>
+                              <p:par>
+                                <p:cTn id="5" presetID="1" presetClass="mediacall" presetSubtype="0" fill="hold" nodeType="clickEffect">
+                                  <p:stCondLst>
+                                    <p:cond delay="0"/>
+                                  </p:stCondLst>
+                                  <p:childTnLst>
+                                    <p:cmd type="call" cmd="playFrom(0.0)">
+                                      <p:cBhvr>
+                                        <p:cTn id="6" dur="1" fill="hold"/>
+                                        <p:tgtEl>
+                                          <p:spTgt spid="4"/>
+                                        </p:tgtEl>
+                                      </p:cBhvr>
+                                    </p:cmd>
+                                  </p:childTnLst>
+                                </p:cTn>
+                              </p:par>
+                            </p:childTnLst>
+                          </p:cTn>
+                        </p:par>
+                      </p:childTnLst>
+                    </p:cTn>
+                  </p:par>
+                </p:childTnLst>
+              </p:cTn>
+              <p:prevCondLst>
+                <p:cond evt="onPrev" delay="0">
+                  <p:tgtEl>
+                    <p:sldTgt/>
+                  </p:tgtEl>
+                </p:cond>
+              </p:prevCondLst>
+              <p:nextCondLst>
+                <p:cond evt="onNext" delay="0">
+                  <p:tgtEl>
+                    <p:sldTgt/>
+                  </p:tgtEl>
+                </p:cond>
+              </p:nextCondLst>
+            </p:seq>
+            <p:video>
+              <p:cMediaNode vol="80000">
+                <p:cTn id="7" fill="hold" display="0">
+                  <p:stCondLst>
+                    <p:cond delay="indefinite"/>
+                  </p:stCondLst>
+                </p:cTn>
+                <p:tgtEl>
+                  <p:spTgt spid="4"/>
+                </p:tgtEl>
+              </p:cMediaNode>
+            </p:video>
+            <p:seq concurrent="1" nextAc="seek">
+              <p:cTn id="8" restart="whenNotActive" fill="hold" evtFilter="cancelBubble" nodeType="interactiveSeq">
+                <p:stCondLst>
+                  <p:cond evt="onClick" delay="0">
+                    <p:tgtEl>
+                      <p:spTgt spid="4"/>
+                    </p:tgtEl>
+                  </p:cond>
+                </p:stCondLst>
+                <p:endSync evt="end" delay="0">
+                  <p:rtn val="all"/>
+                </p:endSync>
+                <p:childTnLst>
+                  <p:par>
+                    <p:cTn id="9" fill="hold">
+                      <p:stCondLst>
+                        <p:cond delay="0"/>
+                      </p:stCondLst>
+                      <p:childTnLst>
+                        <p:par>
+                          <p:cTn id="10" fill="hold">
+                            <p:stCondLst>
+                              <p:cond delay="0"/>
+                            </p:stCondLst>
+                            <p:childTnLst>
+                              <p:par>
+                                <p:cTn id="11" presetID="2" presetClass="mediacall" presetSubtype="0" fill="hold" nodeType="clickEffect">
+                                  <p:stCondLst>
+                                    <p:cond delay="0"/>
+                                  </p:stCondLst>
+                                  <p:childTnLst>
+                                    <p:cmd type="call" cmd="togglePause">
+                                      <p:cBhvr>
+                                        <p:cTn id="12" dur="1" fill="hold"/>
+                                        <p:tgtEl>
+                                          <p:spTgt spid="4"/>
+                                        </p:tgtEl>
+                                      </p:cBhvr>
+                                    </p:cmd>
+                                  </p:childTnLst>
+                                </p:cTn>
+                              </p:par>
+                            </p:childTnLst>
+                          </p:cTn>
+                        </p:par>
+                      </p:childTnLst>
+                    </p:cTn>
+                  </p:par>
+                </p:childTnLst>
+              </p:cTn>
+              <p:nextCondLst>
+                <p:cond evt="onClick" delay="0">
+                  <p:tgtEl>
+                    <p:spTgt spid="4"/>
+                  </p:tgtEl>
+                </p:cond>
+              </p:nextCondLst>
+            </p:seq>
+          </p:childTnLst>
+        </p:cTn>
+      </p:par>
+    </p:tnLst>
+  </p:timing>
+</p:sld>
+</file>
+
+<file path=ppt/slides/slide6.xml><?xml version="1.0" encoding="utf-8"?>
 <p:sld xmlns:a="http://schemas.openxmlformats.org/drawingml/2006/main" xmlns:r="http://schemas.openxmlformats.org/officeDocument/2006/relationships" xmlns:p="http://schemas.openxmlformats.org/presentationml/2006/main">
   <p:cSld>
     <p:spTree>
@@ -12577,7 +12672,7 @@
 </p:sld>
 </file>
 
-<file path=ppt/slides/slide8.xml><?xml version="1.0" encoding="utf-8"?>
+<file path=ppt/slides/slide7.xml><?xml version="1.0" encoding="utf-8"?>
 <p:sld xmlns:a="http://schemas.openxmlformats.org/drawingml/2006/main" xmlns:r="http://schemas.openxmlformats.org/officeDocument/2006/relationships" xmlns:p="http://schemas.openxmlformats.org/presentationml/2006/main">
   <p:cSld>
     <p:spTree>
@@ -12599,7 +12694,7 @@
           <p:cNvPr id="2" name="Titel 1">
             <a:extLst>
               <a:ext uri="{FF2B5EF4-FFF2-40B4-BE49-F238E27FC236}">
-                <a16:creationId xmlns:a16="http://schemas.microsoft.com/office/drawing/2014/main" id="{0111187B-07A4-A9BD-C3EC-2EE9C1E91D5D}"/>
+                <a16:creationId xmlns:a16="http://schemas.microsoft.com/office/drawing/2014/main" id="{A965F112-4829-303F-91EE-66DF5B8B651E}"/>
               </a:ext>
             </a:extLst>
           </p:cNvPr>
@@ -12618,46 +12713,128 @@
             <a:pPr algn="ctr"/>
             <a:r>
               <a:rPr lang="de-DE" dirty="0"/>
-              <a:t>Wirkungskette des CRM</a:t>
+              <a:t>Lead vs. Kunde</a:t>
             </a:r>
           </a:p>
         </p:txBody>
       </p:sp>
-      <p:graphicFrame>
-        <p:nvGraphicFramePr>
-          <p:cNvPr id="4" name="Inhaltsplatzhalter 3">
+      <p:sp>
+        <p:nvSpPr>
+          <p:cNvPr id="5" name="Inhaltsplatzhalter 4">
             <a:extLst>
               <a:ext uri="{FF2B5EF4-FFF2-40B4-BE49-F238E27FC236}">
-                <a16:creationId xmlns:a16="http://schemas.microsoft.com/office/drawing/2014/main" id="{16A0119B-BB65-36C2-E229-816526916DC5}"/>
+                <a16:creationId xmlns:a16="http://schemas.microsoft.com/office/drawing/2014/main" id="{9F56ECBB-9519-4197-B114-735C07CC727B}"/>
               </a:ext>
             </a:extLst>
           </p:cNvPr>
-          <p:cNvGraphicFramePr>
-            <a:graphicFrameLocks noGrp="1"/>
-          </p:cNvGraphicFramePr>
+          <p:cNvSpPr>
+            <a:spLocks noGrp="1"/>
+          </p:cNvSpPr>
           <p:nvPr>
-            <p:ph idx="1"/>
-            <p:extLst>
-              <p:ext uri="{D42A27DB-BD31-4B8C-83A1-F6EECF244321}">
-                <p14:modId xmlns:p14="http://schemas.microsoft.com/office/powerpoint/2010/main" val="1605213468"/>
-              </p:ext>
-            </p:extLst>
+            <p:ph sz="half" idx="2"/>
           </p:nvPr>
-        </p:nvGraphicFramePr>
-        <p:xfrm>
-          <a:off x="838200" y="1825625"/>
-          <a:ext cx="10515600" cy="4351338"/>
-        </p:xfrm>
-        <a:graphic>
-          <a:graphicData uri="http://schemas.openxmlformats.org/drawingml/2006/diagram">
-            <dgm:relIds xmlns:dgm="http://schemas.openxmlformats.org/drawingml/2006/diagram" xmlns:r="http://schemas.openxmlformats.org/officeDocument/2006/relationships" r:dm="rId2" r:lo="rId3" r:qs="rId4" r:cs="rId5"/>
-          </a:graphicData>
-        </a:graphic>
-      </p:graphicFrame>
+        </p:nvSpPr>
+        <p:spPr/>
+        <p:txBody>
+          <a:bodyPr/>
+          <a:lstStyle/>
+          <a:p>
+            <a:r>
+              <a:rPr lang="de-DE" dirty="0"/>
+              <a:t>Potentieller Kunde</a:t>
+            </a:r>
+          </a:p>
+          <a:p>
+            <a:r>
+              <a:rPr lang="de-DE" dirty="0"/>
+              <a:t>unbekannte Wirtschaftskraft</a:t>
+            </a:r>
+          </a:p>
+          <a:p>
+            <a:r>
+              <a:rPr lang="de-DE" dirty="0"/>
+              <a:t>unbekanntes Kaufverhalten</a:t>
+            </a:r>
+          </a:p>
+          <a:p>
+            <a:r>
+              <a:rPr lang="de-DE" dirty="0"/>
+              <a:t>Bedürfnisermittlung</a:t>
+            </a:r>
+          </a:p>
+          <a:p>
+            <a:endParaRPr lang="de-DE" dirty="0"/>
+          </a:p>
+          <a:p>
+            <a:endParaRPr lang="de-DE" dirty="0"/>
+          </a:p>
+          <a:p>
+            <a:endParaRPr lang="de-DE" dirty="0"/>
+          </a:p>
+          <a:p>
+            <a:endParaRPr lang="de-DE" dirty="0"/>
+          </a:p>
+        </p:txBody>
+      </p:sp>
+      <p:sp>
+        <p:nvSpPr>
+          <p:cNvPr id="7" name="Inhaltsplatzhalter 6">
+            <a:extLst>
+              <a:ext uri="{FF2B5EF4-FFF2-40B4-BE49-F238E27FC236}">
+                <a16:creationId xmlns:a16="http://schemas.microsoft.com/office/drawing/2014/main" id="{B4EDF357-F95E-511D-6914-0C489535C25D}"/>
+              </a:ext>
+            </a:extLst>
+          </p:cNvPr>
+          <p:cNvSpPr>
+            <a:spLocks noGrp="1"/>
+          </p:cNvSpPr>
+          <p:nvPr>
+            <p:ph sz="quarter" idx="4"/>
+          </p:nvPr>
+        </p:nvSpPr>
+        <p:spPr/>
+        <p:txBody>
+          <a:bodyPr/>
+          <a:lstStyle/>
+          <a:p>
+            <a:r>
+              <a:rPr lang="de-DE" dirty="0"/>
+              <a:t>Bedürfnisse bekannt</a:t>
+            </a:r>
+          </a:p>
+          <a:p>
+            <a:r>
+              <a:rPr lang="de-DE" dirty="0"/>
+              <a:t>Kontakt bereits hergestellt</a:t>
+            </a:r>
+          </a:p>
+          <a:p>
+            <a:r>
+              <a:rPr lang="de-DE" dirty="0"/>
+              <a:t>Informationen über Zusatzprodukte </a:t>
+            </a:r>
+          </a:p>
+          <a:p>
+            <a:r>
+              <a:rPr lang="de-DE" dirty="0"/>
+              <a:t>Servicebindung</a:t>
+            </a:r>
+          </a:p>
+          <a:p>
+            <a:r>
+              <a:rPr lang="de-DE" dirty="0"/>
+              <a:t>ABC Klassifizierung</a:t>
+            </a:r>
+          </a:p>
+          <a:p>
+            <a:endParaRPr lang="de-DE" dirty="0"/>
+          </a:p>
+        </p:txBody>
+      </p:sp>
     </p:spTree>
     <p:extLst>
       <p:ext uri="{BB962C8B-B14F-4D97-AF65-F5344CB8AC3E}">
-        <p14:creationId xmlns:p14="http://schemas.microsoft.com/office/powerpoint/2010/main" val="1736304696"/>
+        <p14:creationId xmlns:p14="http://schemas.microsoft.com/office/powerpoint/2010/main" val="4209253751"/>
       </p:ext>
     </p:extLst>
   </p:cSld>
@@ -12667,7 +12844,7 @@
 </p:sld>
 </file>
 
-<file path=ppt/slides/slide9.xml><?xml version="1.0" encoding="utf-8"?>
+<file path=ppt/slides/slide8.xml><?xml version="1.0" encoding="utf-8"?>
 <p:sld xmlns:a="http://schemas.openxmlformats.org/drawingml/2006/main" xmlns:r="http://schemas.openxmlformats.org/officeDocument/2006/relationships" xmlns:p="http://schemas.openxmlformats.org/presentationml/2006/main">
   <p:cSld>
     <p:spTree>
@@ -12752,6 +12929,96 @@
     <p:extLst>
       <p:ext uri="{BB962C8B-B14F-4D97-AF65-F5344CB8AC3E}">
         <p14:creationId xmlns:p14="http://schemas.microsoft.com/office/powerpoint/2010/main" val="1654795500"/>
+      </p:ext>
+    </p:extLst>
+  </p:cSld>
+  <p:clrMapOvr>
+    <a:masterClrMapping/>
+  </p:clrMapOvr>
+</p:sld>
+</file>
+
+<file path=ppt/slides/slide9.xml><?xml version="1.0" encoding="utf-8"?>
+<p:sld xmlns:a="http://schemas.openxmlformats.org/drawingml/2006/main" xmlns:r="http://schemas.openxmlformats.org/officeDocument/2006/relationships" xmlns:p="http://schemas.openxmlformats.org/presentationml/2006/main">
+  <p:cSld>
+    <p:spTree>
+      <p:nvGrpSpPr>
+        <p:cNvPr id="1" name=""/>
+        <p:cNvGrpSpPr/>
+        <p:nvPr/>
+      </p:nvGrpSpPr>
+      <p:grpSpPr>
+        <a:xfrm>
+          <a:off x="0" y="0"/>
+          <a:ext cx="0" cy="0"/>
+          <a:chOff x="0" y="0"/>
+          <a:chExt cx="0" cy="0"/>
+        </a:xfrm>
+      </p:grpSpPr>
+      <p:sp>
+        <p:nvSpPr>
+          <p:cNvPr id="2" name="Titel 1">
+            <a:extLst>
+              <a:ext uri="{FF2B5EF4-FFF2-40B4-BE49-F238E27FC236}">
+                <a16:creationId xmlns:a16="http://schemas.microsoft.com/office/drawing/2014/main" id="{0111187B-07A4-A9BD-C3EC-2EE9C1E91D5D}"/>
+              </a:ext>
+            </a:extLst>
+          </p:cNvPr>
+          <p:cNvSpPr>
+            <a:spLocks noGrp="1"/>
+          </p:cNvSpPr>
+          <p:nvPr>
+            <p:ph type="title"/>
+          </p:nvPr>
+        </p:nvSpPr>
+        <p:spPr/>
+        <p:txBody>
+          <a:bodyPr/>
+          <a:lstStyle/>
+          <a:p>
+            <a:pPr algn="ctr"/>
+            <a:r>
+              <a:rPr lang="de-DE" dirty="0"/>
+              <a:t>Wirkungskette des CRM</a:t>
+            </a:r>
+          </a:p>
+        </p:txBody>
+      </p:sp>
+      <p:graphicFrame>
+        <p:nvGraphicFramePr>
+          <p:cNvPr id="4" name="Inhaltsplatzhalter 3">
+            <a:extLst>
+              <a:ext uri="{FF2B5EF4-FFF2-40B4-BE49-F238E27FC236}">
+                <a16:creationId xmlns:a16="http://schemas.microsoft.com/office/drawing/2014/main" id="{16A0119B-BB65-36C2-E229-816526916DC5}"/>
+              </a:ext>
+            </a:extLst>
+          </p:cNvPr>
+          <p:cNvGraphicFramePr>
+            <a:graphicFrameLocks noGrp="1"/>
+          </p:cNvGraphicFramePr>
+          <p:nvPr>
+            <p:ph idx="1"/>
+            <p:extLst>
+              <p:ext uri="{D42A27DB-BD31-4B8C-83A1-F6EECF244321}">
+                <p14:modId xmlns:p14="http://schemas.microsoft.com/office/powerpoint/2010/main" val="1605213468"/>
+              </p:ext>
+            </p:extLst>
+          </p:nvPr>
+        </p:nvGraphicFramePr>
+        <p:xfrm>
+          <a:off x="838200" y="1825625"/>
+          <a:ext cx="10515600" cy="4351338"/>
+        </p:xfrm>
+        <a:graphic>
+          <a:graphicData uri="http://schemas.openxmlformats.org/drawingml/2006/diagram">
+            <dgm:relIds xmlns:dgm="http://schemas.openxmlformats.org/drawingml/2006/diagram" xmlns:r="http://schemas.openxmlformats.org/officeDocument/2006/relationships" r:dm="rId2" r:lo="rId3" r:qs="rId4" r:cs="rId5"/>
+          </a:graphicData>
+        </a:graphic>
+      </p:graphicFrame>
+    </p:spTree>
+    <p:extLst>
+      <p:ext uri="{BB962C8B-B14F-4D97-AF65-F5344CB8AC3E}">
+        <p14:creationId xmlns:p14="http://schemas.microsoft.com/office/powerpoint/2010/main" val="1736304696"/>
       </p:ext>
     </p:extLst>
   </p:cSld>

</xml_diff>

<commit_message>
Handout geaddet, Vikas Teil ppt fertig
</commit_message>
<xml_diff>
--- a/CRM.pptx
+++ b/CRM.pptx
@@ -5,40 +5,41 @@
     <p:sldMasterId id="2147483720" r:id="rId1"/>
   </p:sldMasterIdLst>
   <p:notesMasterIdLst>
-    <p:notesMasterId r:id="rId33"/>
+    <p:notesMasterId r:id="rId34"/>
   </p:notesMasterIdLst>
   <p:sldIdLst>
     <p:sldId id="256" r:id="rId2"/>
     <p:sldId id="272" r:id="rId3"/>
     <p:sldId id="263" r:id="rId4"/>
     <p:sldId id="257" r:id="rId5"/>
-    <p:sldId id="264" r:id="rId6"/>
-    <p:sldId id="259" r:id="rId7"/>
-    <p:sldId id="258" r:id="rId8"/>
-    <p:sldId id="261" r:id="rId9"/>
-    <p:sldId id="287" r:id="rId10"/>
-    <p:sldId id="260" r:id="rId11"/>
-    <p:sldId id="262" r:id="rId12"/>
-    <p:sldId id="265" r:id="rId13"/>
-    <p:sldId id="276" r:id="rId14"/>
-    <p:sldId id="277" r:id="rId15"/>
-    <p:sldId id="278" r:id="rId16"/>
-    <p:sldId id="279" r:id="rId17"/>
-    <p:sldId id="280" r:id="rId18"/>
-    <p:sldId id="281" r:id="rId19"/>
-    <p:sldId id="282" r:id="rId20"/>
-    <p:sldId id="286" r:id="rId21"/>
-    <p:sldId id="283" r:id="rId22"/>
-    <p:sldId id="284" r:id="rId23"/>
-    <p:sldId id="285" r:id="rId24"/>
-    <p:sldId id="266" r:id="rId25"/>
-    <p:sldId id="270" r:id="rId26"/>
-    <p:sldId id="271" r:id="rId27"/>
-    <p:sldId id="268" r:id="rId28"/>
-    <p:sldId id="267" r:id="rId29"/>
-    <p:sldId id="273" r:id="rId30"/>
-    <p:sldId id="274" r:id="rId31"/>
-    <p:sldId id="275" r:id="rId32"/>
+    <p:sldId id="259" r:id="rId6"/>
+    <p:sldId id="258" r:id="rId7"/>
+    <p:sldId id="261" r:id="rId8"/>
+    <p:sldId id="287" r:id="rId9"/>
+    <p:sldId id="260" r:id="rId10"/>
+    <p:sldId id="262" r:id="rId11"/>
+    <p:sldId id="265" r:id="rId12"/>
+    <p:sldId id="276" r:id="rId13"/>
+    <p:sldId id="277" r:id="rId14"/>
+    <p:sldId id="278" r:id="rId15"/>
+    <p:sldId id="279" r:id="rId16"/>
+    <p:sldId id="280" r:id="rId17"/>
+    <p:sldId id="281" r:id="rId18"/>
+    <p:sldId id="282" r:id="rId19"/>
+    <p:sldId id="286" r:id="rId20"/>
+    <p:sldId id="283" r:id="rId21"/>
+    <p:sldId id="284" r:id="rId22"/>
+    <p:sldId id="285" r:id="rId23"/>
+    <p:sldId id="266" r:id="rId24"/>
+    <p:sldId id="270" r:id="rId25"/>
+    <p:sldId id="271" r:id="rId26"/>
+    <p:sldId id="268" r:id="rId27"/>
+    <p:sldId id="267" r:id="rId28"/>
+    <p:sldId id="273" r:id="rId29"/>
+    <p:sldId id="274" r:id="rId30"/>
+    <p:sldId id="275" r:id="rId31"/>
+    <p:sldId id="288" r:id="rId32"/>
+    <p:sldId id="289" r:id="rId33"/>
   </p:sldIdLst>
   <p:sldSz cx="12192000" cy="6858000"/>
   <p:notesSz cx="6858000" cy="9144000"/>
@@ -7543,7 +7544,32 @@
           <a:bodyPr/>
           <a:lstStyle/>
           <a:p>
-            <a:endParaRPr lang="de-DE" dirty="0"/>
+            <a:r>
+              <a:rPr lang="de-DE" dirty="0"/>
+              <a:t>Anbietermarkt -&gt; Nachfragemarkt, gesättigter Markt, </a:t>
+            </a:r>
+            <a:r>
+              <a:rPr lang="de-DE" dirty="0" err="1"/>
+              <a:t>austausc´hbare</a:t>
+            </a:r>
+            <a:r>
+              <a:rPr lang="de-DE" dirty="0"/>
+              <a:t> Produkte, </a:t>
+            </a:r>
+            <a:r>
+              <a:rPr lang="de-DE" dirty="0" err="1"/>
+              <a:t>gestiegende</a:t>
+            </a:r>
+            <a:r>
+              <a:rPr lang="de-DE" dirty="0"/>
+              <a:t> Markttransparenz</a:t>
+            </a:r>
+          </a:p>
+          <a:p>
+            <a:r>
+              <a:rPr lang="de-DE" dirty="0"/>
+              <a:t>Kundenzufriedenheit: Mundpropaganda, weniger Kundenabwanderung, Wiederverkaufsrate, geringe Preisempfindlichkeit, sinkende Marketing, </a:t>
+            </a:r>
           </a:p>
         </p:txBody>
       </p:sp>
@@ -7573,7 +7599,7 @@
     </p:spTree>
     <p:extLst>
       <p:ext uri="{BB962C8B-B14F-4D97-AF65-F5344CB8AC3E}">
-        <p14:creationId xmlns:p14="http://schemas.microsoft.com/office/powerpoint/2010/main" val="645085384"/>
+        <p14:creationId xmlns:p14="http://schemas.microsoft.com/office/powerpoint/2010/main" val="3698299510"/>
       </p:ext>
     </p:extLst>
   </p:cSld>
@@ -7627,32 +7653,7 @@
           <a:bodyPr/>
           <a:lstStyle/>
           <a:p>
-            <a:r>
-              <a:rPr lang="de-DE" dirty="0"/>
-              <a:t>Anbietermarkt -&gt; Nachfragemarkt, gesättigter Markt, </a:t>
-            </a:r>
-            <a:r>
-              <a:rPr lang="de-DE" dirty="0" err="1"/>
-              <a:t>austausc´hbare</a:t>
-            </a:r>
-            <a:r>
-              <a:rPr lang="de-DE" dirty="0"/>
-              <a:t> Produkte, </a:t>
-            </a:r>
-            <a:r>
-              <a:rPr lang="de-DE" dirty="0" err="1"/>
-              <a:t>gestiegende</a:t>
-            </a:r>
-            <a:r>
-              <a:rPr lang="de-DE" dirty="0"/>
-              <a:t> Markttransparenz</a:t>
-            </a:r>
-          </a:p>
-          <a:p>
-            <a:r>
-              <a:rPr lang="de-DE" dirty="0"/>
-              <a:t>Kundenzufriedenheit: Mundpropaganda, weniger Kundenabwanderung, Wiederverkaufsrate, geringe Preisempfindlichkeit, sinkende Marketing, </a:t>
-            </a:r>
+            <a:endParaRPr lang="de-DE" dirty="0"/>
           </a:p>
         </p:txBody>
       </p:sp>
@@ -7673,91 +7674,7 @@
           <a:p>
             <a:fld id="{541701BE-069E-49EA-A8B8-5819325C202F}" type="slidenum">
               <a:rPr lang="de-DE" smtClean="0"/>
-              <a:t>6</a:t>
-            </a:fld>
-            <a:endParaRPr lang="de-DE"/>
-          </a:p>
-        </p:txBody>
-      </p:sp>
-    </p:spTree>
-    <p:extLst>
-      <p:ext uri="{BB962C8B-B14F-4D97-AF65-F5344CB8AC3E}">
-        <p14:creationId xmlns:p14="http://schemas.microsoft.com/office/powerpoint/2010/main" val="3698299510"/>
-      </p:ext>
-    </p:extLst>
-  </p:cSld>
-  <p:clrMapOvr>
-    <a:masterClrMapping/>
-  </p:clrMapOvr>
-</p:notes>
-</file>
-
-<file path=ppt/notesSlides/notesSlide3.xml><?xml version="1.0" encoding="utf-8"?>
-<p:notes xmlns:a="http://schemas.openxmlformats.org/drawingml/2006/main" xmlns:r="http://schemas.openxmlformats.org/officeDocument/2006/relationships" xmlns:p="http://schemas.openxmlformats.org/presentationml/2006/main">
-  <p:cSld>
-    <p:spTree>
-      <p:nvGrpSpPr>
-        <p:cNvPr id="1" name=""/>
-        <p:cNvGrpSpPr/>
-        <p:nvPr/>
-      </p:nvGrpSpPr>
-      <p:grpSpPr>
-        <a:xfrm>
-          <a:off x="0" y="0"/>
-          <a:ext cx="0" cy="0"/>
-          <a:chOff x="0" y="0"/>
-          <a:chExt cx="0" cy="0"/>
-        </a:xfrm>
-      </p:grpSpPr>
-      <p:sp>
-        <p:nvSpPr>
-          <p:cNvPr id="2" name="Folienbildplatzhalter 1"/>
-          <p:cNvSpPr>
-            <a:spLocks noGrp="1" noRot="1" noChangeAspect="1"/>
-          </p:cNvSpPr>
-          <p:nvPr>
-            <p:ph type="sldImg"/>
-          </p:nvPr>
-        </p:nvSpPr>
-        <p:spPr/>
-      </p:sp>
-      <p:sp>
-        <p:nvSpPr>
-          <p:cNvPr id="3" name="Notizenplatzhalter 2"/>
-          <p:cNvSpPr>
-            <a:spLocks noGrp="1"/>
-          </p:cNvSpPr>
-          <p:nvPr>
-            <p:ph type="body" idx="1"/>
-          </p:nvPr>
-        </p:nvSpPr>
-        <p:spPr/>
-        <p:txBody>
-          <a:bodyPr/>
-          <a:lstStyle/>
-          <a:p>
-            <a:endParaRPr lang="de-DE" dirty="0"/>
-          </a:p>
-        </p:txBody>
-      </p:sp>
-      <p:sp>
-        <p:nvSpPr>
-          <p:cNvPr id="4" name="Foliennummernplatzhalter 3"/>
-          <p:cNvSpPr>
-            <a:spLocks noGrp="1"/>
-          </p:cNvSpPr>
-          <p:nvPr>
-            <p:ph type="sldNum" sz="quarter" idx="5"/>
-          </p:nvPr>
-        </p:nvSpPr>
-        <p:spPr/>
-        <p:txBody>
-          <a:bodyPr/>
-          <a:lstStyle/>
-          <a:p>
-            <a:fld id="{541701BE-069E-49EA-A8B8-5819325C202F}" type="slidenum">
-              <a:rPr lang="de-DE" smtClean="0"/>
-              <a:t>12</a:t>
+              <a:t>11</a:t>
             </a:fld>
             <a:endParaRPr lang="de-DE"/>
           </a:p>
@@ -11188,96 +11105,6 @@
           <p:cNvPr id="2" name="Titel 1">
             <a:extLst>
               <a:ext uri="{FF2B5EF4-FFF2-40B4-BE49-F238E27FC236}">
-                <a16:creationId xmlns:a16="http://schemas.microsoft.com/office/drawing/2014/main" id="{0111187B-07A4-A9BD-C3EC-2EE9C1E91D5D}"/>
-              </a:ext>
-            </a:extLst>
-          </p:cNvPr>
-          <p:cNvSpPr>
-            <a:spLocks noGrp="1"/>
-          </p:cNvSpPr>
-          <p:nvPr>
-            <p:ph type="title"/>
-          </p:nvPr>
-        </p:nvSpPr>
-        <p:spPr/>
-        <p:txBody>
-          <a:bodyPr/>
-          <a:lstStyle/>
-          <a:p>
-            <a:pPr algn="ctr"/>
-            <a:r>
-              <a:rPr lang="de-DE" dirty="0"/>
-              <a:t>Wirkungskette des CRM</a:t>
-            </a:r>
-          </a:p>
-        </p:txBody>
-      </p:sp>
-      <p:graphicFrame>
-        <p:nvGraphicFramePr>
-          <p:cNvPr id="4" name="Inhaltsplatzhalter 3">
-            <a:extLst>
-              <a:ext uri="{FF2B5EF4-FFF2-40B4-BE49-F238E27FC236}">
-                <a16:creationId xmlns:a16="http://schemas.microsoft.com/office/drawing/2014/main" id="{16A0119B-BB65-36C2-E229-816526916DC5}"/>
-              </a:ext>
-            </a:extLst>
-          </p:cNvPr>
-          <p:cNvGraphicFramePr>
-            <a:graphicFrameLocks noGrp="1"/>
-          </p:cNvGraphicFramePr>
-          <p:nvPr>
-            <p:ph idx="1"/>
-            <p:extLst>
-              <p:ext uri="{D42A27DB-BD31-4B8C-83A1-F6EECF244321}">
-                <p14:modId xmlns:p14="http://schemas.microsoft.com/office/powerpoint/2010/main" val="1605213468"/>
-              </p:ext>
-            </p:extLst>
-          </p:nvPr>
-        </p:nvGraphicFramePr>
-        <p:xfrm>
-          <a:off x="838200" y="1825625"/>
-          <a:ext cx="10515600" cy="4351338"/>
-        </p:xfrm>
-        <a:graphic>
-          <a:graphicData uri="http://schemas.openxmlformats.org/drawingml/2006/diagram">
-            <dgm:relIds xmlns:dgm="http://schemas.openxmlformats.org/drawingml/2006/diagram" xmlns:r="http://schemas.openxmlformats.org/officeDocument/2006/relationships" r:dm="rId2" r:lo="rId3" r:qs="rId4" r:cs="rId5"/>
-          </a:graphicData>
-        </a:graphic>
-      </p:graphicFrame>
-    </p:spTree>
-    <p:extLst>
-      <p:ext uri="{BB962C8B-B14F-4D97-AF65-F5344CB8AC3E}">
-        <p14:creationId xmlns:p14="http://schemas.microsoft.com/office/powerpoint/2010/main" val="1736304696"/>
-      </p:ext>
-    </p:extLst>
-  </p:cSld>
-  <p:clrMapOvr>
-    <a:masterClrMapping/>
-  </p:clrMapOvr>
-</p:sld>
-</file>
-
-<file path=ppt/slides/slide11.xml><?xml version="1.0" encoding="utf-8"?>
-<p:sld xmlns:a="http://schemas.openxmlformats.org/drawingml/2006/main" xmlns:r="http://schemas.openxmlformats.org/officeDocument/2006/relationships" xmlns:p="http://schemas.openxmlformats.org/presentationml/2006/main">
-  <p:cSld>
-    <p:spTree>
-      <p:nvGrpSpPr>
-        <p:cNvPr id="1" name=""/>
-        <p:cNvGrpSpPr/>
-        <p:nvPr/>
-      </p:nvGrpSpPr>
-      <p:grpSpPr>
-        <a:xfrm>
-          <a:off x="0" y="0"/>
-          <a:ext cx="0" cy="0"/>
-          <a:chOff x="0" y="0"/>
-          <a:chExt cx="0" cy="0"/>
-        </a:xfrm>
-      </p:grpSpPr>
-      <p:sp>
-        <p:nvSpPr>
-          <p:cNvPr id="2" name="Titel 1">
-            <a:extLst>
-              <a:ext uri="{FF2B5EF4-FFF2-40B4-BE49-F238E27FC236}">
                 <a16:creationId xmlns:a16="http://schemas.microsoft.com/office/drawing/2014/main" id="{FB291A7F-7E52-C0AA-A573-5C6DB3DAD472}"/>
               </a:ext>
             </a:extLst>
@@ -11296,7 +11123,7 @@
           <a:p>
             <a:r>
               <a:rPr lang="de-DE" dirty="0"/>
-              <a:t>Was braucht ein gutes CRM?</a:t>
+              <a:t>Was braucht ein erfolgreiches CRM?</a:t>
             </a:r>
           </a:p>
         </p:txBody>
@@ -11360,7 +11187,7 @@
 </p:sld>
 </file>
 
-<file path=ppt/slides/slide12.xml><?xml version="1.0" encoding="utf-8"?>
+<file path=ppt/slides/slide11.xml><?xml version="1.0" encoding="utf-8"?>
 <p:sld xmlns:a="http://schemas.openxmlformats.org/drawingml/2006/main" xmlns:r="http://schemas.openxmlformats.org/officeDocument/2006/relationships" xmlns:p="http://schemas.openxmlformats.org/presentationml/2006/main">
   <p:cSld>
     <p:spTree>
@@ -11485,7 +11312,7 @@
 </p:sld>
 </file>
 
-<file path=ppt/slides/slide13.xml><?xml version="1.0" encoding="utf-8"?>
+<file path=ppt/slides/slide12.xml><?xml version="1.0" encoding="utf-8"?>
 <p:sld xmlns:a="http://schemas.openxmlformats.org/drawingml/2006/main" xmlns:r="http://schemas.openxmlformats.org/officeDocument/2006/relationships" xmlns:p="http://schemas.openxmlformats.org/presentationml/2006/main">
   <p:cSld>
     <p:spTree>
@@ -11643,7 +11470,7 @@
 </p:sld>
 </file>
 
-<file path=ppt/slides/slide14.xml><?xml version="1.0" encoding="utf-8"?>
+<file path=ppt/slides/slide13.xml><?xml version="1.0" encoding="utf-8"?>
 <p:sld xmlns:a="http://schemas.openxmlformats.org/drawingml/2006/main" xmlns:r="http://schemas.openxmlformats.org/officeDocument/2006/relationships" xmlns:p="http://schemas.openxmlformats.org/presentationml/2006/main">
   <p:cSld>
     <p:spTree>
@@ -11791,7 +11618,7 @@
 </p:sld>
 </file>
 
-<file path=ppt/slides/slide15.xml><?xml version="1.0" encoding="utf-8"?>
+<file path=ppt/slides/slide14.xml><?xml version="1.0" encoding="utf-8"?>
 <p:sld xmlns:a="http://schemas.openxmlformats.org/drawingml/2006/main" xmlns:r="http://schemas.openxmlformats.org/officeDocument/2006/relationships" xmlns:p="http://schemas.openxmlformats.org/presentationml/2006/main">
   <p:cSld>
     <p:spTree>
@@ -11943,7 +11770,7 @@
 </p:sld>
 </file>
 
-<file path=ppt/slides/slide16.xml><?xml version="1.0" encoding="utf-8"?>
+<file path=ppt/slides/slide15.xml><?xml version="1.0" encoding="utf-8"?>
 <p:sld xmlns:a="http://schemas.openxmlformats.org/drawingml/2006/main" xmlns:r="http://schemas.openxmlformats.org/officeDocument/2006/relationships" xmlns:p="http://schemas.openxmlformats.org/presentationml/2006/main">
   <p:cSld>
     <p:spTree>
@@ -12113,7 +11940,7 @@
 </p:sld>
 </file>
 
-<file path=ppt/slides/slide17.xml><?xml version="1.0" encoding="utf-8"?>
+<file path=ppt/slides/slide16.xml><?xml version="1.0" encoding="utf-8"?>
 <p:sld xmlns:a="http://schemas.openxmlformats.org/drawingml/2006/main" xmlns:r="http://schemas.openxmlformats.org/officeDocument/2006/relationships" xmlns:p="http://schemas.openxmlformats.org/presentationml/2006/main">
   <p:cSld>
     <p:spTree>
@@ -12296,7 +12123,7 @@
 </p:sld>
 </file>
 
-<file path=ppt/slides/slide18.xml><?xml version="1.0" encoding="utf-8"?>
+<file path=ppt/slides/slide17.xml><?xml version="1.0" encoding="utf-8"?>
 <p:sld xmlns:a="http://schemas.openxmlformats.org/drawingml/2006/main" xmlns:r="http://schemas.openxmlformats.org/officeDocument/2006/relationships" xmlns:p="http://schemas.openxmlformats.org/presentationml/2006/main">
   <p:cSld>
     <p:spTree>
@@ -12435,6 +12262,107 @@
     <p:extLst>
       <p:ext uri="{BB962C8B-B14F-4D97-AF65-F5344CB8AC3E}">
         <p14:creationId xmlns:p14="http://schemas.microsoft.com/office/powerpoint/2010/main" val="952452282"/>
+      </p:ext>
+    </p:extLst>
+  </p:cSld>
+  <p:clrMapOvr>
+    <a:masterClrMapping/>
+  </p:clrMapOvr>
+</p:sld>
+</file>
+
+<file path=ppt/slides/slide18.xml><?xml version="1.0" encoding="utf-8"?>
+<p:sld xmlns:a="http://schemas.openxmlformats.org/drawingml/2006/main" xmlns:r="http://schemas.openxmlformats.org/officeDocument/2006/relationships" xmlns:p="http://schemas.openxmlformats.org/presentationml/2006/main">
+  <p:cSld>
+    <p:spTree>
+      <p:nvGrpSpPr>
+        <p:cNvPr id="1" name=""/>
+        <p:cNvGrpSpPr/>
+        <p:nvPr/>
+      </p:nvGrpSpPr>
+      <p:grpSpPr>
+        <a:xfrm>
+          <a:off x="0" y="0"/>
+          <a:ext cx="0" cy="0"/>
+          <a:chOff x="0" y="0"/>
+          <a:chExt cx="0" cy="0"/>
+        </a:xfrm>
+      </p:grpSpPr>
+      <p:sp>
+        <p:nvSpPr>
+          <p:cNvPr id="2" name="Titel 1">
+            <a:extLst>
+              <a:ext uri="{FF2B5EF4-FFF2-40B4-BE49-F238E27FC236}">
+                <a16:creationId xmlns:a16="http://schemas.microsoft.com/office/drawing/2014/main" id="{4280417A-9FCC-30F8-1F1F-818A44E572B8}"/>
+              </a:ext>
+            </a:extLst>
+          </p:cNvPr>
+          <p:cNvSpPr>
+            <a:spLocks noGrp="1"/>
+          </p:cNvSpPr>
+          <p:nvPr>
+            <p:ph type="title"/>
+          </p:nvPr>
+        </p:nvSpPr>
+        <p:spPr/>
+        <p:txBody>
+          <a:bodyPr/>
+          <a:lstStyle/>
+          <a:p>
+            <a:r>
+              <a:rPr lang="de-DE" dirty="0"/>
+              <a:t>CRM-Systeme</a:t>
+            </a:r>
+          </a:p>
+        </p:txBody>
+      </p:sp>
+      <p:sp>
+        <p:nvSpPr>
+          <p:cNvPr id="3" name="Inhaltsplatzhalter 2">
+            <a:extLst>
+              <a:ext uri="{FF2B5EF4-FFF2-40B4-BE49-F238E27FC236}">
+                <a16:creationId xmlns:a16="http://schemas.microsoft.com/office/drawing/2014/main" id="{740AE603-583D-E10D-77E1-E348D70A9B53}"/>
+              </a:ext>
+            </a:extLst>
+          </p:cNvPr>
+          <p:cNvSpPr>
+            <a:spLocks noGrp="1"/>
+          </p:cNvSpPr>
+          <p:nvPr>
+            <p:ph idx="1"/>
+          </p:nvPr>
+        </p:nvSpPr>
+        <p:spPr/>
+        <p:txBody>
+          <a:bodyPr/>
+          <a:lstStyle/>
+          <a:p>
+            <a:pPr marL="0" indent="0">
+              <a:buNone/>
+            </a:pPr>
+            <a:endParaRPr lang="de-DE" dirty="0"/>
+          </a:p>
+          <a:p>
+            <a:pPr marL="0" indent="0">
+              <a:buNone/>
+            </a:pPr>
+            <a:endParaRPr lang="de-DE" dirty="0"/>
+          </a:p>
+          <a:p>
+            <a:pPr marL="0" indent="0">
+              <a:buNone/>
+            </a:pPr>
+            <a:r>
+              <a:rPr lang="de-DE" i="1" dirty="0"/>
+              <a:t>CRM-Systeme sind Anwendungssysteme, die sämtliche Interaktionen der Unternehmung mit Kunden verfolgen und analysieren, um Umsatz, Rentabilität, Kundenzufriedenheit und Kundenbindung zu optimieren.</a:t>
+            </a:r>
+          </a:p>
+        </p:txBody>
+      </p:sp>
+    </p:spTree>
+    <p:extLst>
+      <p:ext uri="{BB962C8B-B14F-4D97-AF65-F5344CB8AC3E}">
+        <p14:creationId xmlns:p14="http://schemas.microsoft.com/office/powerpoint/2010/main" val="4101664908"/>
       </p:ext>
     </p:extLst>
   </p:cSld>
@@ -12510,6 +12438,36 @@
           <a:bodyPr/>
           <a:lstStyle/>
           <a:p>
+            <a:pPr marL="514350" indent="-514350">
+              <a:buAutoNum type="arabicPeriod"/>
+            </a:pPr>
+            <a:endParaRPr lang="de-DE" dirty="0"/>
+          </a:p>
+          <a:p>
+            <a:pPr marL="0" indent="0">
+              <a:buNone/>
+            </a:pPr>
+            <a:r>
+              <a:rPr lang="de-DE" dirty="0"/>
+              <a:t>1. Kollaboratives CRM</a:t>
+            </a:r>
+          </a:p>
+          <a:p>
+            <a:pPr marL="514350" indent="-514350">
+              <a:buAutoNum type="arabicPeriod"/>
+            </a:pPr>
+            <a:endParaRPr lang="de-DE" dirty="0"/>
+          </a:p>
+          <a:p>
+            <a:pPr marL="0" indent="0">
+              <a:buNone/>
+            </a:pPr>
+            <a:r>
+              <a:rPr lang="de-DE" dirty="0"/>
+              <a:t>2. Operatives CRM</a:t>
+            </a:r>
+          </a:p>
+          <a:p>
             <a:pPr marL="0" indent="0">
               <a:buNone/>
             </a:pPr>
@@ -12519,15 +12477,9 @@
             <a:pPr marL="0" indent="0">
               <a:buNone/>
             </a:pPr>
-            <a:endParaRPr lang="de-DE" dirty="0"/>
-          </a:p>
-          <a:p>
-            <a:pPr marL="0" indent="0">
-              <a:buNone/>
-            </a:pPr>
-            <a:r>
-              <a:rPr lang="de-DE" i="1" dirty="0"/>
-              <a:t>CRM-Systeme sind Anwendungssysteme, die sämtliche Interaktionen der Unternehmung mit Kunden verfolgen und analysieren, um Umsatz, Rentabilität, Kundenzufriedenheit und Kundenbindung zu optimieren.</a:t>
+            <a:r>
+              <a:rPr lang="de-DE" dirty="0"/>
+              <a:t>3. Analytisches CRM</a:t>
             </a:r>
           </a:p>
         </p:txBody>
@@ -12535,7 +12487,7 @@
     </p:spTree>
     <p:extLst>
       <p:ext uri="{BB962C8B-B14F-4D97-AF65-F5344CB8AC3E}">
-        <p14:creationId xmlns:p14="http://schemas.microsoft.com/office/powerpoint/2010/main" val="4101664908"/>
+        <p14:creationId xmlns:p14="http://schemas.microsoft.com/office/powerpoint/2010/main" val="4048930533"/>
       </p:ext>
     </p:extLst>
   </p:cSld>
@@ -12766,131 +12718,6 @@
           <p:cNvPr id="2" name="Titel 1">
             <a:extLst>
               <a:ext uri="{FF2B5EF4-FFF2-40B4-BE49-F238E27FC236}">
-                <a16:creationId xmlns:a16="http://schemas.microsoft.com/office/drawing/2014/main" id="{4280417A-9FCC-30F8-1F1F-818A44E572B8}"/>
-              </a:ext>
-            </a:extLst>
-          </p:cNvPr>
-          <p:cNvSpPr>
-            <a:spLocks noGrp="1"/>
-          </p:cNvSpPr>
-          <p:nvPr>
-            <p:ph type="title"/>
-          </p:nvPr>
-        </p:nvSpPr>
-        <p:spPr/>
-        <p:txBody>
-          <a:bodyPr/>
-          <a:lstStyle/>
-          <a:p>
-            <a:r>
-              <a:rPr lang="de-DE" dirty="0"/>
-              <a:t>CRM-Systeme</a:t>
-            </a:r>
-          </a:p>
-        </p:txBody>
-      </p:sp>
-      <p:sp>
-        <p:nvSpPr>
-          <p:cNvPr id="3" name="Inhaltsplatzhalter 2">
-            <a:extLst>
-              <a:ext uri="{FF2B5EF4-FFF2-40B4-BE49-F238E27FC236}">
-                <a16:creationId xmlns:a16="http://schemas.microsoft.com/office/drawing/2014/main" id="{740AE603-583D-E10D-77E1-E348D70A9B53}"/>
-              </a:ext>
-            </a:extLst>
-          </p:cNvPr>
-          <p:cNvSpPr>
-            <a:spLocks noGrp="1"/>
-          </p:cNvSpPr>
-          <p:nvPr>
-            <p:ph idx="1"/>
-          </p:nvPr>
-        </p:nvSpPr>
-        <p:spPr/>
-        <p:txBody>
-          <a:bodyPr/>
-          <a:lstStyle/>
-          <a:p>
-            <a:pPr marL="514350" indent="-514350">
-              <a:buAutoNum type="arabicPeriod"/>
-            </a:pPr>
-            <a:endParaRPr lang="de-DE" dirty="0"/>
-          </a:p>
-          <a:p>
-            <a:pPr marL="0" indent="0">
-              <a:buNone/>
-            </a:pPr>
-            <a:r>
-              <a:rPr lang="de-DE" dirty="0"/>
-              <a:t>1. Kollaboratives CRM</a:t>
-            </a:r>
-          </a:p>
-          <a:p>
-            <a:pPr marL="514350" indent="-514350">
-              <a:buAutoNum type="arabicPeriod"/>
-            </a:pPr>
-            <a:endParaRPr lang="de-DE" dirty="0"/>
-          </a:p>
-          <a:p>
-            <a:pPr marL="0" indent="0">
-              <a:buNone/>
-            </a:pPr>
-            <a:r>
-              <a:rPr lang="de-DE" dirty="0"/>
-              <a:t>2. Operatives CRM</a:t>
-            </a:r>
-          </a:p>
-          <a:p>
-            <a:pPr marL="0" indent="0">
-              <a:buNone/>
-            </a:pPr>
-            <a:endParaRPr lang="de-DE" dirty="0"/>
-          </a:p>
-          <a:p>
-            <a:pPr marL="0" indent="0">
-              <a:buNone/>
-            </a:pPr>
-            <a:r>
-              <a:rPr lang="de-DE" dirty="0"/>
-              <a:t>3. Analytisches CRM</a:t>
-            </a:r>
-          </a:p>
-        </p:txBody>
-      </p:sp>
-    </p:spTree>
-    <p:extLst>
-      <p:ext uri="{BB962C8B-B14F-4D97-AF65-F5344CB8AC3E}">
-        <p14:creationId xmlns:p14="http://schemas.microsoft.com/office/powerpoint/2010/main" val="4048930533"/>
-      </p:ext>
-    </p:extLst>
-  </p:cSld>
-  <p:clrMapOvr>
-    <a:masterClrMapping/>
-  </p:clrMapOvr>
-</p:sld>
-</file>
-
-<file path=ppt/slides/slide21.xml><?xml version="1.0" encoding="utf-8"?>
-<p:sld xmlns:a="http://schemas.openxmlformats.org/drawingml/2006/main" xmlns:r="http://schemas.openxmlformats.org/officeDocument/2006/relationships" xmlns:p="http://schemas.openxmlformats.org/presentationml/2006/main">
-  <p:cSld>
-    <p:spTree>
-      <p:nvGrpSpPr>
-        <p:cNvPr id="1" name=""/>
-        <p:cNvGrpSpPr/>
-        <p:nvPr/>
-      </p:nvGrpSpPr>
-      <p:grpSpPr>
-        <a:xfrm>
-          <a:off x="0" y="0"/>
-          <a:ext cx="0" cy="0"/>
-          <a:chOff x="0" y="0"/>
-          <a:chExt cx="0" cy="0"/>
-        </a:xfrm>
-      </p:grpSpPr>
-      <p:sp>
-        <p:nvSpPr>
-          <p:cNvPr id="2" name="Titel 1">
-            <a:extLst>
-              <a:ext uri="{FF2B5EF4-FFF2-40B4-BE49-F238E27FC236}">
                 <a16:creationId xmlns:a16="http://schemas.microsoft.com/office/drawing/2014/main" id="{14BF5EE6-2AE2-0163-098D-48ABB88E4642}"/>
               </a:ext>
             </a:extLst>
@@ -12994,7 +12821,7 @@
 </p:sld>
 </file>
 
-<file path=ppt/slides/slide22.xml><?xml version="1.0" encoding="utf-8"?>
+<file path=ppt/slides/slide21.xml><?xml version="1.0" encoding="utf-8"?>
 <p:sld xmlns:a="http://schemas.openxmlformats.org/drawingml/2006/main" xmlns:r="http://schemas.openxmlformats.org/officeDocument/2006/relationships" xmlns:p="http://schemas.openxmlformats.org/presentationml/2006/main">
   <p:cSld>
     <p:spTree>
@@ -13096,7 +12923,7 @@
               <a:rPr lang="de-DE" dirty="0">
                 <a:sym typeface="Wingdings" panose="05000000000000000000" pitchFamily="2" charset="2"/>
               </a:rPr>
-              <a:t> „Font Office“</a:t>
+              <a:t> „Front Office“</a:t>
             </a:r>
           </a:p>
           <a:p>
@@ -13146,7 +12973,7 @@
 </p:sld>
 </file>
 
-<file path=ppt/slides/slide23.xml><?xml version="1.0" encoding="utf-8"?>
+<file path=ppt/slides/slide22.xml><?xml version="1.0" encoding="utf-8"?>
 <p:sld xmlns:a="http://schemas.openxmlformats.org/drawingml/2006/main" xmlns:r="http://schemas.openxmlformats.org/officeDocument/2006/relationships" xmlns:p="http://schemas.openxmlformats.org/presentationml/2006/main">
   <p:cSld>
     <p:spTree>
@@ -13271,7 +13098,7 @@
 </p:sld>
 </file>
 
-<file path=ppt/slides/slide24.xml><?xml version="1.0" encoding="utf-8"?>
+<file path=ppt/slides/slide23.xml><?xml version="1.0" encoding="utf-8"?>
 <p:sld xmlns:a="http://schemas.openxmlformats.org/drawingml/2006/main" xmlns:r="http://schemas.openxmlformats.org/officeDocument/2006/relationships" xmlns:p="http://schemas.openxmlformats.org/presentationml/2006/main">
   <p:cSld>
     <p:spTree>
@@ -13379,7 +13206,7 @@
 </p:sld>
 </file>
 
-<file path=ppt/slides/slide25.xml><?xml version="1.0" encoding="utf-8"?>
+<file path=ppt/slides/slide24.xml><?xml version="1.0" encoding="utf-8"?>
 <p:sld xmlns:a="http://schemas.openxmlformats.org/drawingml/2006/main" xmlns:r="http://schemas.openxmlformats.org/officeDocument/2006/relationships" xmlns:p="http://schemas.openxmlformats.org/presentationml/2006/main">
   <p:cSld>
     <p:spTree>
@@ -13512,7 +13339,7 @@
 </p:sld>
 </file>
 
-<file path=ppt/slides/slide26.xml><?xml version="1.0" encoding="utf-8"?>
+<file path=ppt/slides/slide25.xml><?xml version="1.0" encoding="utf-8"?>
 <p:sld xmlns:a="http://schemas.openxmlformats.org/drawingml/2006/main" xmlns:r="http://schemas.openxmlformats.org/officeDocument/2006/relationships" xmlns:p="http://schemas.openxmlformats.org/presentationml/2006/main">
   <p:cSld>
     <p:spTree>
@@ -13622,7 +13449,7 @@
 </p:sld>
 </file>
 
-<file path=ppt/slides/slide27.xml><?xml version="1.0" encoding="utf-8"?>
+<file path=ppt/slides/slide26.xml><?xml version="1.0" encoding="utf-8"?>
 <p:sld xmlns:a="http://schemas.openxmlformats.org/drawingml/2006/main" xmlns:r="http://schemas.openxmlformats.org/officeDocument/2006/relationships" xmlns:p="http://schemas.openxmlformats.org/presentationml/2006/main">
   <p:cSld>
     <p:spTree>
@@ -13743,7 +13570,7 @@
 </p:sld>
 </file>
 
-<file path=ppt/slides/slide28.xml><?xml version="1.0" encoding="utf-8"?>
+<file path=ppt/slides/slide27.xml><?xml version="1.0" encoding="utf-8"?>
 <p:sld xmlns:a="http://schemas.openxmlformats.org/drawingml/2006/main" xmlns:r="http://schemas.openxmlformats.org/officeDocument/2006/relationships" xmlns:p="http://schemas.openxmlformats.org/presentationml/2006/main">
   <p:cSld>
     <p:spTree>
@@ -13847,7 +13674,7 @@
 </p:sld>
 </file>
 
-<file path=ppt/slides/slide29.xml><?xml version="1.0" encoding="utf-8"?>
+<file path=ppt/slides/slide28.xml><?xml version="1.0" encoding="utf-8"?>
 <p:sld xmlns:a="http://schemas.openxmlformats.org/drawingml/2006/main" xmlns:r="http://schemas.openxmlformats.org/officeDocument/2006/relationships" xmlns:p="http://schemas.openxmlformats.org/presentationml/2006/main">
   <p:cSld>
     <p:spTree>
@@ -13950,6 +13777,117 @@
     <p:extLst>
       <p:ext uri="{BB962C8B-B14F-4D97-AF65-F5344CB8AC3E}">
         <p14:creationId xmlns:p14="http://schemas.microsoft.com/office/powerpoint/2010/main" val="642572276"/>
+      </p:ext>
+    </p:extLst>
+  </p:cSld>
+  <p:clrMapOvr>
+    <a:masterClrMapping/>
+  </p:clrMapOvr>
+</p:sld>
+</file>
+
+<file path=ppt/slides/slide29.xml><?xml version="1.0" encoding="utf-8"?>
+<p:sld xmlns:a="http://schemas.openxmlformats.org/drawingml/2006/main" xmlns:r="http://schemas.openxmlformats.org/officeDocument/2006/relationships" xmlns:p="http://schemas.openxmlformats.org/presentationml/2006/main">
+  <p:cSld>
+    <p:spTree>
+      <p:nvGrpSpPr>
+        <p:cNvPr id="1" name=""/>
+        <p:cNvGrpSpPr/>
+        <p:nvPr/>
+      </p:nvGrpSpPr>
+      <p:grpSpPr>
+        <a:xfrm>
+          <a:off x="0" y="0"/>
+          <a:ext cx="0" cy="0"/>
+          <a:chOff x="0" y="0"/>
+          <a:chExt cx="0" cy="0"/>
+        </a:xfrm>
+      </p:grpSpPr>
+      <p:sp>
+        <p:nvSpPr>
+          <p:cNvPr id="2" name="Titel 1">
+            <a:extLst>
+              <a:ext uri="{FF2B5EF4-FFF2-40B4-BE49-F238E27FC236}">
+                <a16:creationId xmlns:a16="http://schemas.microsoft.com/office/drawing/2014/main" id="{A8056081-DC9F-2953-8020-CFEFADDF0B88}"/>
+              </a:ext>
+            </a:extLst>
+          </p:cNvPr>
+          <p:cNvSpPr>
+            <a:spLocks noGrp="1"/>
+          </p:cNvSpPr>
+          <p:nvPr>
+            <p:ph type="title"/>
+          </p:nvPr>
+        </p:nvSpPr>
+        <p:spPr/>
+        <p:txBody>
+          <a:bodyPr/>
+          <a:lstStyle/>
+          <a:p>
+            <a:r>
+              <a:rPr lang="de-DE" dirty="0" err="1"/>
+              <a:t>Social</a:t>
+            </a:r>
+            <a:r>
+              <a:rPr lang="de-DE" dirty="0"/>
+              <a:t> CRM</a:t>
+            </a:r>
+          </a:p>
+        </p:txBody>
+      </p:sp>
+      <p:sp>
+        <p:nvSpPr>
+          <p:cNvPr id="3" name="Inhaltsplatzhalter 2">
+            <a:extLst>
+              <a:ext uri="{FF2B5EF4-FFF2-40B4-BE49-F238E27FC236}">
+                <a16:creationId xmlns:a16="http://schemas.microsoft.com/office/drawing/2014/main" id="{1F9A660A-31A3-D4A5-EECB-D0E80CFE08D3}"/>
+              </a:ext>
+            </a:extLst>
+          </p:cNvPr>
+          <p:cNvSpPr>
+            <a:spLocks noGrp="1"/>
+          </p:cNvSpPr>
+          <p:nvPr>
+            <p:ph idx="1"/>
+          </p:nvPr>
+        </p:nvSpPr>
+        <p:spPr/>
+        <p:txBody>
+          <a:bodyPr/>
+          <a:lstStyle/>
+          <a:p>
+            <a:r>
+              <a:rPr lang="de-DE" dirty="0"/>
+              <a:t>Mehrere Touchpoints durch </a:t>
+            </a:r>
+            <a:r>
+              <a:rPr lang="de-DE" dirty="0" err="1"/>
+              <a:t>Social</a:t>
+            </a:r>
+            <a:r>
+              <a:rPr lang="de-DE" dirty="0"/>
+              <a:t> Media</a:t>
+            </a:r>
+          </a:p>
+          <a:p>
+            <a:r>
+              <a:rPr lang="de-DE" dirty="0"/>
+              <a:t>B2B Beispiel </a:t>
+            </a:r>
+            <a:r>
+              <a:rPr lang="de-DE" dirty="0">
+                <a:sym typeface="Wingdings" panose="05000000000000000000" pitchFamily="2" charset="2"/>
+              </a:rPr>
+              <a:t> DELL</a:t>
+            </a:r>
+            <a:endParaRPr lang="de-DE" dirty="0"/>
+          </a:p>
+        </p:txBody>
+      </p:sp>
+    </p:spTree>
+    <p:extLst>
+      <p:ext uri="{BB962C8B-B14F-4D97-AF65-F5344CB8AC3E}">
+        <p14:creationId xmlns:p14="http://schemas.microsoft.com/office/powerpoint/2010/main" val="2731334029"/>
       </p:ext>
     </p:extLst>
   </p:cSld>
@@ -14023,7 +13961,7 @@
         <p:spPr/>
         <p:txBody>
           <a:bodyPr>
-            <a:normAutofit lnSpcReduction="10000"/>
+            <a:normAutofit/>
           </a:bodyPr>
           <a:lstStyle/>
           <a:p>
@@ -14053,13 +13991,7 @@
           <a:p>
             <a:r>
               <a:rPr lang="de-DE" dirty="0"/>
-              <a:t>Herausforderungen</a:t>
-            </a:r>
-          </a:p>
-          <a:p>
-            <a:r>
-              <a:rPr lang="de-DE" dirty="0"/>
-              <a:t>Zukunftstrends</a:t>
+              <a:t>Herausforderungen und Zukunftstrends</a:t>
             </a:r>
           </a:p>
           <a:p>
@@ -14121,117 +14053,6 @@
           <p:cNvPr id="2" name="Titel 1">
             <a:extLst>
               <a:ext uri="{FF2B5EF4-FFF2-40B4-BE49-F238E27FC236}">
-                <a16:creationId xmlns:a16="http://schemas.microsoft.com/office/drawing/2014/main" id="{A8056081-DC9F-2953-8020-CFEFADDF0B88}"/>
-              </a:ext>
-            </a:extLst>
-          </p:cNvPr>
-          <p:cNvSpPr>
-            <a:spLocks noGrp="1"/>
-          </p:cNvSpPr>
-          <p:nvPr>
-            <p:ph type="title"/>
-          </p:nvPr>
-        </p:nvSpPr>
-        <p:spPr/>
-        <p:txBody>
-          <a:bodyPr/>
-          <a:lstStyle/>
-          <a:p>
-            <a:r>
-              <a:rPr lang="de-DE" dirty="0" err="1"/>
-              <a:t>Social</a:t>
-            </a:r>
-            <a:r>
-              <a:rPr lang="de-DE" dirty="0"/>
-              <a:t> CRM</a:t>
-            </a:r>
-          </a:p>
-        </p:txBody>
-      </p:sp>
-      <p:sp>
-        <p:nvSpPr>
-          <p:cNvPr id="3" name="Inhaltsplatzhalter 2">
-            <a:extLst>
-              <a:ext uri="{FF2B5EF4-FFF2-40B4-BE49-F238E27FC236}">
-                <a16:creationId xmlns:a16="http://schemas.microsoft.com/office/drawing/2014/main" id="{1F9A660A-31A3-D4A5-EECB-D0E80CFE08D3}"/>
-              </a:ext>
-            </a:extLst>
-          </p:cNvPr>
-          <p:cNvSpPr>
-            <a:spLocks noGrp="1"/>
-          </p:cNvSpPr>
-          <p:nvPr>
-            <p:ph idx="1"/>
-          </p:nvPr>
-        </p:nvSpPr>
-        <p:spPr/>
-        <p:txBody>
-          <a:bodyPr/>
-          <a:lstStyle/>
-          <a:p>
-            <a:r>
-              <a:rPr lang="de-DE" dirty="0"/>
-              <a:t>Mehrere Touchpoints durch </a:t>
-            </a:r>
-            <a:r>
-              <a:rPr lang="de-DE" dirty="0" err="1"/>
-              <a:t>Social</a:t>
-            </a:r>
-            <a:r>
-              <a:rPr lang="de-DE" dirty="0"/>
-              <a:t> Media</a:t>
-            </a:r>
-          </a:p>
-          <a:p>
-            <a:r>
-              <a:rPr lang="de-DE" dirty="0"/>
-              <a:t>B2B Beispiel </a:t>
-            </a:r>
-            <a:r>
-              <a:rPr lang="de-DE" dirty="0">
-                <a:sym typeface="Wingdings" panose="05000000000000000000" pitchFamily="2" charset="2"/>
-              </a:rPr>
-              <a:t> DELL</a:t>
-            </a:r>
-            <a:endParaRPr lang="de-DE" dirty="0"/>
-          </a:p>
-        </p:txBody>
-      </p:sp>
-    </p:spTree>
-    <p:extLst>
-      <p:ext uri="{BB962C8B-B14F-4D97-AF65-F5344CB8AC3E}">
-        <p14:creationId xmlns:p14="http://schemas.microsoft.com/office/powerpoint/2010/main" val="2731334029"/>
-      </p:ext>
-    </p:extLst>
-  </p:cSld>
-  <p:clrMapOvr>
-    <a:masterClrMapping/>
-  </p:clrMapOvr>
-</p:sld>
-</file>
-
-<file path=ppt/slides/slide31.xml><?xml version="1.0" encoding="utf-8"?>
-<p:sld xmlns:a="http://schemas.openxmlformats.org/drawingml/2006/main" xmlns:r="http://schemas.openxmlformats.org/officeDocument/2006/relationships" xmlns:p="http://schemas.openxmlformats.org/presentationml/2006/main">
-  <p:cSld>
-    <p:spTree>
-      <p:nvGrpSpPr>
-        <p:cNvPr id="1" name=""/>
-        <p:cNvGrpSpPr/>
-        <p:nvPr/>
-      </p:nvGrpSpPr>
-      <p:grpSpPr>
-        <a:xfrm>
-          <a:off x="0" y="0"/>
-          <a:ext cx="0" cy="0"/>
-          <a:chOff x="0" y="0"/>
-          <a:chExt cx="0" cy="0"/>
-        </a:xfrm>
-      </p:grpSpPr>
-      <p:sp>
-        <p:nvSpPr>
-          <p:cNvPr id="2" name="Titel 1">
-            <a:extLst>
-              <a:ext uri="{FF2B5EF4-FFF2-40B4-BE49-F238E27FC236}">
                 <a16:creationId xmlns:a16="http://schemas.microsoft.com/office/drawing/2014/main" id="{4B5A1E3C-B29C-FF99-F38B-B8353F5C8012}"/>
               </a:ext>
             </a:extLst>
@@ -14285,6 +14106,505 @@
     <p:extLst>
       <p:ext uri="{BB962C8B-B14F-4D97-AF65-F5344CB8AC3E}">
         <p14:creationId xmlns:p14="http://schemas.microsoft.com/office/powerpoint/2010/main" val="354870128"/>
+      </p:ext>
+    </p:extLst>
+  </p:cSld>
+  <p:clrMapOvr>
+    <a:masterClrMapping/>
+  </p:clrMapOvr>
+</p:sld>
+</file>
+
+<file path=ppt/slides/slide31.xml><?xml version="1.0" encoding="utf-8"?>
+<p:sld xmlns:a="http://schemas.openxmlformats.org/drawingml/2006/main" xmlns:r="http://schemas.openxmlformats.org/officeDocument/2006/relationships" xmlns:p="http://schemas.openxmlformats.org/presentationml/2006/main">
+  <p:cSld>
+    <p:bg>
+      <p:bgPr>
+        <a:solidFill>
+          <a:schemeClr val="bg1"/>
+        </a:solidFill>
+        <a:effectLst/>
+      </p:bgPr>
+    </p:bg>
+    <p:spTree>
+      <p:nvGrpSpPr>
+        <p:cNvPr id="1" name=""/>
+        <p:cNvGrpSpPr/>
+        <p:nvPr/>
+      </p:nvGrpSpPr>
+      <p:grpSpPr>
+        <a:xfrm>
+          <a:off x="0" y="0"/>
+          <a:ext cx="0" cy="0"/>
+          <a:chOff x="0" y="0"/>
+          <a:chExt cx="0" cy="0"/>
+        </a:xfrm>
+      </p:grpSpPr>
+      <p:sp useBgFill="1">
+        <p:nvSpPr>
+          <p:cNvPr id="16" name="Rectangle 8">
+            <a:extLst>
+              <a:ext uri="{FF2B5EF4-FFF2-40B4-BE49-F238E27FC236}">
+                <a16:creationId xmlns:a16="http://schemas.microsoft.com/office/drawing/2014/main" id="{0671A8AE-40A1-4631-A6B8-581AFF065482}"/>
+              </a:ext>
+              <a:ext uri="{C183D7F6-B498-43B3-948B-1728B52AA6E4}">
+                <adec:decorative xmlns:adec="http://schemas.microsoft.com/office/drawing/2017/decorative" val="1"/>
+              </a:ext>
+            </a:extLst>
+          </p:cNvPr>
+          <p:cNvSpPr>
+            <a:spLocks noGrp="1" noRot="1" noChangeAspect="1" noMove="1" noResize="1" noEditPoints="1" noAdjustHandles="1" noChangeArrowheads="1" noChangeShapeType="1" noTextEdit="1"/>
+          </p:cNvSpPr>
+          <p:nvPr>
+            <p:extLst>
+              <p:ext uri="{386F3935-93C4-4BCD-93E2-E3B085C9AB24}">
+                <p16:designElem xmlns:p16="http://schemas.microsoft.com/office/powerpoint/2015/main" val="1"/>
+              </p:ext>
+            </p:extLst>
+          </p:nvPr>
+        </p:nvSpPr>
+        <p:spPr>
+          <a:xfrm>
+            <a:off x="0" y="0"/>
+            <a:ext cx="12192000" cy="6858000"/>
+          </a:xfrm>
+          <a:prstGeom prst="rect">
+            <a:avLst/>
+          </a:prstGeom>
+          <a:ln>
+            <a:noFill/>
+          </a:ln>
+        </p:spPr>
+        <p:style>
+          <a:lnRef idx="2">
+            <a:schemeClr val="accent1">
+              <a:shade val="50000"/>
+            </a:schemeClr>
+          </a:lnRef>
+          <a:fillRef idx="1">
+            <a:schemeClr val="accent1"/>
+          </a:fillRef>
+          <a:effectRef idx="0">
+            <a:schemeClr val="accent1"/>
+          </a:effectRef>
+          <a:fontRef idx="minor">
+            <a:schemeClr val="lt1"/>
+          </a:fontRef>
+        </p:style>
+        <p:txBody>
+          <a:bodyPr rtlCol="0" anchor="ctr"/>
+          <a:lstStyle/>
+          <a:p>
+            <a:pPr algn="ctr"/>
+            <a:endParaRPr lang="en-US"/>
+          </a:p>
+        </p:txBody>
+      </p:sp>
+      <p:pic>
+        <p:nvPicPr>
+          <p:cNvPr id="3" name="Grafik 2">
+            <a:extLst>
+              <a:ext uri="{FF2B5EF4-FFF2-40B4-BE49-F238E27FC236}">
+                <a16:creationId xmlns:a16="http://schemas.microsoft.com/office/drawing/2014/main" id="{F370DC28-0DBF-E556-9875-0391CF0DBC44}"/>
+              </a:ext>
+            </a:extLst>
+          </p:cNvPr>
+          <p:cNvPicPr>
+            <a:picLocks noChangeAspect="1"/>
+          </p:cNvPicPr>
+          <p:nvPr/>
+        </p:nvPicPr>
+        <p:blipFill rotWithShape="1">
+          <a:blip r:embed="rId2"/>
+          <a:srcRect l="8023" r="27341" b="9091"/>
+          <a:stretch/>
+        </p:blipFill>
+        <p:spPr>
+          <a:xfrm>
+            <a:off x="3523488" y="10"/>
+            <a:ext cx="8668512" cy="6857990"/>
+          </a:xfrm>
+          <a:prstGeom prst="rect">
+            <a:avLst/>
+          </a:prstGeom>
+        </p:spPr>
+      </p:pic>
+      <p:sp>
+        <p:nvSpPr>
+          <p:cNvPr id="17" name="Rectangle 10">
+            <a:extLst>
+              <a:ext uri="{FF2B5EF4-FFF2-40B4-BE49-F238E27FC236}">
+                <a16:creationId xmlns:a16="http://schemas.microsoft.com/office/drawing/2014/main" id="{AB58EF07-17C2-48CF-ABB0-EEF1F17CB8F0}"/>
+              </a:ext>
+              <a:ext uri="{C183D7F6-B498-43B3-948B-1728B52AA6E4}">
+                <adec:decorative xmlns:adec="http://schemas.microsoft.com/office/drawing/2017/decorative" val="1"/>
+              </a:ext>
+            </a:extLst>
+          </p:cNvPr>
+          <p:cNvSpPr>
+            <a:spLocks noGrp="1" noRot="1" noChangeAspect="1" noMove="1" noResize="1" noEditPoints="1" noAdjustHandles="1" noChangeArrowheads="1" noChangeShapeType="1" noTextEdit="1"/>
+          </p:cNvSpPr>
+          <p:nvPr>
+            <p:extLst>
+              <p:ext uri="{386F3935-93C4-4BCD-93E2-E3B085C9AB24}">
+                <p16:designElem xmlns:p16="http://schemas.microsoft.com/office/powerpoint/2015/main" val="1"/>
+              </p:ext>
+            </p:extLst>
+          </p:nvPr>
+        </p:nvSpPr>
+        <p:spPr>
+          <a:xfrm>
+            <a:off x="3" y="0"/>
+            <a:ext cx="9339206" cy="6858000"/>
+          </a:xfrm>
+          <a:prstGeom prst="rect">
+            <a:avLst/>
+          </a:prstGeom>
+          <a:gradFill>
+            <a:gsLst>
+              <a:gs pos="58000">
+                <a:schemeClr val="bg1"/>
+              </a:gs>
+              <a:gs pos="33000">
+                <a:schemeClr val="bg1">
+                  <a:alpha val="64000"/>
+                </a:schemeClr>
+              </a:gs>
+              <a:gs pos="0">
+                <a:schemeClr val="bg1">
+                  <a:alpha val="0"/>
+                </a:schemeClr>
+              </a:gs>
+              <a:gs pos="100000">
+                <a:schemeClr val="bg1"/>
+              </a:gs>
+            </a:gsLst>
+            <a:lin ang="10800000" scaled="0"/>
+          </a:gradFill>
+          <a:ln>
+            <a:noFill/>
+          </a:ln>
+        </p:spPr>
+        <p:style>
+          <a:lnRef idx="2">
+            <a:schemeClr val="accent1">
+              <a:shade val="50000"/>
+            </a:schemeClr>
+          </a:lnRef>
+          <a:fillRef idx="1">
+            <a:schemeClr val="accent1"/>
+          </a:fillRef>
+          <a:effectRef idx="0">
+            <a:schemeClr val="accent1"/>
+          </a:effectRef>
+          <a:fontRef idx="minor">
+            <a:schemeClr val="lt1"/>
+          </a:fontRef>
+        </p:style>
+        <p:txBody>
+          <a:bodyPr rtlCol="0" anchor="ctr"/>
+          <a:lstStyle/>
+          <a:p>
+            <a:pPr algn="ctr"/>
+            <a:endParaRPr lang="en-US" dirty="0"/>
+          </a:p>
+        </p:txBody>
+      </p:sp>
+      <p:sp>
+        <p:nvSpPr>
+          <p:cNvPr id="4" name="Titel 3">
+            <a:extLst>
+              <a:ext uri="{FF2B5EF4-FFF2-40B4-BE49-F238E27FC236}">
+                <a16:creationId xmlns:a16="http://schemas.microsoft.com/office/drawing/2014/main" id="{48790A61-4582-C6B1-6CE8-6AE30D405BBF}"/>
+              </a:ext>
+            </a:extLst>
+          </p:cNvPr>
+          <p:cNvSpPr>
+            <a:spLocks noGrp="1"/>
+          </p:cNvSpPr>
+          <p:nvPr>
+            <p:ph type="title"/>
+          </p:nvPr>
+        </p:nvSpPr>
+        <p:spPr>
+          <a:xfrm>
+            <a:off x="477981" y="1122363"/>
+            <a:ext cx="4023360" cy="3204134"/>
+          </a:xfrm>
+        </p:spPr>
+        <p:txBody>
+          <a:bodyPr vert="horz" lIns="91440" tIns="45720" rIns="91440" bIns="45720" rtlCol="0" anchor="b">
+            <a:normAutofit/>
+          </a:bodyPr>
+          <a:lstStyle/>
+          <a:p>
+            <a:r>
+              <a:rPr lang="en-US" sz="4800" dirty="0" err="1">
+                <a:solidFill>
+                  <a:schemeClr val="tx1"/>
+                </a:solidFill>
+              </a:rPr>
+              <a:t>Fazit</a:t>
+            </a:r>
+            <a:endParaRPr lang="en-US" sz="4800" dirty="0">
+              <a:solidFill>
+                <a:schemeClr val="tx1"/>
+              </a:solidFill>
+            </a:endParaRPr>
+          </a:p>
+        </p:txBody>
+      </p:sp>
+      <p:sp>
+        <p:nvSpPr>
+          <p:cNvPr id="18" name="Rectangle 12">
+            <a:extLst>
+              <a:ext uri="{FF2B5EF4-FFF2-40B4-BE49-F238E27FC236}">
+                <a16:creationId xmlns:a16="http://schemas.microsoft.com/office/drawing/2014/main" id="{AF2F604E-43BE-4DC3-B983-E071523364F8}"/>
+              </a:ext>
+              <a:ext uri="{C183D7F6-B498-43B3-948B-1728B52AA6E4}">
+                <adec:decorative xmlns:adec="http://schemas.microsoft.com/office/drawing/2017/decorative" val="1"/>
+              </a:ext>
+            </a:extLst>
+          </p:cNvPr>
+          <p:cNvSpPr>
+            <a:spLocks noGrp="1" noRot="1" noChangeAspect="1" noMove="1" noResize="1" noEditPoints="1" noAdjustHandles="1" noChangeArrowheads="1" noChangeShapeType="1" noTextEdit="1"/>
+          </p:cNvSpPr>
+          <p:nvPr>
+            <p:extLst>
+              <p:ext uri="{386F3935-93C4-4BCD-93E2-E3B085C9AB24}">
+                <p16:designElem xmlns:p16="http://schemas.microsoft.com/office/powerpoint/2015/main" val="1"/>
+              </p:ext>
+            </p:extLst>
+          </p:nvPr>
+        </p:nvSpPr>
+        <p:spPr>
+          <a:xfrm rot="5400000">
+            <a:off x="759921" y="346791"/>
+            <a:ext cx="146304" cy="704088"/>
+          </a:xfrm>
+          <a:prstGeom prst="rect">
+            <a:avLst/>
+          </a:prstGeom>
+          <a:solidFill>
+            <a:schemeClr val="accent2"/>
+          </a:solidFill>
+          <a:ln>
+            <a:noFill/>
+          </a:ln>
+        </p:spPr>
+        <p:style>
+          <a:lnRef idx="2">
+            <a:schemeClr val="accent1">
+              <a:shade val="50000"/>
+            </a:schemeClr>
+          </a:lnRef>
+          <a:fillRef idx="1">
+            <a:schemeClr val="accent1"/>
+          </a:fillRef>
+          <a:effectRef idx="0">
+            <a:schemeClr val="accent1"/>
+          </a:effectRef>
+          <a:fontRef idx="minor">
+            <a:schemeClr val="lt1"/>
+          </a:fontRef>
+        </p:style>
+        <p:txBody>
+          <a:bodyPr rtlCol="0" anchor="ctr"/>
+          <a:lstStyle/>
+          <a:p>
+            <a:pPr algn="ctr"/>
+            <a:endParaRPr lang="en-US">
+              <a:solidFill>
+                <a:prstClr val="white"/>
+              </a:solidFill>
+              <a:latin typeface="Calibri" panose="020F0502020204030204"/>
+            </a:endParaRPr>
+          </a:p>
+        </p:txBody>
+      </p:sp>
+      <p:sp>
+        <p:nvSpPr>
+          <p:cNvPr id="15" name="Rectangle 14">
+            <a:extLst>
+              <a:ext uri="{FF2B5EF4-FFF2-40B4-BE49-F238E27FC236}">
+                <a16:creationId xmlns:a16="http://schemas.microsoft.com/office/drawing/2014/main" id="{08C9B587-E65E-4B52-B37C-ABEBB6E87928}"/>
+              </a:ext>
+              <a:ext uri="{C183D7F6-B498-43B3-948B-1728B52AA6E4}">
+                <adec:decorative xmlns:adec="http://schemas.microsoft.com/office/drawing/2017/decorative" val="1"/>
+              </a:ext>
+            </a:extLst>
+          </p:cNvPr>
+          <p:cNvSpPr>
+            <a:spLocks noGrp="1" noRot="1" noChangeAspect="1" noMove="1" noResize="1" noEditPoints="1" noAdjustHandles="1" noChangeArrowheads="1" noChangeShapeType="1" noTextEdit="1"/>
+          </p:cNvSpPr>
+          <p:nvPr>
+            <p:extLst>
+              <p:ext uri="{386F3935-93C4-4BCD-93E2-E3B085C9AB24}">
+                <p16:designElem xmlns:p16="http://schemas.microsoft.com/office/powerpoint/2015/main" val="1"/>
+              </p:ext>
+            </p:extLst>
+          </p:nvPr>
+        </p:nvSpPr>
+        <p:spPr>
+          <a:xfrm>
+            <a:off x="481029" y="4546920"/>
+            <a:ext cx="3977640" cy="18288"/>
+          </a:xfrm>
+          <a:prstGeom prst="rect">
+            <a:avLst/>
+          </a:prstGeom>
+          <a:solidFill>
+            <a:schemeClr val="tx1"/>
+          </a:solidFill>
+          <a:ln w="3175">
+            <a:noFill/>
+          </a:ln>
+          <a:effectLst/>
+        </p:spPr>
+        <p:style>
+          <a:lnRef idx="2">
+            <a:schemeClr val="accent1">
+              <a:shade val="50000"/>
+            </a:schemeClr>
+          </a:lnRef>
+          <a:fillRef idx="1">
+            <a:schemeClr val="accent1"/>
+          </a:fillRef>
+          <a:effectRef idx="0">
+            <a:schemeClr val="accent1"/>
+          </a:effectRef>
+          <a:fontRef idx="minor">
+            <a:schemeClr val="lt1"/>
+          </a:fontRef>
+        </p:style>
+        <p:txBody>
+          <a:bodyPr rtlCol="0" anchor="ctr"/>
+          <a:lstStyle/>
+          <a:p>
+            <a:pPr marL="0" marR="0" lvl="0" indent="0" algn="ctr" defTabSz="914400" rtl="0" eaLnBrk="1" fontAlgn="auto" latinLnBrk="0" hangingPunct="1">
+              <a:lnSpc>
+                <a:spcPct val="100000"/>
+              </a:lnSpc>
+              <a:spcBef>
+                <a:spcPts val="0"/>
+              </a:spcBef>
+              <a:spcAft>
+                <a:spcPts val="0"/>
+              </a:spcAft>
+              <a:buClrTx/>
+              <a:buSzTx/>
+              <a:buFontTx/>
+              <a:buNone/>
+              <a:tabLst/>
+              <a:defRPr/>
+            </a:pPr>
+            <a:endParaRPr kumimoji="0" lang="en-US" sz="1800" b="0" i="0" u="none" strike="noStrike" kern="1200" cap="none" spc="0" normalizeH="0" baseline="0" noProof="0">
+              <a:ln>
+                <a:noFill/>
+              </a:ln>
+              <a:solidFill>
+                <a:prstClr val="white"/>
+              </a:solidFill>
+              <a:effectLst/>
+              <a:uLnTx/>
+              <a:uFillTx/>
+              <a:latin typeface="Calibri" panose="020F0502020204030204"/>
+              <a:ea typeface="+mn-ea"/>
+              <a:cs typeface="+mn-cs"/>
+            </a:endParaRPr>
+          </a:p>
+        </p:txBody>
+      </p:sp>
+    </p:spTree>
+    <p:extLst>
+      <p:ext uri="{BB962C8B-B14F-4D97-AF65-F5344CB8AC3E}">
+        <p14:creationId xmlns:p14="http://schemas.microsoft.com/office/powerpoint/2010/main" val="4279039083"/>
+      </p:ext>
+    </p:extLst>
+  </p:cSld>
+  <p:clrMapOvr>
+    <a:masterClrMapping/>
+  </p:clrMapOvr>
+</p:sld>
+</file>
+
+<file path=ppt/slides/slide32.xml><?xml version="1.0" encoding="utf-8"?>
+<p:sld xmlns:a="http://schemas.openxmlformats.org/drawingml/2006/main" xmlns:r="http://schemas.openxmlformats.org/officeDocument/2006/relationships" xmlns:p="http://schemas.openxmlformats.org/presentationml/2006/main">
+  <p:cSld>
+    <p:spTree>
+      <p:nvGrpSpPr>
+        <p:cNvPr id="1" name=""/>
+        <p:cNvGrpSpPr/>
+        <p:nvPr/>
+      </p:nvGrpSpPr>
+      <p:grpSpPr>
+        <a:xfrm>
+          <a:off x="0" y="0"/>
+          <a:ext cx="0" cy="0"/>
+          <a:chOff x="0" y="0"/>
+          <a:chExt cx="0" cy="0"/>
+        </a:xfrm>
+      </p:grpSpPr>
+      <p:sp>
+        <p:nvSpPr>
+          <p:cNvPr id="2" name="Titel 1">
+            <a:extLst>
+              <a:ext uri="{FF2B5EF4-FFF2-40B4-BE49-F238E27FC236}">
+                <a16:creationId xmlns:a16="http://schemas.microsoft.com/office/drawing/2014/main" id="{3A7EECCB-1469-7D94-4E4C-B040EABCCAEC}"/>
+              </a:ext>
+            </a:extLst>
+          </p:cNvPr>
+          <p:cNvSpPr>
+            <a:spLocks noGrp="1"/>
+          </p:cNvSpPr>
+          <p:nvPr>
+            <p:ph type="title"/>
+          </p:nvPr>
+        </p:nvSpPr>
+        <p:spPr/>
+        <p:txBody>
+          <a:bodyPr/>
+          <a:lstStyle/>
+          <a:p>
+            <a:r>
+              <a:rPr lang="de-DE" dirty="0"/>
+              <a:t>Vielen Dank für Ihre Aufmerksamkeit!</a:t>
+            </a:r>
+          </a:p>
+        </p:txBody>
+      </p:sp>
+      <p:sp>
+        <p:nvSpPr>
+          <p:cNvPr id="3" name="Inhaltsplatzhalter 2">
+            <a:extLst>
+              <a:ext uri="{FF2B5EF4-FFF2-40B4-BE49-F238E27FC236}">
+                <a16:creationId xmlns:a16="http://schemas.microsoft.com/office/drawing/2014/main" id="{77194D06-2F9D-3562-1E28-D4AE71B3771A}"/>
+              </a:ext>
+            </a:extLst>
+          </p:cNvPr>
+          <p:cNvSpPr>
+            <a:spLocks noGrp="1"/>
+          </p:cNvSpPr>
+          <p:nvPr>
+            <p:ph idx="1"/>
+          </p:nvPr>
+        </p:nvSpPr>
+        <p:spPr/>
+        <p:txBody>
+          <a:bodyPr/>
+          <a:lstStyle/>
+          <a:p>
+            <a:r>
+              <a:rPr lang="de-DE" dirty="0"/>
+              <a:t>Hier noch der QR Code fürs Handout</a:t>
+            </a:r>
+          </a:p>
+        </p:txBody>
+      </p:sp>
+    </p:spTree>
+    <p:extLst>
+      <p:ext uri="{BB962C8B-B14F-4D97-AF65-F5344CB8AC3E}">
+        <p14:creationId xmlns:p14="http://schemas.microsoft.com/office/powerpoint/2010/main" val="4160878796"/>
       </p:ext>
     </p:extLst>
   </p:cSld>
@@ -14362,6 +14682,12 @@
           <a:p>
             <a:r>
               <a:rPr lang="de-DE" dirty="0"/>
+              <a:t>Steuerung, Planung und Durchführung aller Prozesse mit Kunden</a:t>
+            </a:r>
+          </a:p>
+          <a:p>
+            <a:r>
+              <a:rPr lang="de-DE" dirty="0"/>
               <a:t>Ganzheitliche Lösung</a:t>
             </a:r>
           </a:p>
@@ -14454,178 +14780,6 @@
           <p:cNvPr id="2" name="Titel 1">
             <a:extLst>
               <a:ext uri="{FF2B5EF4-FFF2-40B4-BE49-F238E27FC236}">
-                <a16:creationId xmlns:a16="http://schemas.microsoft.com/office/drawing/2014/main" id="{A965F112-4829-303F-91EE-66DF5B8B651E}"/>
-              </a:ext>
-            </a:extLst>
-          </p:cNvPr>
-          <p:cNvSpPr>
-            <a:spLocks noGrp="1"/>
-          </p:cNvSpPr>
-          <p:nvPr>
-            <p:ph type="title"/>
-          </p:nvPr>
-        </p:nvSpPr>
-        <p:spPr/>
-        <p:txBody>
-          <a:bodyPr/>
-          <a:lstStyle/>
-          <a:p>
-            <a:pPr algn="ctr"/>
-            <a:r>
-              <a:rPr lang="de-DE" dirty="0"/>
-              <a:t>Lead vs. Kunde</a:t>
-            </a:r>
-          </a:p>
-        </p:txBody>
-      </p:sp>
-      <p:sp>
-        <p:nvSpPr>
-          <p:cNvPr id="5" name="Inhaltsplatzhalter 4">
-            <a:extLst>
-              <a:ext uri="{FF2B5EF4-FFF2-40B4-BE49-F238E27FC236}">
-                <a16:creationId xmlns:a16="http://schemas.microsoft.com/office/drawing/2014/main" id="{9F56ECBB-9519-4197-B114-735C07CC727B}"/>
-              </a:ext>
-            </a:extLst>
-          </p:cNvPr>
-          <p:cNvSpPr>
-            <a:spLocks noGrp="1"/>
-          </p:cNvSpPr>
-          <p:nvPr>
-            <p:ph sz="half" idx="2"/>
-          </p:nvPr>
-        </p:nvSpPr>
-        <p:spPr/>
-        <p:txBody>
-          <a:bodyPr/>
-          <a:lstStyle/>
-          <a:p>
-            <a:r>
-              <a:rPr lang="de-DE" dirty="0"/>
-              <a:t>Potentieller Kunde</a:t>
-            </a:r>
-          </a:p>
-          <a:p>
-            <a:r>
-              <a:rPr lang="de-DE" dirty="0"/>
-              <a:t>unbekannte Wirtschaftskraft</a:t>
-            </a:r>
-          </a:p>
-          <a:p>
-            <a:r>
-              <a:rPr lang="de-DE" dirty="0"/>
-              <a:t>unbekanntes Kaufverhalten</a:t>
-            </a:r>
-          </a:p>
-          <a:p>
-            <a:r>
-              <a:rPr lang="de-DE" dirty="0"/>
-              <a:t>Bedürfnisermittlung</a:t>
-            </a:r>
-          </a:p>
-          <a:p>
-            <a:endParaRPr lang="de-DE" dirty="0"/>
-          </a:p>
-          <a:p>
-            <a:endParaRPr lang="de-DE" dirty="0"/>
-          </a:p>
-          <a:p>
-            <a:endParaRPr lang="de-DE" dirty="0"/>
-          </a:p>
-          <a:p>
-            <a:endParaRPr lang="de-DE" dirty="0"/>
-          </a:p>
-        </p:txBody>
-      </p:sp>
-      <p:sp>
-        <p:nvSpPr>
-          <p:cNvPr id="7" name="Inhaltsplatzhalter 6">
-            <a:extLst>
-              <a:ext uri="{FF2B5EF4-FFF2-40B4-BE49-F238E27FC236}">
-                <a16:creationId xmlns:a16="http://schemas.microsoft.com/office/drawing/2014/main" id="{B4EDF357-F95E-511D-6914-0C489535C25D}"/>
-              </a:ext>
-            </a:extLst>
-          </p:cNvPr>
-          <p:cNvSpPr>
-            <a:spLocks noGrp="1"/>
-          </p:cNvSpPr>
-          <p:nvPr>
-            <p:ph sz="quarter" idx="4"/>
-          </p:nvPr>
-        </p:nvSpPr>
-        <p:spPr/>
-        <p:txBody>
-          <a:bodyPr/>
-          <a:lstStyle/>
-          <a:p>
-            <a:r>
-              <a:rPr lang="de-DE" dirty="0"/>
-              <a:t>Bedürfnisse bekannt</a:t>
-            </a:r>
-          </a:p>
-          <a:p>
-            <a:r>
-              <a:rPr lang="de-DE" dirty="0"/>
-              <a:t>Kontakt bereits hergestellt</a:t>
-            </a:r>
-          </a:p>
-          <a:p>
-            <a:r>
-              <a:rPr lang="de-DE" dirty="0"/>
-              <a:t>Informationen über Zusatzprodukte </a:t>
-            </a:r>
-          </a:p>
-          <a:p>
-            <a:r>
-              <a:rPr lang="de-DE" dirty="0"/>
-              <a:t>Servicebindung</a:t>
-            </a:r>
-          </a:p>
-          <a:p>
-            <a:r>
-              <a:rPr lang="de-DE" dirty="0"/>
-              <a:t>ABC Klassifizierung</a:t>
-            </a:r>
-          </a:p>
-          <a:p>
-            <a:endParaRPr lang="de-DE" dirty="0"/>
-          </a:p>
-        </p:txBody>
-      </p:sp>
-    </p:spTree>
-    <p:extLst>
-      <p:ext uri="{BB962C8B-B14F-4D97-AF65-F5344CB8AC3E}">
-        <p14:creationId xmlns:p14="http://schemas.microsoft.com/office/powerpoint/2010/main" val="4209253751"/>
-      </p:ext>
-    </p:extLst>
-  </p:cSld>
-  <p:clrMapOvr>
-    <a:masterClrMapping/>
-  </p:clrMapOvr>
-</p:sld>
-</file>
-
-<file path=ppt/slides/slide6.xml><?xml version="1.0" encoding="utf-8"?>
-<p:sld xmlns:a="http://schemas.openxmlformats.org/drawingml/2006/main" xmlns:r="http://schemas.openxmlformats.org/officeDocument/2006/relationships" xmlns:p="http://schemas.openxmlformats.org/presentationml/2006/main">
-  <p:cSld>
-    <p:spTree>
-      <p:nvGrpSpPr>
-        <p:cNvPr id="1" name=""/>
-        <p:cNvGrpSpPr/>
-        <p:nvPr/>
-      </p:nvGrpSpPr>
-      <p:grpSpPr>
-        <a:xfrm>
-          <a:off x="0" y="0"/>
-          <a:ext cx="0" cy="0"/>
-          <a:chOff x="0" y="0"/>
-          <a:chExt cx="0" cy="0"/>
-        </a:xfrm>
-      </p:grpSpPr>
-      <p:sp>
-        <p:nvSpPr>
-          <p:cNvPr id="2" name="Titel 1">
-            <a:extLst>
-              <a:ext uri="{FF2B5EF4-FFF2-40B4-BE49-F238E27FC236}">
                 <a16:creationId xmlns:a16="http://schemas.microsoft.com/office/drawing/2014/main" id="{12AA00FE-DED3-6653-291B-CA8EC3C6CE5A}"/>
               </a:ext>
             </a:extLst>
@@ -14690,7 +14844,7 @@
           <a:p>
             <a:r>
               <a:rPr lang="de-DE" dirty="0"/>
-              <a:t>sinkende Marketing und Vertriebskosten</a:t>
+              <a:t>sinkende Marketing- und Vertriebskosten</a:t>
             </a:r>
           </a:p>
           <a:p>
@@ -14796,7 +14950,7 @@
 </p:sld>
 </file>
 
-<file path=ppt/slides/slide7.xml><?xml version="1.0" encoding="utf-8"?>
+<file path=ppt/slides/slide6.xml><?xml version="1.0" encoding="utf-8"?>
 <p:sld xmlns:a="http://schemas.openxmlformats.org/drawingml/2006/main" xmlns:r="http://schemas.openxmlformats.org/officeDocument/2006/relationships" xmlns:p="http://schemas.openxmlformats.org/presentationml/2006/main">
   <p:cSld>
     <p:spTree>
@@ -14891,7 +15045,7 @@
 </p:sld>
 </file>
 
-<file path=ppt/slides/slide8.xml><?xml version="1.0" encoding="utf-8"?>
+<file path=ppt/slides/slide7.xml><?xml version="1.0" encoding="utf-8"?>
 <p:sld xmlns:a="http://schemas.openxmlformats.org/drawingml/2006/main" xmlns:r="http://schemas.openxmlformats.org/officeDocument/2006/relationships" xmlns:p="http://schemas.openxmlformats.org/presentationml/2006/main">
   <p:cSld>
     <p:spTree>
@@ -15038,7 +15192,7 @@
 </p:sld>
 </file>
 
-<file path=ppt/slides/slide9.xml><?xml version="1.0" encoding="utf-8"?>
+<file path=ppt/slides/slide8.xml><?xml version="1.0" encoding="utf-8"?>
 <p:sld xmlns:a="http://schemas.openxmlformats.org/drawingml/2006/main" xmlns:r="http://schemas.openxmlformats.org/officeDocument/2006/relationships" xmlns:p="http://schemas.openxmlformats.org/presentationml/2006/main">
   <p:cSld>
     <p:spTree>
@@ -15118,7 +15272,7 @@
           <a:p>
             <a:r>
               <a:rPr lang="de-DE" dirty="0"/>
-              <a:t>Maximierung des Kundenwerts</a:t>
+              <a:t>Maximierung des Kundenwertes</a:t>
             </a:r>
           </a:p>
           <a:p>
@@ -15130,6 +15284,96 @@
     <p:extLst>
       <p:ext uri="{BB962C8B-B14F-4D97-AF65-F5344CB8AC3E}">
         <p14:creationId xmlns:p14="http://schemas.microsoft.com/office/powerpoint/2010/main" val="4267156915"/>
+      </p:ext>
+    </p:extLst>
+  </p:cSld>
+  <p:clrMapOvr>
+    <a:masterClrMapping/>
+  </p:clrMapOvr>
+</p:sld>
+</file>
+
+<file path=ppt/slides/slide9.xml><?xml version="1.0" encoding="utf-8"?>
+<p:sld xmlns:a="http://schemas.openxmlformats.org/drawingml/2006/main" xmlns:r="http://schemas.openxmlformats.org/officeDocument/2006/relationships" xmlns:p="http://schemas.openxmlformats.org/presentationml/2006/main">
+  <p:cSld>
+    <p:spTree>
+      <p:nvGrpSpPr>
+        <p:cNvPr id="1" name=""/>
+        <p:cNvGrpSpPr/>
+        <p:nvPr/>
+      </p:nvGrpSpPr>
+      <p:grpSpPr>
+        <a:xfrm>
+          <a:off x="0" y="0"/>
+          <a:ext cx="0" cy="0"/>
+          <a:chOff x="0" y="0"/>
+          <a:chExt cx="0" cy="0"/>
+        </a:xfrm>
+      </p:grpSpPr>
+      <p:sp>
+        <p:nvSpPr>
+          <p:cNvPr id="2" name="Titel 1">
+            <a:extLst>
+              <a:ext uri="{FF2B5EF4-FFF2-40B4-BE49-F238E27FC236}">
+                <a16:creationId xmlns:a16="http://schemas.microsoft.com/office/drawing/2014/main" id="{0111187B-07A4-A9BD-C3EC-2EE9C1E91D5D}"/>
+              </a:ext>
+            </a:extLst>
+          </p:cNvPr>
+          <p:cNvSpPr>
+            <a:spLocks noGrp="1"/>
+          </p:cNvSpPr>
+          <p:nvPr>
+            <p:ph type="title"/>
+          </p:nvPr>
+        </p:nvSpPr>
+        <p:spPr/>
+        <p:txBody>
+          <a:bodyPr/>
+          <a:lstStyle/>
+          <a:p>
+            <a:pPr algn="ctr"/>
+            <a:r>
+              <a:rPr lang="de-DE" dirty="0"/>
+              <a:t>Wirkungskette des CRM</a:t>
+            </a:r>
+          </a:p>
+        </p:txBody>
+      </p:sp>
+      <p:graphicFrame>
+        <p:nvGraphicFramePr>
+          <p:cNvPr id="4" name="Inhaltsplatzhalter 3">
+            <a:extLst>
+              <a:ext uri="{FF2B5EF4-FFF2-40B4-BE49-F238E27FC236}">
+                <a16:creationId xmlns:a16="http://schemas.microsoft.com/office/drawing/2014/main" id="{16A0119B-BB65-36C2-E229-816526916DC5}"/>
+              </a:ext>
+            </a:extLst>
+          </p:cNvPr>
+          <p:cNvGraphicFramePr>
+            <a:graphicFrameLocks noGrp="1"/>
+          </p:cNvGraphicFramePr>
+          <p:nvPr>
+            <p:ph idx="1"/>
+            <p:extLst>
+              <p:ext uri="{D42A27DB-BD31-4B8C-83A1-F6EECF244321}">
+                <p14:modId xmlns:p14="http://schemas.microsoft.com/office/powerpoint/2010/main" val="1605213468"/>
+              </p:ext>
+            </p:extLst>
+          </p:nvPr>
+        </p:nvGraphicFramePr>
+        <p:xfrm>
+          <a:off x="838200" y="1825625"/>
+          <a:ext cx="10515600" cy="4351338"/>
+        </p:xfrm>
+        <a:graphic>
+          <a:graphicData uri="http://schemas.openxmlformats.org/drawingml/2006/diagram">
+            <dgm:relIds xmlns:dgm="http://schemas.openxmlformats.org/drawingml/2006/diagram" xmlns:r="http://schemas.openxmlformats.org/officeDocument/2006/relationships" r:dm="rId2" r:lo="rId3" r:qs="rId4" r:cs="rId5"/>
+          </a:graphicData>
+        </a:graphic>
+      </p:graphicFrame>
+    </p:spTree>
+    <p:extLst>
+      <p:ext uri="{BB962C8B-B14F-4D97-AF65-F5344CB8AC3E}">
+        <p14:creationId xmlns:p14="http://schemas.microsoft.com/office/powerpoint/2010/main" val="1736304696"/>
       </p:ext>
     </p:extLst>
   </p:cSld>

</xml_diff>